<commit_message>
- changes for PPTX
</commit_message>
<xml_diff>
--- a/Angular2.pptx
+++ b/Angular2.pptx
@@ -9,20 +9,21 @@
     <p:sldId id="257" r:id="rId3"/>
     <p:sldId id="272" r:id="rId4"/>
     <p:sldId id="273" r:id="rId5"/>
-    <p:sldId id="270" r:id="rId6"/>
-    <p:sldId id="271" r:id="rId7"/>
-    <p:sldId id="261" r:id="rId8"/>
-    <p:sldId id="262" r:id="rId9"/>
-    <p:sldId id="263" r:id="rId10"/>
-    <p:sldId id="264" r:id="rId11"/>
-    <p:sldId id="265" r:id="rId12"/>
-    <p:sldId id="266" r:id="rId13"/>
-    <p:sldId id="267" r:id="rId14"/>
-    <p:sldId id="268" r:id="rId15"/>
-    <p:sldId id="269" r:id="rId16"/>
-    <p:sldId id="258" r:id="rId17"/>
-    <p:sldId id="259" r:id="rId18"/>
-    <p:sldId id="260" r:id="rId19"/>
+    <p:sldId id="275" r:id="rId6"/>
+    <p:sldId id="276" r:id="rId7"/>
+    <p:sldId id="277" r:id="rId8"/>
+    <p:sldId id="261" r:id="rId9"/>
+    <p:sldId id="278" r:id="rId10"/>
+    <p:sldId id="263" r:id="rId11"/>
+    <p:sldId id="264" r:id="rId12"/>
+    <p:sldId id="265" r:id="rId13"/>
+    <p:sldId id="266" r:id="rId14"/>
+    <p:sldId id="267" r:id="rId15"/>
+    <p:sldId id="268" r:id="rId16"/>
+    <p:sldId id="269" r:id="rId17"/>
+    <p:sldId id="258" r:id="rId18"/>
+    <p:sldId id="259" r:id="rId19"/>
+    <p:sldId id="260" r:id="rId20"/>
   </p:sldIdLst>
   <p:sldSz cx="12192000" cy="6858000"/>
   <p:notesSz cx="6858000" cy="9144000"/>
@@ -3475,7 +3476,7 @@
                   </a:schemeClr>
                 </a:solidFill>
               </a:rPr>
-              <a:t>Testing Support</a:t>
+              <a:t>Browser Support</a:t>
             </a:r>
             <a:endParaRPr lang="en-US" dirty="0">
               <a:solidFill>
@@ -3488,29 +3489,51 @@
           </a:p>
         </p:txBody>
       </p:sp>
-      <p:sp>
-        <p:nvSpPr>
-          <p:cNvPr id="3" name="Content Placeholder 2"/>
-          <p:cNvSpPr>
-            <a:spLocks noGrp="1"/>
-          </p:cNvSpPr>
-          <p:nvPr>
-            <p:ph idx="1"/>
-          </p:nvPr>
-        </p:nvSpPr>
-        <p:spPr/>
-        <p:txBody>
-          <a:bodyPr/>
-          <a:lstStyle/>
-          <a:p>
-            <a:endParaRPr lang="en-US"/>
-          </a:p>
-        </p:txBody>
-      </p:sp>
+      <p:pic>
+        <p:nvPicPr>
+          <p:cNvPr id="6146" name="Picture 2" descr="http://gurustop.net/wp-content/uploads/2015/10/angular2-browser.png"/>
+          <p:cNvPicPr>
+            <a:picLocks noChangeAspect="1" noChangeArrowheads="1"/>
+          </p:cNvPicPr>
+          <p:nvPr/>
+        </p:nvPicPr>
+        <p:blipFill>
+          <a:blip r:embed="rId2">
+            <a:extLst>
+              <a:ext uri="{28A0092B-C50C-407E-A947-70E740481C1C}">
+                <a14:useLocalDpi xmlns:a14="http://schemas.microsoft.com/office/drawing/2010/main" val="0"/>
+              </a:ext>
+            </a:extLst>
+          </a:blip>
+          <a:srcRect/>
+          <a:stretch>
+            <a:fillRect/>
+          </a:stretch>
+        </p:blipFill>
+        <p:spPr bwMode="auto">
+          <a:xfrm>
+            <a:off x="1471436" y="2356304"/>
+            <a:ext cx="9144000" cy="2038350"/>
+          </a:xfrm>
+          <a:prstGeom prst="rect">
+            <a:avLst/>
+          </a:prstGeom>
+          <a:noFill/>
+          <a:extLst>
+            <a:ext uri="{909E8E84-426E-40DD-AFC4-6F175D3DCCD1}">
+              <a14:hiddenFill xmlns:a14="http://schemas.microsoft.com/office/drawing/2010/main">
+                <a:solidFill>
+                  <a:srgbClr val="FFFFFF"/>
+                </a:solidFill>
+              </a14:hiddenFill>
+            </a:ext>
+          </a:extLst>
+        </p:spPr>
+      </p:pic>
     </p:spTree>
     <p:extLst>
       <p:ext uri="{BB962C8B-B14F-4D97-AF65-F5344CB8AC3E}">
-        <p14:creationId xmlns:p14="http://schemas.microsoft.com/office/powerpoint/2010/main" val="2764106384"/>
+        <p14:creationId xmlns:p14="http://schemas.microsoft.com/office/powerpoint/2010/main" val="2415730987"/>
       </p:ext>
     </p:extLst>
   </p:cSld>
@@ -3576,7 +3599,7 @@
                   </a:schemeClr>
                 </a:solidFill>
               </a:rPr>
-              <a:t>Performance</a:t>
+              <a:t>Testing Support</a:t>
             </a:r>
             <a:endParaRPr lang="en-US" dirty="0">
               <a:solidFill>
@@ -3604,14 +3627,46 @@
           <a:bodyPr/>
           <a:lstStyle/>
           <a:p>
-            <a:endParaRPr lang="en-US"/>
+            <a:r>
+              <a:rPr lang="en-CA" dirty="0" smtClean="0"/>
+              <a:t>Most test libraries should work</a:t>
+            </a:r>
+            <a:r>
+              <a:rPr lang="en-US" dirty="0"/>
+              <a:t> </a:t>
+            </a:r>
+            <a:r>
+              <a:rPr lang="en-US" dirty="0" smtClean="0">
+                <a:solidFill>
+                  <a:schemeClr val="tx2">
+                    <a:lumMod val="40000"/>
+                    <a:lumOff val="60000"/>
+                  </a:schemeClr>
+                </a:solidFill>
+              </a:rPr>
+              <a:t>(Jasmine was used in the Angular.io tutorial)</a:t>
+            </a:r>
+          </a:p>
+          <a:p>
+            <a:r>
+              <a:rPr lang="en-CA" dirty="0" smtClean="0"/>
+              <a:t>Can configure to run on live-server which automatically refreshes</a:t>
+            </a:r>
+            <a:endParaRPr lang="en-CA" dirty="0" smtClean="0">
+              <a:solidFill>
+                <a:schemeClr val="tx2">
+                  <a:lumMod val="40000"/>
+                  <a:lumOff val="60000"/>
+                </a:schemeClr>
+              </a:solidFill>
+            </a:endParaRPr>
           </a:p>
         </p:txBody>
       </p:sp>
     </p:spTree>
     <p:extLst>
       <p:ext uri="{BB962C8B-B14F-4D97-AF65-F5344CB8AC3E}">
-        <p14:creationId xmlns:p14="http://schemas.microsoft.com/office/powerpoint/2010/main" val="3257910670"/>
+        <p14:creationId xmlns:p14="http://schemas.microsoft.com/office/powerpoint/2010/main" val="2764106384"/>
       </p:ext>
     </p:extLst>
   </p:cSld>
@@ -3677,7 +3732,7 @@
                   </a:schemeClr>
                 </a:solidFill>
               </a:rPr>
-              <a:t>Extensibility</a:t>
+              <a:t>Performance</a:t>
             </a:r>
             <a:endParaRPr lang="en-US" dirty="0">
               <a:solidFill>
@@ -3712,7 +3767,7 @@
     </p:spTree>
     <p:extLst>
       <p:ext uri="{BB962C8B-B14F-4D97-AF65-F5344CB8AC3E}">
-        <p14:creationId xmlns:p14="http://schemas.microsoft.com/office/powerpoint/2010/main" val="2909597346"/>
+        <p14:creationId xmlns:p14="http://schemas.microsoft.com/office/powerpoint/2010/main" val="3257910670"/>
       </p:ext>
     </p:extLst>
   </p:cSld>
@@ -3778,7 +3833,7 @@
                   </a:schemeClr>
                 </a:solidFill>
               </a:rPr>
-              <a:t>Developer Support</a:t>
+              <a:t>Extensibility</a:t>
             </a:r>
             <a:endParaRPr lang="en-US" dirty="0">
               <a:solidFill>
@@ -3813,7 +3868,7 @@
     </p:spTree>
     <p:extLst>
       <p:ext uri="{BB962C8B-B14F-4D97-AF65-F5344CB8AC3E}">
-        <p14:creationId xmlns:p14="http://schemas.microsoft.com/office/powerpoint/2010/main" val="3611863778"/>
+        <p14:creationId xmlns:p14="http://schemas.microsoft.com/office/powerpoint/2010/main" val="2909597346"/>
       </p:ext>
     </p:extLst>
   </p:cSld>
@@ -3879,7 +3934,7 @@
                   </a:schemeClr>
                 </a:solidFill>
               </a:rPr>
-              <a:t>Size</a:t>
+              <a:t>Developer Support</a:t>
             </a:r>
             <a:endParaRPr lang="en-US" dirty="0">
               <a:solidFill>
@@ -3914,7 +3969,7 @@
     </p:spTree>
     <p:extLst>
       <p:ext uri="{BB962C8B-B14F-4D97-AF65-F5344CB8AC3E}">
-        <p14:creationId xmlns:p14="http://schemas.microsoft.com/office/powerpoint/2010/main" val="669392247"/>
+        <p14:creationId xmlns:p14="http://schemas.microsoft.com/office/powerpoint/2010/main" val="3611863778"/>
       </p:ext>
     </p:extLst>
   </p:cSld>
@@ -3980,7 +4035,7 @@
                   </a:schemeClr>
                 </a:solidFill>
               </a:rPr>
-              <a:t>Stability</a:t>
+              <a:t>Size</a:t>
             </a:r>
             <a:endParaRPr lang="en-US" dirty="0">
               <a:solidFill>
@@ -4015,7 +4070,7 @@
     </p:spTree>
     <p:extLst>
       <p:ext uri="{BB962C8B-B14F-4D97-AF65-F5344CB8AC3E}">
-        <p14:creationId xmlns:p14="http://schemas.microsoft.com/office/powerpoint/2010/main" val="3609019475"/>
+        <p14:creationId xmlns:p14="http://schemas.microsoft.com/office/powerpoint/2010/main" val="669392247"/>
       </p:ext>
     </p:extLst>
   </p:cSld>
@@ -4081,7 +4136,7 @@
                   </a:schemeClr>
                 </a:solidFill>
               </a:rPr>
-              <a:t>Pros</a:t>
+              <a:t>Stability</a:t>
             </a:r>
             <a:endParaRPr lang="en-US" dirty="0">
               <a:solidFill>
@@ -4109,26 +4164,14 @@
           <a:bodyPr/>
           <a:lstStyle/>
           <a:p>
-            <a:r>
-              <a:rPr lang="en-CA" dirty="0" smtClean="0"/>
-              <a:t>Lots </a:t>
-            </a:r>
-            <a:r>
-              <a:rPr lang="en-CA" dirty="0"/>
-              <a:t>of contributors (https://angular.io/about</a:t>
-            </a:r>
-            <a:r>
-              <a:rPr lang="en-CA" dirty="0" smtClean="0"/>
-              <a:t>/)</a:t>
-            </a:r>
-            <a:endParaRPr lang="en-US" dirty="0"/>
+            <a:endParaRPr lang="en-US"/>
           </a:p>
         </p:txBody>
       </p:sp>
     </p:spTree>
     <p:extLst>
       <p:ext uri="{BB962C8B-B14F-4D97-AF65-F5344CB8AC3E}">
-        <p14:creationId xmlns:p14="http://schemas.microsoft.com/office/powerpoint/2010/main" val="1083996137"/>
+        <p14:creationId xmlns:p14="http://schemas.microsoft.com/office/powerpoint/2010/main" val="3609019475"/>
       </p:ext>
     </p:extLst>
   </p:cSld>
@@ -4194,7 +4237,7 @@
                   </a:schemeClr>
                 </a:solidFill>
               </a:rPr>
-              <a:t>Cons</a:t>
+              <a:t>Pros</a:t>
             </a:r>
             <a:endParaRPr lang="en-US" dirty="0">
               <a:solidFill>
@@ -4222,14 +4265,45 @@
           <a:bodyPr/>
           <a:lstStyle/>
           <a:p>
-            <a:endParaRPr lang="en-US"/>
+            <a:r>
+              <a:rPr lang="en-CA" dirty="0" smtClean="0"/>
+              <a:t>Documentation </a:t>
+            </a:r>
+            <a:r>
+              <a:rPr lang="en-CA" dirty="0"/>
+              <a:t>advocates for the use of industry best practices such </a:t>
+            </a:r>
+            <a:r>
+              <a:rPr lang="en-CA" dirty="0" smtClean="0"/>
+              <a:t>as: </a:t>
+            </a:r>
+            <a:r>
+              <a:rPr lang="en-CA" dirty="0"/>
+              <a:t>dependency injection, unit testing, service layers, interfaces, strongly typed properties, and separation of concerns.  </a:t>
+            </a:r>
+            <a:endParaRPr lang="en-CA" dirty="0" smtClean="0"/>
+          </a:p>
+          <a:p>
+            <a:r>
+              <a:rPr lang="en-CA" dirty="0" smtClean="0"/>
+              <a:t>Lots </a:t>
+            </a:r>
+            <a:r>
+              <a:rPr lang="en-CA" dirty="0"/>
+              <a:t>of contributors (https://angular.io/about</a:t>
+            </a:r>
+            <a:r>
+              <a:rPr lang="en-CA" dirty="0" smtClean="0"/>
+              <a:t>/)</a:t>
+            </a:r>
+            <a:endParaRPr lang="en-US" dirty="0"/>
           </a:p>
         </p:txBody>
       </p:sp>
     </p:spTree>
     <p:extLst>
       <p:ext uri="{BB962C8B-B14F-4D97-AF65-F5344CB8AC3E}">
-        <p14:creationId xmlns:p14="http://schemas.microsoft.com/office/powerpoint/2010/main" val="1098847303"/>
+        <p14:creationId xmlns:p14="http://schemas.microsoft.com/office/powerpoint/2010/main" val="1083996137"/>
       </p:ext>
     </p:extLst>
   </p:cSld>
@@ -4295,7 +4369,7 @@
                   </a:schemeClr>
                 </a:solidFill>
               </a:rPr>
-              <a:t>Sources</a:t>
+              <a:t>Cons</a:t>
             </a:r>
             <a:endParaRPr lang="en-US" dirty="0">
               <a:solidFill>
@@ -4323,7 +4397,216 @@
           <a:bodyPr/>
           <a:lstStyle/>
           <a:p>
-            <a:endParaRPr lang="en-US"/>
+            <a:r>
+              <a:rPr lang="en-CA" dirty="0" smtClean="0"/>
+              <a:t>No syntax highlighting within </a:t>
+            </a:r>
+            <a:r>
+              <a:rPr lang="en-CA" u="sng" dirty="0" smtClean="0">
+                <a:solidFill>
+                  <a:srgbClr val="8ABC49"/>
+                </a:solidFill>
+              </a:rPr>
+              <a:t>Template</a:t>
+            </a:r>
+            <a:r>
+              <a:rPr lang="en-CA" dirty="0" smtClean="0"/>
+              <a:t> strings</a:t>
+            </a:r>
+          </a:p>
+          <a:p>
+            <a:r>
+              <a:rPr lang="en-CA" dirty="0" smtClean="0"/>
+              <a:t>Just came out with a release candidate</a:t>
+            </a:r>
+          </a:p>
+          <a:p>
+            <a:r>
+              <a:rPr lang="en-CA" dirty="0" smtClean="0"/>
+              <a:t>Modified parts of the API and </a:t>
+            </a:r>
+            <a:r>
+              <a:rPr lang="en-CA" u="sng" dirty="0" smtClean="0">
+                <a:solidFill>
+                  <a:srgbClr val="8ABC49"/>
+                </a:solidFill>
+              </a:rPr>
+              <a:t>Template</a:t>
+            </a:r>
+            <a:r>
+              <a:rPr lang="en-CA" dirty="0" smtClean="0"/>
+              <a:t> format during our investigation</a:t>
+            </a:r>
+          </a:p>
+          <a:p>
+            <a:r>
+              <a:rPr lang="en-CA" dirty="0" smtClean="0"/>
+              <a:t>Some </a:t>
+            </a:r>
+            <a:r>
+              <a:rPr lang="en-CA" dirty="0"/>
+              <a:t>coding errors will not produce runtime or compiler errors (very uncommon)</a:t>
+            </a:r>
+            <a:endParaRPr lang="en-US" dirty="0">
+              <a:solidFill>
+                <a:schemeClr val="tx2">
+                  <a:lumMod val="40000"/>
+                  <a:lumOff val="60000"/>
+                </a:schemeClr>
+              </a:solidFill>
+            </a:endParaRPr>
+          </a:p>
+          <a:p>
+            <a:endParaRPr lang="en-US" dirty="0"/>
+          </a:p>
+        </p:txBody>
+      </p:sp>
+    </p:spTree>
+    <p:extLst>
+      <p:ext uri="{BB962C8B-B14F-4D97-AF65-F5344CB8AC3E}">
+        <p14:creationId xmlns:p14="http://schemas.microsoft.com/office/powerpoint/2010/main" val="1098847303"/>
+      </p:ext>
+    </p:extLst>
+  </p:cSld>
+  <p:clrMapOvr>
+    <a:masterClrMapping/>
+  </p:clrMapOvr>
+  <p:timing>
+    <p:tnLst>
+      <p:par>
+        <p:cTn id="1" dur="indefinite" restart="never" nodeType="tmRoot"/>
+      </p:par>
+    </p:tnLst>
+  </p:timing>
+</p:sld>
+</file>
+
+<file path=ppt/slides/slide19.xml><?xml version="1.0" encoding="utf-8"?>
+<p:sld xmlns:a="http://schemas.openxmlformats.org/drawingml/2006/main" xmlns:r="http://schemas.openxmlformats.org/officeDocument/2006/relationships" xmlns:p="http://schemas.openxmlformats.org/presentationml/2006/main">
+  <p:cSld>
+    <p:bg>
+      <p:bgPr>
+        <a:solidFill>
+          <a:srgbClr val="1976D2"/>
+        </a:solidFill>
+        <a:effectLst/>
+      </p:bgPr>
+    </p:bg>
+    <p:spTree>
+      <p:nvGrpSpPr>
+        <p:cNvPr id="1" name=""/>
+        <p:cNvGrpSpPr/>
+        <p:nvPr/>
+      </p:nvGrpSpPr>
+      <p:grpSpPr>
+        <a:xfrm>
+          <a:off x="0" y="0"/>
+          <a:ext cx="0" cy="0"/>
+          <a:chOff x="0" y="0"/>
+          <a:chExt cx="0" cy="0"/>
+        </a:xfrm>
+      </p:grpSpPr>
+      <p:sp>
+        <p:nvSpPr>
+          <p:cNvPr id="2" name="Title 1"/>
+          <p:cNvSpPr>
+            <a:spLocks noGrp="1"/>
+          </p:cNvSpPr>
+          <p:nvPr>
+            <p:ph type="title"/>
+          </p:nvPr>
+        </p:nvSpPr>
+        <p:spPr/>
+        <p:txBody>
+          <a:bodyPr/>
+          <a:lstStyle/>
+          <a:p>
+            <a:r>
+              <a:rPr lang="en-CA" dirty="0" smtClean="0">
+                <a:solidFill>
+                  <a:schemeClr val="tx1">
+                    <a:lumMod val="50000"/>
+                    <a:lumOff val="50000"/>
+                  </a:schemeClr>
+                </a:solidFill>
+              </a:rPr>
+              <a:t>Sources</a:t>
+            </a:r>
+            <a:endParaRPr lang="en-US" dirty="0">
+              <a:solidFill>
+                <a:schemeClr val="tx1">
+                  <a:lumMod val="50000"/>
+                  <a:lumOff val="50000"/>
+                </a:schemeClr>
+              </a:solidFill>
+            </a:endParaRPr>
+          </a:p>
+        </p:txBody>
+      </p:sp>
+      <p:sp>
+        <p:nvSpPr>
+          <p:cNvPr id="3" name="Content Placeholder 2"/>
+          <p:cNvSpPr>
+            <a:spLocks noGrp="1"/>
+          </p:cNvSpPr>
+          <p:nvPr>
+            <p:ph idx="1"/>
+          </p:nvPr>
+        </p:nvSpPr>
+        <p:spPr/>
+        <p:txBody>
+          <a:bodyPr/>
+          <a:lstStyle/>
+          <a:p>
+            <a:r>
+              <a:rPr lang="en-US" dirty="0">
+                <a:hlinkClick r:id="rId2"/>
+              </a:rPr>
+              <a:t>https://</a:t>
+            </a:r>
+            <a:r>
+              <a:rPr lang="en-US" dirty="0" smtClean="0">
+                <a:hlinkClick r:id="rId2"/>
+              </a:rPr>
+              <a:t>angular.io/docs/ts/latest/guide/architecture.html</a:t>
+            </a:r>
+            <a:endParaRPr lang="en-US" dirty="0" smtClean="0"/>
+          </a:p>
+          <a:p>
+            <a:r>
+              <a:rPr lang="en-US" dirty="0">
+                <a:hlinkClick r:id="rId3"/>
+              </a:rPr>
+              <a:t>https://</a:t>
+            </a:r>
+            <a:r>
+              <a:rPr lang="en-US" dirty="0" smtClean="0">
+                <a:hlinkClick r:id="rId3"/>
+              </a:rPr>
+              <a:t>en.wikipedia.org/wiki/AngularJS</a:t>
+            </a:r>
+            <a:endParaRPr lang="en-US" dirty="0" smtClean="0"/>
+          </a:p>
+          <a:p>
+            <a:r>
+              <a:rPr lang="en-US" dirty="0">
+                <a:hlinkClick r:id="rId4"/>
+              </a:rPr>
+              <a:t>http://</a:t>
+            </a:r>
+            <a:r>
+              <a:rPr lang="en-US" dirty="0" smtClean="0">
+                <a:hlinkClick r:id="rId4"/>
+              </a:rPr>
+              <a:t>www.gurustop.net/blog/2015/10/07/angularjs2-internet-explorer-support</a:t>
+            </a:r>
+            <a:endParaRPr lang="en-US" dirty="0" smtClean="0"/>
+          </a:p>
+          <a:p>
+            <a:endParaRPr lang="en-US" dirty="0" smtClean="0"/>
+          </a:p>
+          <a:p>
+            <a:endParaRPr lang="en-US" dirty="0"/>
           </a:p>
         </p:txBody>
       </p:sp>
@@ -4436,10 +4719,31 @@
               <a:t> is an </a:t>
             </a:r>
             <a:r>
-              <a:rPr lang="en-CA" dirty="0" smtClean="0">
+              <a:rPr lang="en-CA" dirty="0">
+                <a:solidFill>
+                  <a:srgbClr val="8ABC49"/>
+                </a:solidFill>
                 <a:hlinkClick r:id="rId2" tooltip="Open-source software"/>
               </a:rPr>
-              <a:t>open-source</a:t>
+              <a:t>o</a:t>
+            </a:r>
+            <a:r>
+              <a:rPr lang="en-CA" dirty="0">
+                <a:solidFill>
+                  <a:srgbClr val="8ABC49"/>
+                </a:solidFill>
+                <a:hlinkClick r:id="rId2" tooltip="Open-source software"/>
+              </a:rPr>
+              <a:t>pe</a:t>
+            </a:r>
+            <a:r>
+              <a:rPr lang="en-CA" dirty="0">
+                <a:solidFill>
+                  <a:srgbClr val="8ABC49"/>
+                </a:solidFill>
+                <a:hlinkClick r:id="rId2" tooltip="Open-source software"/>
+              </a:rPr>
+              <a:t>n-source</a:t>
             </a:r>
             <a:r>
               <a:rPr lang="en-CA" dirty="0" smtClean="0"/>
@@ -4572,7 +4876,7 @@
                   </a:schemeClr>
                 </a:solidFill>
               </a:rPr>
-              <a:t>Overview</a:t>
+              <a:t>Architecture</a:t>
             </a:r>
             <a:endParaRPr lang="en-US" dirty="0">
               <a:solidFill>
@@ -4608,7 +4912,7 @@
         </p:blipFill>
         <p:spPr bwMode="auto">
           <a:xfrm>
-            <a:off x="1793182" y="2204951"/>
+            <a:off x="1774520" y="2102315"/>
             <a:ext cx="7981950" cy="4057650"/>
           </a:xfrm>
           <a:prstGeom prst="rect">
@@ -4649,6 +4953,14 @@
 <file path=ppt/slides/slide4.xml><?xml version="1.0" encoding="utf-8"?>
 <p:sld xmlns:a="http://schemas.openxmlformats.org/drawingml/2006/main" xmlns:r="http://schemas.openxmlformats.org/officeDocument/2006/relationships" xmlns:p="http://schemas.openxmlformats.org/presentationml/2006/main">
   <p:cSld>
+    <p:bg>
+      <p:bgPr>
+        <a:solidFill>
+          <a:srgbClr val="1976D2"/>
+        </a:solidFill>
+        <a:effectLst/>
+      </p:bgPr>
+    </p:bg>
     <p:spTree>
       <p:nvGrpSpPr>
         <p:cNvPr id="1" name=""/>
@@ -4687,7 +4999,7 @@
                   </a:schemeClr>
                 </a:solidFill>
               </a:rPr>
-              <a:t>Overview</a:t>
+              <a:t>Component Hierarchy</a:t>
             </a:r>
             <a:endParaRPr lang="en-US" dirty="0">
               <a:solidFill>
@@ -4723,7 +5035,7 @@
         </p:blipFill>
         <p:spPr bwMode="auto">
           <a:xfrm>
-            <a:off x="2085391" y="2661976"/>
+            <a:off x="1441578" y="2531346"/>
             <a:ext cx="3541395" cy="2724151"/>
           </a:xfrm>
           <a:prstGeom prst="rect">
@@ -4741,47 +5053,96 @@
           </a:extLst>
         </p:spPr>
       </p:pic>
-      <p:pic>
-        <p:nvPicPr>
-          <p:cNvPr id="3078" name="Picture 6" descr="Data Binding"/>
-          <p:cNvPicPr>
-            <a:picLocks noChangeAspect="1" noChangeArrowheads="1"/>
-          </p:cNvPicPr>
-          <p:nvPr/>
-        </p:nvPicPr>
-        <p:blipFill>
-          <a:blip r:embed="rId3">
-            <a:extLst>
-              <a:ext uri="{28A0092B-C50C-407E-A947-70E740481C1C}">
-                <a14:useLocalDpi xmlns:a14="http://schemas.microsoft.com/office/drawing/2010/main" val="0"/>
-              </a:ext>
-            </a:extLst>
-          </a:blip>
-          <a:srcRect/>
-          <a:stretch>
-            <a:fillRect/>
-          </a:stretch>
-        </p:blipFill>
-        <p:spPr bwMode="auto">
+      <p:sp>
+        <p:nvSpPr>
+          <p:cNvPr id="7" name="Content Placeholder 2"/>
+          <p:cNvSpPr>
+            <a:spLocks noGrp="1"/>
+          </p:cNvSpPr>
+          <p:nvPr>
+            <p:ph idx="1"/>
+          </p:nvPr>
+        </p:nvSpPr>
+        <p:spPr>
           <a:xfrm>
-            <a:off x="6724326" y="2981063"/>
-            <a:ext cx="3409950" cy="2085976"/>
+            <a:off x="5414403" y="2678109"/>
+            <a:ext cx="6062250" cy="2430624"/>
           </a:xfrm>
-          <a:prstGeom prst="rect">
-            <a:avLst/>
-          </a:prstGeom>
-          <a:noFill/>
-          <a:extLst>
-            <a:ext uri="{909E8E84-426E-40DD-AFC4-6F175D3DCCD1}">
-              <a14:hiddenFill xmlns:a14="http://schemas.microsoft.com/office/drawing/2010/main">
-                <a:solidFill>
-                  <a:srgbClr val="FFFFFF"/>
-                </a:solidFill>
-              </a14:hiddenFill>
-            </a:ext>
-          </a:extLst>
         </p:spPr>
-      </p:pic>
+        <p:txBody>
+          <a:bodyPr>
+            <a:normAutofit/>
+          </a:bodyPr>
+          <a:lstStyle/>
+          <a:p>
+            <a:r>
+              <a:rPr lang="en-CA" dirty="0" smtClean="0"/>
+              <a:t>Projects contain a single root </a:t>
+            </a:r>
+            <a:r>
+              <a:rPr lang="en-CA" u="sng" dirty="0">
+                <a:solidFill>
+                  <a:srgbClr val="8ABC49"/>
+                </a:solidFill>
+              </a:rPr>
+              <a:t>Component</a:t>
+            </a:r>
+          </a:p>
+          <a:p>
+            <a:r>
+              <a:rPr lang="en-CA" u="sng" dirty="0" smtClean="0">
+                <a:solidFill>
+                  <a:srgbClr val="8ABC49"/>
+                </a:solidFill>
+              </a:rPr>
+              <a:t>Components</a:t>
+            </a:r>
+            <a:r>
+              <a:rPr lang="en-CA" dirty="0" smtClean="0"/>
+              <a:t> contain a template defined in its   metadata</a:t>
+            </a:r>
+          </a:p>
+          <a:p>
+            <a:r>
+              <a:rPr lang="en-CA" u="sng" dirty="0" smtClean="0">
+                <a:solidFill>
+                  <a:srgbClr val="8ABC49"/>
+                </a:solidFill>
+              </a:rPr>
+              <a:t>Templates</a:t>
+            </a:r>
+            <a:r>
+              <a:rPr lang="en-CA" dirty="0" smtClean="0"/>
+              <a:t> may contain </a:t>
+            </a:r>
+            <a:r>
+              <a:rPr lang="en-CA" u="sng" dirty="0" smtClean="0">
+                <a:solidFill>
+                  <a:srgbClr val="8ABC49"/>
+                </a:solidFill>
+              </a:rPr>
+              <a:t>Directives</a:t>
+            </a:r>
+            <a:r>
+              <a:rPr lang="en-CA" dirty="0" smtClean="0"/>
+              <a:t>, which instruct the framework to load a specific </a:t>
+            </a:r>
+            <a:r>
+              <a:rPr lang="en-CA" u="sng" dirty="0" smtClean="0">
+                <a:solidFill>
+                  <a:srgbClr val="8ABC49"/>
+                </a:solidFill>
+              </a:rPr>
+              <a:t>Component</a:t>
+            </a:r>
+            <a:endParaRPr lang="en-CA" u="sng" dirty="0" smtClean="0">
+              <a:solidFill>
+                <a:srgbClr val="8ABC49"/>
+              </a:solidFill>
+            </a:endParaRPr>
+          </a:p>
+        </p:txBody>
+      </p:sp>
     </p:spTree>
     <p:extLst>
       <p:ext uri="{BB962C8B-B14F-4D97-AF65-F5344CB8AC3E}">
@@ -4851,22 +5212,7 @@
                   </a:schemeClr>
                 </a:solidFill>
               </a:rPr>
-              <a:t>Learning</a:t>
-            </a:r>
-            <a:r>
-              <a:rPr lang="en-CA" dirty="0" smtClean="0"/>
-              <a:t> </a:t>
-            </a:r>
-            <a:r>
-              <a:rPr lang="en-CA" dirty="0" smtClean="0">
-                <a:solidFill>
-                  <a:schemeClr val="tx1">
-                    <a:lumMod val="50000"/>
-                    <a:lumOff val="50000"/>
-                  </a:schemeClr>
-                </a:solidFill>
-              </a:rPr>
-              <a:t>Curve</a:t>
+              <a:t>Component</a:t>
             </a:r>
             <a:endParaRPr lang="en-US" dirty="0">
               <a:solidFill>
@@ -4879,9 +5225,50 @@
           </a:p>
         </p:txBody>
       </p:sp>
-      <p:sp>
-        <p:nvSpPr>
-          <p:cNvPr id="3" name="Content Placeholder 2"/>
+      <p:pic>
+        <p:nvPicPr>
+          <p:cNvPr id="3078" name="Picture 6" descr="Data Binding"/>
+          <p:cNvPicPr>
+            <a:picLocks noChangeAspect="1" noChangeArrowheads="1"/>
+          </p:cNvPicPr>
+          <p:nvPr/>
+        </p:nvPicPr>
+        <p:blipFill>
+          <a:blip r:embed="rId2">
+            <a:extLst>
+              <a:ext uri="{28A0092B-C50C-407E-A947-70E740481C1C}">
+                <a14:useLocalDpi xmlns:a14="http://schemas.microsoft.com/office/drawing/2010/main" val="0"/>
+              </a:ext>
+            </a:extLst>
+          </a:blip>
+          <a:srcRect/>
+          <a:stretch>
+            <a:fillRect/>
+          </a:stretch>
+        </p:blipFill>
+        <p:spPr bwMode="auto">
+          <a:xfrm>
+            <a:off x="1635519" y="2304882"/>
+            <a:ext cx="3099955" cy="1896342"/>
+          </a:xfrm>
+          <a:prstGeom prst="rect">
+            <a:avLst/>
+          </a:prstGeom>
+          <a:noFill/>
+          <a:extLst>
+            <a:ext uri="{909E8E84-426E-40DD-AFC4-6F175D3DCCD1}">
+              <a14:hiddenFill xmlns:a14="http://schemas.microsoft.com/office/drawing/2010/main">
+                <a:solidFill>
+                  <a:srgbClr val="FFFFFF"/>
+                </a:solidFill>
+              </a14:hiddenFill>
+            </a:ext>
+          </a:extLst>
+        </p:spPr>
+      </p:pic>
+      <p:sp>
+        <p:nvSpPr>
+          <p:cNvPr id="5" name="Content Placeholder 2"/>
           <p:cNvSpPr>
             <a:spLocks noGrp="1"/>
           </p:cNvSpPr>
@@ -4889,7 +5276,12 @@
             <p:ph idx="1"/>
           </p:nvPr>
         </p:nvSpPr>
-        <p:spPr/>
+        <p:spPr>
+          <a:xfrm>
+            <a:off x="5414403" y="2967357"/>
+            <a:ext cx="6062250" cy="2085976"/>
+          </a:xfrm>
+        </p:spPr>
         <p:txBody>
           <a:bodyPr>
             <a:normAutofit lnSpcReduction="10000"/>
@@ -4897,63 +5289,134 @@
           <a:lstStyle/>
           <a:p>
             <a:r>
+              <a:rPr lang="en-CA" u="sng" dirty="0" smtClean="0">
+                <a:solidFill>
+                  <a:srgbClr val="8ABC49"/>
+                </a:solidFill>
+              </a:rPr>
+              <a:t>Components </a:t>
+            </a:r>
+            <a:r>
               <a:rPr lang="en-CA" dirty="0" smtClean="0"/>
-              <a:t>In our own experience learning over the course of a couple of weeks, we were able to create and build a simple SPA application using only Angular 2. Features within the framework are well documented and there is an abundance of tutorials/videos to coach you along. </a:t>
-            </a:r>
-          </a:p>
-          <a:p>
-            <a:pPr algn="ctr"/>
-            <a:endParaRPr lang="en-CA" u="sng" dirty="0"/>
-          </a:p>
-          <a:p>
-            <a:r>
-              <a:rPr lang="en-CA" dirty="0" err="1" smtClean="0"/>
-              <a:t>Angular’s</a:t>
+              <a:t>and </a:t>
+            </a:r>
+            <a:r>
+              <a:rPr lang="en-CA" u="sng" dirty="0" smtClean="0">
+                <a:solidFill>
+                  <a:srgbClr val="8ABC49"/>
+                </a:solidFill>
+              </a:rPr>
+              <a:t>Templates</a:t>
             </a:r>
             <a:r>
               <a:rPr lang="en-CA" dirty="0" smtClean="0"/>
-              <a:t> documentation advocates for the use of industry best practices such as dependency injection, </a:t>
-            </a:r>
-            <a:r>
-              <a:rPr lang="en-CA" dirty="0"/>
-              <a:t>u</a:t>
+              <a:t> communicate through their bindings</a:t>
+            </a:r>
+            <a:endParaRPr lang="en-CA" u="sng" dirty="0">
+              <a:solidFill>
+                <a:srgbClr val="8ABC49"/>
+              </a:solidFill>
+            </a:endParaRPr>
+          </a:p>
+          <a:p>
+            <a:r>
+              <a:rPr lang="en-CA" u="sng" dirty="0" smtClean="0">
+                <a:solidFill>
+                  <a:srgbClr val="8ABC49"/>
+                </a:solidFill>
+              </a:rPr>
+              <a:t>Property-bindings</a:t>
             </a:r>
             <a:r>
               <a:rPr lang="en-CA" dirty="0" smtClean="0"/>
-              <a:t>nit testing, service </a:t>
-            </a:r>
-            <a:r>
-              <a:rPr lang="en-CA" dirty="0"/>
-              <a:t>l</a:t>
+              <a:t> and </a:t>
+            </a:r>
+            <a:r>
+              <a:rPr lang="en-CA" u="sng" dirty="0" smtClean="0">
+                <a:solidFill>
+                  <a:srgbClr val="8ABC49"/>
+                </a:solidFill>
+              </a:rPr>
+              <a:t>Event-bindings</a:t>
             </a:r>
             <a:r>
               <a:rPr lang="en-CA" dirty="0" smtClean="0"/>
-              <a:t>ayers, interfaces, strongly typed properties, and separation of concerns.  </a:t>
-            </a:r>
-          </a:p>
-          <a:p>
-            <a:endParaRPr lang="en-CA" dirty="0"/>
+              <a:t> are one-way</a:t>
+            </a:r>
           </a:p>
           <a:p>
             <a:r>
               <a:rPr lang="en-CA" dirty="0" smtClean="0"/>
-              <a:t>Out of the box Angular provides tools to assist you with these practices, such as Dependency Injection, Unit testing frameworks and support for </a:t>
-            </a:r>
-            <a:r>
-              <a:rPr lang="en-CA" dirty="0" err="1" smtClean="0"/>
-              <a:t>TypeScript</a:t>
+              <a:t>A </a:t>
+            </a:r>
+            <a:r>
+              <a:rPr lang="en-CA" u="sng" dirty="0" smtClean="0">
+                <a:solidFill>
+                  <a:srgbClr val="8ABC49"/>
+                </a:solidFill>
+              </a:rPr>
+              <a:t>Component</a:t>
             </a:r>
             <a:r>
               <a:rPr lang="en-CA" dirty="0" smtClean="0"/>
-              <a:t>.</a:t>
-            </a:r>
-          </a:p>
-        </p:txBody>
-      </p:sp>
+              <a:t> can expose specific properties or methods to other </a:t>
+            </a:r>
+            <a:r>
+              <a:rPr lang="en-CA" u="sng" dirty="0" smtClean="0">
+                <a:solidFill>
+                  <a:srgbClr val="8ABC49"/>
+                </a:solidFill>
+              </a:rPr>
+              <a:t>Components</a:t>
+            </a:r>
+          </a:p>
+        </p:txBody>
+      </p:sp>
+      <p:pic>
+        <p:nvPicPr>
+          <p:cNvPr id="4098" name="Picture 2" descr="Parent/Child binding"/>
+          <p:cNvPicPr>
+            <a:picLocks noChangeAspect="1" noChangeArrowheads="1"/>
+          </p:cNvPicPr>
+          <p:nvPr/>
+        </p:nvPicPr>
+        <p:blipFill>
+          <a:blip r:embed="rId3">
+            <a:extLst>
+              <a:ext uri="{28A0092B-C50C-407E-A947-70E740481C1C}">
+                <a14:useLocalDpi xmlns:a14="http://schemas.microsoft.com/office/drawing/2010/main" val="0"/>
+              </a:ext>
+            </a:extLst>
+          </a:blip>
+          <a:srcRect/>
+          <a:stretch>
+            <a:fillRect/>
+          </a:stretch>
+        </p:blipFill>
+        <p:spPr bwMode="auto">
+          <a:xfrm>
+            <a:off x="1825790" y="4586362"/>
+            <a:ext cx="2719412" cy="1297496"/>
+          </a:xfrm>
+          <a:prstGeom prst="rect">
+            <a:avLst/>
+          </a:prstGeom>
+          <a:noFill/>
+          <a:extLst>
+            <a:ext uri="{909E8E84-426E-40DD-AFC4-6F175D3DCCD1}">
+              <a14:hiddenFill xmlns:a14="http://schemas.microsoft.com/office/drawing/2010/main">
+                <a:solidFill>
+                  <a:srgbClr val="FFFFFF"/>
+                </a:solidFill>
+              </a14:hiddenFill>
+            </a:ext>
+          </a:extLst>
+        </p:spPr>
+      </p:pic>
     </p:spTree>
     <p:extLst>
       <p:ext uri="{BB962C8B-B14F-4D97-AF65-F5344CB8AC3E}">
-        <p14:creationId xmlns:p14="http://schemas.microsoft.com/office/powerpoint/2010/main" val="793023314"/>
+        <p14:creationId xmlns:p14="http://schemas.microsoft.com/office/powerpoint/2010/main" val="217798084"/>
       </p:ext>
     </p:extLst>
   </p:cSld>
@@ -4995,11 +5458,135 @@
           <a:chExt cx="0" cy="0"/>
         </a:xfrm>
       </p:grpSpPr>
+      <p:sp>
+        <p:nvSpPr>
+          <p:cNvPr id="2" name="Title 1"/>
+          <p:cNvSpPr>
+            <a:spLocks noGrp="1"/>
+          </p:cNvSpPr>
+          <p:nvPr>
+            <p:ph type="title"/>
+          </p:nvPr>
+        </p:nvSpPr>
+        <p:spPr/>
+        <p:txBody>
+          <a:bodyPr/>
+          <a:lstStyle/>
+          <a:p>
+            <a:r>
+              <a:rPr lang="en-CA" dirty="0" smtClean="0">
+                <a:solidFill>
+                  <a:schemeClr val="tx1">
+                    <a:lumMod val="50000"/>
+                    <a:lumOff val="50000"/>
+                  </a:schemeClr>
+                </a:solidFill>
+              </a:rPr>
+              <a:t>Services / Dependency Injection</a:t>
+            </a:r>
+            <a:endParaRPr lang="en-US" dirty="0">
+              <a:solidFill>
+                <a:schemeClr val="tx1">
+                  <a:lumMod val="50000"/>
+                  <a:lumOff val="50000"/>
+                </a:schemeClr>
+              </a:solidFill>
+            </a:endParaRPr>
+          </a:p>
+        </p:txBody>
+      </p:sp>
+      <p:sp>
+        <p:nvSpPr>
+          <p:cNvPr id="5" name="Content Placeholder 2"/>
+          <p:cNvSpPr>
+            <a:spLocks noGrp="1"/>
+          </p:cNvSpPr>
+          <p:nvPr>
+            <p:ph idx="1"/>
+          </p:nvPr>
+        </p:nvSpPr>
+        <p:spPr>
+          <a:xfrm>
+            <a:off x="5414403" y="2734091"/>
+            <a:ext cx="6062250" cy="3013565"/>
+          </a:xfrm>
+        </p:spPr>
+        <p:txBody>
+          <a:bodyPr>
+            <a:normAutofit/>
+          </a:bodyPr>
+          <a:lstStyle/>
+          <a:p>
+            <a:r>
+              <a:rPr lang="en-CA" u="sng" dirty="0" smtClean="0">
+                <a:solidFill>
+                  <a:srgbClr val="8ABC49"/>
+                </a:solidFill>
+              </a:rPr>
+              <a:t>Services </a:t>
+            </a:r>
+            <a:r>
+              <a:rPr lang="en-CA" dirty="0" smtClean="0"/>
+              <a:t>contain your business logic and make requests to your server endpoints</a:t>
+            </a:r>
+            <a:endParaRPr lang="en-CA" u="sng" dirty="0">
+              <a:solidFill>
+                <a:srgbClr val="8ABC49"/>
+              </a:solidFill>
+            </a:endParaRPr>
+          </a:p>
+          <a:p>
+            <a:r>
+              <a:rPr lang="en-CA" u="sng" dirty="0" smtClean="0">
+                <a:solidFill>
+                  <a:srgbClr val="8ABC49"/>
+                </a:solidFill>
+              </a:rPr>
+              <a:t>Services </a:t>
+            </a:r>
+            <a:r>
+              <a:rPr lang="en-CA" dirty="0" smtClean="0"/>
+              <a:t>are commonly</a:t>
+            </a:r>
+            <a:r>
+              <a:rPr lang="en-CA" u="sng" dirty="0" smtClean="0">
+                <a:solidFill>
+                  <a:srgbClr val="8ABC49"/>
+                </a:solidFill>
+              </a:rPr>
+              <a:t> Injected </a:t>
+            </a:r>
+            <a:r>
+              <a:rPr lang="en-CA" dirty="0" smtClean="0"/>
+              <a:t>into </a:t>
+            </a:r>
+            <a:r>
+              <a:rPr lang="en-CA" u="sng" dirty="0" smtClean="0">
+                <a:solidFill>
+                  <a:srgbClr val="8ABC49"/>
+                </a:solidFill>
+              </a:rPr>
+              <a:t>Components</a:t>
+            </a:r>
+          </a:p>
+          <a:p>
+            <a:r>
+              <a:rPr lang="en-CA" dirty="0" smtClean="0"/>
+              <a:t>This approach increases testability across the whole application</a:t>
+            </a:r>
+            <a:endParaRPr lang="en-CA" u="sng" dirty="0" smtClean="0">
+              <a:solidFill>
+                <a:srgbClr val="8ABC49"/>
+              </a:solidFill>
+            </a:endParaRPr>
+          </a:p>
+        </p:txBody>
+      </p:sp>
       <p:pic>
         <p:nvPicPr>
-          <p:cNvPr id="5" name="Picture 4"/>
+          <p:cNvPr id="5122" name="Picture 2" descr="Service"/>
           <p:cNvPicPr>
-            <a:picLocks noChangeAspect="1"/>
+            <a:picLocks noChangeAspect="1" noChangeArrowheads="1"/>
           </p:cNvPicPr>
           <p:nvPr/>
         </p:nvPicPr>
@@ -5011,24 +5598,35 @@
               </a:ext>
             </a:extLst>
           </a:blip>
+          <a:srcRect/>
           <a:stretch>
             <a:fillRect/>
           </a:stretch>
         </p:blipFill>
-        <p:spPr>
+        <p:spPr bwMode="auto">
           <a:xfrm>
-            <a:off x="467071" y="497898"/>
-            <a:ext cx="5505450" cy="2038350"/>
+            <a:off x="941458" y="2967357"/>
+            <a:ext cx="4147705" cy="1887682"/>
           </a:xfrm>
           <a:prstGeom prst="rect">
             <a:avLst/>
           </a:prstGeom>
+          <a:noFill/>
+          <a:extLst>
+            <a:ext uri="{909E8E84-426E-40DD-AFC4-6F175D3DCCD1}">
+              <a14:hiddenFill xmlns:a14="http://schemas.microsoft.com/office/drawing/2010/main">
+                <a:solidFill>
+                  <a:srgbClr val="FFFFFF"/>
+                </a:solidFill>
+              </a14:hiddenFill>
+            </a:ext>
+          </a:extLst>
         </p:spPr>
       </p:pic>
     </p:spTree>
     <p:extLst>
       <p:ext uri="{BB962C8B-B14F-4D97-AF65-F5344CB8AC3E}">
-        <p14:creationId xmlns:p14="http://schemas.microsoft.com/office/powerpoint/2010/main" val="2640499734"/>
+        <p14:creationId xmlns:p14="http://schemas.microsoft.com/office/powerpoint/2010/main" val="3510006872"/>
       </p:ext>
     </p:extLst>
   </p:cSld>
@@ -5094,7 +5692,22 @@
                   </a:schemeClr>
                 </a:solidFill>
               </a:rPr>
-              <a:t>Syntax / Legibility</a:t>
+              <a:t>Learning</a:t>
+            </a:r>
+            <a:r>
+              <a:rPr lang="en-CA" dirty="0" smtClean="0"/>
+              <a:t> </a:t>
+            </a:r>
+            <a:r>
+              <a:rPr lang="en-CA" dirty="0" smtClean="0">
+                <a:solidFill>
+                  <a:schemeClr val="tx1">
+                    <a:lumMod val="50000"/>
+                    <a:lumOff val="50000"/>
+                  </a:schemeClr>
+                </a:solidFill>
+              </a:rPr>
+              <a:t>Curve</a:t>
             </a:r>
             <a:endParaRPr lang="en-US" dirty="0">
               <a:solidFill>
@@ -5119,17 +5732,157 @@
         </p:nvSpPr>
         <p:spPr/>
         <p:txBody>
-          <a:bodyPr/>
-          <a:lstStyle/>
-          <a:p>
-            <a:endParaRPr lang="en-US"/>
+          <a:bodyPr>
+            <a:normAutofit/>
+          </a:bodyPr>
+          <a:lstStyle/>
+          <a:p>
+            <a:r>
+              <a:rPr lang="en-CA" dirty="0" smtClean="0"/>
+              <a:t>Fairly easy to pick</a:t>
+            </a:r>
+          </a:p>
+          <a:p>
+            <a:r>
+              <a:rPr lang="en-CA" dirty="0" smtClean="0"/>
+              <a:t>Lots of training videos already </a:t>
+            </a:r>
+            <a:r>
+              <a:rPr lang="en-CA" dirty="0" smtClean="0">
+                <a:solidFill>
+                  <a:schemeClr val="tx2">
+                    <a:lumMod val="40000"/>
+                    <a:lumOff val="60000"/>
+                  </a:schemeClr>
+                </a:solidFill>
+              </a:rPr>
+              <a:t>(e.g. </a:t>
+            </a:r>
+            <a:r>
+              <a:rPr lang="en-CA" dirty="0" err="1" smtClean="0">
+                <a:solidFill>
+                  <a:schemeClr val="tx2">
+                    <a:lumMod val="40000"/>
+                    <a:lumOff val="60000"/>
+                  </a:schemeClr>
+                </a:solidFill>
+              </a:rPr>
+              <a:t>Udemy</a:t>
+            </a:r>
+            <a:r>
+              <a:rPr lang="en-CA" dirty="0" smtClean="0">
+                <a:solidFill>
+                  <a:schemeClr val="tx2">
+                    <a:lumMod val="40000"/>
+                    <a:lumOff val="60000"/>
+                  </a:schemeClr>
+                </a:solidFill>
+              </a:rPr>
+              <a:t>, </a:t>
+            </a:r>
+            <a:r>
+              <a:rPr lang="en-CA" dirty="0" err="1" smtClean="0">
+                <a:solidFill>
+                  <a:schemeClr val="tx2">
+                    <a:lumMod val="40000"/>
+                    <a:lumOff val="60000"/>
+                  </a:schemeClr>
+                </a:solidFill>
+              </a:rPr>
+              <a:t>Youtube</a:t>
+            </a:r>
+            <a:r>
+              <a:rPr lang="en-CA" dirty="0" smtClean="0">
+                <a:solidFill>
+                  <a:schemeClr val="tx2">
+                    <a:lumMod val="40000"/>
+                    <a:lumOff val="60000"/>
+                  </a:schemeClr>
+                </a:solidFill>
+              </a:rPr>
+              <a:t>, Lynda.com)</a:t>
+            </a:r>
+            <a:endParaRPr lang="en-CA" dirty="0" smtClean="0">
+              <a:solidFill>
+                <a:schemeClr val="tx2">
+                  <a:lumMod val="40000"/>
+                  <a:lumOff val="60000"/>
+                </a:schemeClr>
+              </a:solidFill>
+            </a:endParaRPr>
+          </a:p>
+          <a:p>
+            <a:r>
+              <a:rPr lang="en-CA" dirty="0" smtClean="0"/>
+              <a:t>Angular.io contains a thorough tutorial project</a:t>
+            </a:r>
+            <a:endParaRPr lang="en-CA" dirty="0" smtClean="0"/>
+          </a:p>
+          <a:p>
+            <a:r>
+              <a:rPr lang="en-CA" dirty="0" smtClean="0"/>
+              <a:t>Already contains 7500+ stack overflow questions </a:t>
+            </a:r>
+            <a:r>
+              <a:rPr lang="en-CA" dirty="0" smtClean="0">
+                <a:solidFill>
+                  <a:schemeClr val="tx2">
+                    <a:lumMod val="40000"/>
+                    <a:lumOff val="60000"/>
+                  </a:schemeClr>
+                </a:solidFill>
+              </a:rPr>
+              <a:t>(200k+ for </a:t>
+            </a:r>
+            <a:r>
+              <a:rPr lang="en-CA" dirty="0" err="1" smtClean="0">
+                <a:solidFill>
+                  <a:schemeClr val="tx2">
+                    <a:lumMod val="40000"/>
+                    <a:lumOff val="60000"/>
+                  </a:schemeClr>
+                </a:solidFill>
+              </a:rPr>
+              <a:t>AngularJs</a:t>
+            </a:r>
+            <a:r>
+              <a:rPr lang="en-CA" dirty="0" smtClean="0">
+                <a:solidFill>
+                  <a:schemeClr val="tx2">
+                    <a:lumMod val="40000"/>
+                    <a:lumOff val="60000"/>
+                  </a:schemeClr>
+                </a:solidFill>
+              </a:rPr>
+              <a:t>)</a:t>
+            </a:r>
+          </a:p>
+          <a:p>
+            <a:r>
+              <a:rPr lang="en-CA" dirty="0" smtClean="0"/>
+              <a:t>HTML template syntax gets some getting used to</a:t>
+            </a:r>
+          </a:p>
+          <a:p>
+            <a:r>
+              <a:rPr lang="en-CA" dirty="0" smtClean="0"/>
+              <a:t>Positive changes have been made to their template API since we began</a:t>
+            </a:r>
+            <a:endParaRPr lang="en-CA" u="sng" dirty="0" smtClean="0">
+              <a:solidFill>
+                <a:schemeClr val="tx2">
+                  <a:lumMod val="40000"/>
+                  <a:lumOff val="60000"/>
+                </a:schemeClr>
+              </a:solidFill>
+            </a:endParaRPr>
           </a:p>
         </p:txBody>
       </p:sp>
     </p:spTree>
     <p:extLst>
       <p:ext uri="{BB962C8B-B14F-4D97-AF65-F5344CB8AC3E}">
-        <p14:creationId xmlns:p14="http://schemas.microsoft.com/office/powerpoint/2010/main" val="2180109606"/>
+        <p14:creationId xmlns:p14="http://schemas.microsoft.com/office/powerpoint/2010/main" val="1707019785"/>
       </p:ext>
     </p:extLst>
   </p:cSld>
@@ -5195,7 +5948,7 @@
                   </a:schemeClr>
                 </a:solidFill>
               </a:rPr>
-              <a:t>Longevity</a:t>
+              <a:t>Syntax / Legibility</a:t>
             </a:r>
             <a:endParaRPr lang="en-US" dirty="0">
               <a:solidFill>
@@ -5208,9 +5961,39 @@
           </a:p>
         </p:txBody>
       </p:sp>
-      <p:sp>
-        <p:nvSpPr>
-          <p:cNvPr id="3" name="Content Placeholder 2"/>
+      <p:pic>
+        <p:nvPicPr>
+          <p:cNvPr id="4" name="Picture 3"/>
+          <p:cNvPicPr>
+            <a:picLocks noChangeAspect="1"/>
+          </p:cNvPicPr>
+          <p:nvPr/>
+        </p:nvPicPr>
+        <p:blipFill>
+          <a:blip r:embed="rId2">
+            <a:extLst>
+              <a:ext uri="{28A0092B-C50C-407E-A947-70E740481C1C}">
+                <a14:useLocalDpi xmlns:a14="http://schemas.microsoft.com/office/drawing/2010/main" val="0"/>
+              </a:ext>
+            </a:extLst>
+          </a:blip>
+          <a:stretch>
+            <a:fillRect/>
+          </a:stretch>
+        </p:blipFill>
+        <p:spPr>
+          <a:xfrm>
+            <a:off x="1143000" y="1965960"/>
+            <a:ext cx="5505450" cy="2038350"/>
+          </a:xfrm>
+          <a:prstGeom prst="rect">
+            <a:avLst/>
+          </a:prstGeom>
+        </p:spPr>
+      </p:pic>
+      <p:sp>
+        <p:nvSpPr>
+          <p:cNvPr id="5" name="Content Placeholder 2"/>
           <p:cNvSpPr>
             <a:spLocks noGrp="1"/>
           </p:cNvSpPr>
@@ -5218,19 +6001,69 @@
             <p:ph idx="1"/>
           </p:nvPr>
         </p:nvSpPr>
-        <p:spPr/>
-        <p:txBody>
-          <a:bodyPr/>
-          <a:lstStyle/>
-          <a:p>
-            <a:endParaRPr lang="en-US"/>
+        <p:spPr>
+          <a:xfrm>
+            <a:off x="1143000" y="4314883"/>
+            <a:ext cx="6062250" cy="2085976"/>
+          </a:xfrm>
+        </p:spPr>
+        <p:txBody>
+          <a:bodyPr>
+            <a:normAutofit/>
+          </a:bodyPr>
+          <a:lstStyle/>
+          <a:p>
+            <a:r>
+              <a:rPr lang="en-CA" dirty="0" smtClean="0"/>
+              <a:t>At-a-glance, easy to read and comprehend</a:t>
+            </a:r>
+            <a:endParaRPr lang="en-CA" u="sng" dirty="0" smtClean="0">
+              <a:solidFill>
+                <a:srgbClr val="8ABC49"/>
+              </a:solidFill>
+            </a:endParaRPr>
+          </a:p>
+          <a:p>
+            <a:r>
+              <a:rPr lang="en-CA" u="sng" dirty="0" smtClean="0">
+                <a:solidFill>
+                  <a:srgbClr val="8ABC49"/>
+                </a:solidFill>
+              </a:rPr>
+              <a:t>Template </a:t>
+            </a:r>
+            <a:r>
+              <a:rPr lang="en-CA" dirty="0" smtClean="0">
+                <a:solidFill>
+                  <a:srgbClr val="1CADE4"/>
+                </a:solidFill>
+              </a:rPr>
+              <a:t>and</a:t>
+            </a:r>
+            <a:r>
+              <a:rPr lang="en-CA" u="sng" dirty="0" smtClean="0">
+                <a:solidFill>
+                  <a:srgbClr val="8ABC49"/>
+                </a:solidFill>
+              </a:rPr>
+              <a:t> CSS </a:t>
+            </a:r>
+            <a:r>
+              <a:rPr lang="en-CA" dirty="0" smtClean="0"/>
+              <a:t>can contain syntax highlighting when in separate files</a:t>
+            </a:r>
+            <a:endParaRPr lang="en-CA" u="sng" dirty="0" smtClean="0">
+              <a:solidFill>
+                <a:srgbClr val="8ABC49"/>
+              </a:solidFill>
+            </a:endParaRPr>
           </a:p>
         </p:txBody>
       </p:sp>
     </p:spTree>
     <p:extLst>
       <p:ext uri="{BB962C8B-B14F-4D97-AF65-F5344CB8AC3E}">
-        <p14:creationId xmlns:p14="http://schemas.microsoft.com/office/powerpoint/2010/main" val="3649943815"/>
+        <p14:creationId xmlns:p14="http://schemas.microsoft.com/office/powerpoint/2010/main" val="2180109606"/>
       </p:ext>
     </p:extLst>
   </p:cSld>
@@ -5250,14 +6083,6 @@
 <file path=ppt/slides/slide9.xml><?xml version="1.0" encoding="utf-8"?>
 <p:sld xmlns:a="http://schemas.openxmlformats.org/drawingml/2006/main" xmlns:r="http://schemas.openxmlformats.org/officeDocument/2006/relationships" xmlns:p="http://schemas.openxmlformats.org/presentationml/2006/main">
   <p:cSld>
-    <p:bg>
-      <p:bgPr>
-        <a:solidFill>
-          <a:srgbClr val="1976D2"/>
-        </a:solidFill>
-        <a:effectLst/>
-      </p:bgPr>
-    </p:bg>
     <p:spTree>
       <p:nvGrpSpPr>
         <p:cNvPr id="1" name=""/>
@@ -5296,7 +6121,7 @@
                   </a:schemeClr>
                 </a:solidFill>
               </a:rPr>
-              <a:t>Browser Support</a:t>
+              <a:t>Debugging</a:t>
             </a:r>
             <a:endParaRPr lang="en-US" dirty="0">
               <a:solidFill>
@@ -5324,14 +6149,40 @@
           <a:bodyPr/>
           <a:lstStyle/>
           <a:p>
-            <a:endParaRPr lang="en-US"/>
+            <a:r>
+              <a:rPr lang="en-CA" dirty="0" smtClean="0"/>
+              <a:t>Syntax highlighting occurs for compiler errors</a:t>
+            </a:r>
+          </a:p>
+          <a:p>
+            <a:r>
+              <a:rPr lang="en-CA" dirty="0" smtClean="0"/>
+              <a:t>Runtime errors in browser console are easy to understand and well-documented</a:t>
+            </a:r>
+          </a:p>
+          <a:p>
+            <a:r>
+              <a:rPr lang="en-CA" dirty="0" smtClean="0"/>
+              <a:t>Compiled .MAP files allow for </a:t>
+            </a:r>
+            <a:r>
+              <a:rPr lang="en-CA" dirty="0" err="1" smtClean="0"/>
+              <a:t>TypeScript</a:t>
+            </a:r>
+            <a:r>
+              <a:rPr lang="en-CA" dirty="0" smtClean="0"/>
+              <a:t> debugging</a:t>
+            </a:r>
+          </a:p>
+          <a:p>
+            <a:endParaRPr lang="en-CA" dirty="0" smtClean="0"/>
           </a:p>
         </p:txBody>
       </p:sp>
     </p:spTree>
     <p:extLst>
       <p:ext uri="{BB962C8B-B14F-4D97-AF65-F5344CB8AC3E}">
-        <p14:creationId xmlns:p14="http://schemas.microsoft.com/office/powerpoint/2010/main" val="2415730987"/>
+        <p14:creationId xmlns:p14="http://schemas.microsoft.com/office/powerpoint/2010/main" val="344836450"/>
       </p:ext>
     </p:extLst>
   </p:cSld>

</xml_diff>

<commit_message>
added more the to PPTX
</commit_message>
<xml_diff>
--- a/Angular2.pptx
+++ b/Angular2.pptx
@@ -17,13 +17,11 @@
     <p:sldId id="263" r:id="rId11"/>
     <p:sldId id="264" r:id="rId12"/>
     <p:sldId id="265" r:id="rId13"/>
-    <p:sldId id="266" r:id="rId14"/>
-    <p:sldId id="267" r:id="rId15"/>
-    <p:sldId id="268" r:id="rId16"/>
-    <p:sldId id="269" r:id="rId17"/>
-    <p:sldId id="258" r:id="rId18"/>
-    <p:sldId id="259" r:id="rId19"/>
-    <p:sldId id="260" r:id="rId20"/>
+    <p:sldId id="267" r:id="rId14"/>
+    <p:sldId id="269" r:id="rId15"/>
+    <p:sldId id="258" r:id="rId16"/>
+    <p:sldId id="259" r:id="rId17"/>
+    <p:sldId id="260" r:id="rId18"/>
   </p:sldIdLst>
   <p:sldSz cx="12192000" cy="6858000"/>
   <p:notesSz cx="6858000" cy="9144000"/>
@@ -326,7 +324,7 @@
           <a:p>
             <a:fld id="{96DFF08F-DC6B-4601-B491-B0F83F6DD2DA}" type="datetimeFigureOut">
               <a:rPr lang="en-US" dirty="0"/>
-              <a:t>5/9/2016</a:t>
+              <a:t>5/10/2016</a:t>
             </a:fld>
             <a:endParaRPr lang="en-US" dirty="0"/>
           </a:p>
@@ -542,7 +540,7 @@
           <a:p>
             <a:fld id="{96DFF08F-DC6B-4601-B491-B0F83F6DD2DA}" type="datetimeFigureOut">
               <a:rPr lang="en-US" dirty="0"/>
-              <a:t>5/9/2016</a:t>
+              <a:t>5/10/2016</a:t>
             </a:fld>
             <a:endParaRPr lang="en-US" dirty="0"/>
           </a:p>
@@ -717,7 +715,7 @@
           <a:p>
             <a:fld id="{96DFF08F-DC6B-4601-B491-B0F83F6DD2DA}" type="datetimeFigureOut">
               <a:rPr lang="en-US" dirty="0"/>
-              <a:t>5/9/2016</a:t>
+              <a:t>5/10/2016</a:t>
             </a:fld>
             <a:endParaRPr lang="en-US" dirty="0"/>
           </a:p>
@@ -882,7 +880,7 @@
           <a:p>
             <a:fld id="{96DFF08F-DC6B-4601-B491-B0F83F6DD2DA}" type="datetimeFigureOut">
               <a:rPr lang="en-US" dirty="0"/>
-              <a:t>5/9/2016</a:t>
+              <a:t>5/10/2016</a:t>
             </a:fld>
             <a:endParaRPr lang="en-US" dirty="0"/>
           </a:p>
@@ -1128,7 +1126,7 @@
           <a:p>
             <a:fld id="{96DFF08F-DC6B-4601-B491-B0F83F6DD2DA}" type="datetimeFigureOut">
               <a:rPr lang="en-US" dirty="0"/>
-              <a:t>5/9/2016</a:t>
+              <a:t>5/10/2016</a:t>
             </a:fld>
             <a:endParaRPr lang="en-US" dirty="0"/>
           </a:p>
@@ -1446,7 +1444,7 @@
           <a:p>
             <a:fld id="{96DFF08F-DC6B-4601-B491-B0F83F6DD2DA}" type="datetimeFigureOut">
               <a:rPr lang="en-US" dirty="0"/>
-              <a:t>5/9/2016</a:t>
+              <a:t>5/10/2016</a:t>
             </a:fld>
             <a:endParaRPr lang="en-US" dirty="0"/>
           </a:p>
@@ -1865,7 +1863,7 @@
           <a:p>
             <a:fld id="{96DFF08F-DC6B-4601-B491-B0F83F6DD2DA}" type="datetimeFigureOut">
               <a:rPr lang="en-US" dirty="0"/>
-              <a:t>5/9/2016</a:t>
+              <a:t>5/10/2016</a:t>
             </a:fld>
             <a:endParaRPr lang="en-US" dirty="0"/>
           </a:p>
@@ -1978,7 +1976,7 @@
           <a:p>
             <a:fld id="{96DFF08F-DC6B-4601-B491-B0F83F6DD2DA}" type="datetimeFigureOut">
               <a:rPr lang="en-US" dirty="0"/>
-              <a:t>5/9/2016</a:t>
+              <a:t>5/10/2016</a:t>
             </a:fld>
             <a:endParaRPr lang="en-US" dirty="0"/>
           </a:p>
@@ -2068,7 +2066,7 @@
           <a:p>
             <a:fld id="{96DFF08F-DC6B-4601-B491-B0F83F6DD2DA}" type="datetimeFigureOut">
               <a:rPr lang="en-US" dirty="0"/>
-              <a:t>5/9/2016</a:t>
+              <a:t>5/10/2016</a:t>
             </a:fld>
             <a:endParaRPr lang="en-US" dirty="0"/>
           </a:p>
@@ -2353,7 +2351,7 @@
           <a:p>
             <a:fld id="{96DFF08F-DC6B-4601-B491-B0F83F6DD2DA}" type="datetimeFigureOut">
               <a:rPr lang="en-US" dirty="0"/>
-              <a:t>5/9/2016</a:t>
+              <a:t>5/10/2016</a:t>
             </a:fld>
             <a:endParaRPr lang="en-US" dirty="0"/>
           </a:p>
@@ -2620,7 +2618,7 @@
           <a:p>
             <a:fld id="{96DFF08F-DC6B-4601-B491-B0F83F6DD2DA}" type="datetimeFigureOut">
               <a:rPr lang="en-US" dirty="0"/>
-              <a:t>5/9/2016</a:t>
+              <a:t>5/10/2016</a:t>
             </a:fld>
             <a:endParaRPr lang="en-US" dirty="0"/>
           </a:p>
@@ -2870,7 +2868,7 @@
             <a:fld id="{96DFF08F-DC6B-4601-B491-B0F83F6DD2DA}" type="datetimeFigureOut">
               <a:rPr lang="en-US" dirty="0"/>
               <a:pPr/>
-              <a:t>5/9/2016</a:t>
+              <a:t>5/10/2016</a:t>
             </a:fld>
             <a:endParaRPr lang="en-US" dirty="0"/>
           </a:p>
@@ -3484,7 +3482,7 @@
       </p:sp>
       <p:pic>
         <p:nvPicPr>
-          <p:cNvPr id="6146" name="Picture 2" descr="http://gurustop.net/wp-content/uploads/2015/10/angular2-browser.png"/>
+          <p:cNvPr id="1026" name="Picture 2" descr="https://pbs.twimg.com/media/CQqbS9GVAAATWSj.png:large"/>
           <p:cNvPicPr>
             <a:picLocks noChangeAspect="1" noChangeArrowheads="1"/>
           </p:cNvPicPr>
@@ -3505,8 +3503,8 @@
         </p:blipFill>
         <p:spPr bwMode="auto">
           <a:xfrm>
-            <a:off x="1471436" y="2356304"/>
-            <a:ext cx="9144000" cy="2038350"/>
+            <a:off x="1280160" y="2828030"/>
+            <a:ext cx="9601200" cy="2133601"/>
           </a:xfrm>
           <a:prstGeom prst="rect">
             <a:avLst/>
@@ -3636,14 +3634,65 @@
           <a:p>
             <a:r>
               <a:rPr lang="en-CA" dirty="0"/>
-              <a:t>Can configure to run on live-server which automatically refreshes</a:t>
-            </a:r>
+              <a:t>Can configure to run on live-server which automatically </a:t>
+            </a:r>
+            <a:r>
+              <a:rPr lang="en-CA" dirty="0" smtClean="0"/>
+              <a:t>refreshes</a:t>
+            </a:r>
+          </a:p>
+          <a:p>
+            <a:r>
+              <a:rPr lang="en-CA" dirty="0" smtClean="0">
+                <a:solidFill>
+                  <a:srgbClr val="1CADE4"/>
+                </a:solidFill>
+              </a:rPr>
+              <a:t>Dependency Injection makes objects within the application </a:t>
+            </a:r>
+            <a:r>
+              <a:rPr lang="en-CA" dirty="0" err="1" smtClean="0">
+                <a:solidFill>
+                  <a:srgbClr val="1CADE4"/>
+                </a:solidFill>
+              </a:rPr>
+              <a:t>mockable</a:t>
+            </a:r>
+            <a:endParaRPr lang="en-CA" dirty="0" smtClean="0">
+              <a:solidFill>
+                <a:srgbClr val="1CADE4"/>
+              </a:solidFill>
+            </a:endParaRPr>
+          </a:p>
+          <a:p>
+            <a:r>
+              <a:rPr lang="en-CA" dirty="0" smtClean="0">
+                <a:solidFill>
+                  <a:srgbClr val="1CADE4"/>
+                </a:solidFill>
+              </a:rPr>
+              <a:t>Able to test everything </a:t>
+            </a:r>
+          </a:p>
+          <a:p>
+            <a:r>
+              <a:rPr lang="en-CA" dirty="0" smtClean="0">
+                <a:solidFill>
+                  <a:srgbClr val="1CADE4"/>
+                </a:solidFill>
+              </a:rPr>
+              <a:t>Setup of test framework dependencies can be overwhelming and hard to follow</a:t>
+            </a:r>
+            <a:endParaRPr lang="en-CA" dirty="0" smtClean="0">
+              <a:solidFill>
+                <a:srgbClr val="1CADE4"/>
+              </a:solidFill>
+            </a:endParaRPr>
+          </a:p>
+          <a:p>
             <a:endParaRPr lang="en-CA" dirty="0">
               <a:solidFill>
-                <a:schemeClr val="tx2">
-                  <a:lumMod val="40000"/>
-                  <a:lumOff val="60000"/>
-                </a:schemeClr>
+                <a:srgbClr val="1CADE4"/>
               </a:solidFill>
             </a:endParaRPr>
           </a:p>
@@ -3805,7 +3854,7 @@
                   </a:schemeClr>
                 </a:solidFill>
               </a:rPr>
-              <a:t>Extensibility</a:t>
+              <a:t>Developer Support</a:t>
             </a:r>
             <a:endParaRPr lang="en-US" dirty="0">
               <a:solidFill>
@@ -3840,7 +3889,7 @@
     </p:spTree>
     <p:extLst>
       <p:ext uri="{BB962C8B-B14F-4D97-AF65-F5344CB8AC3E}">
-        <p14:creationId xmlns:p14="http://schemas.microsoft.com/office/powerpoint/2010/main" val="2909597346"/>
+        <p14:creationId xmlns:p14="http://schemas.microsoft.com/office/powerpoint/2010/main" val="3611863778"/>
       </p:ext>
     </p:extLst>
   </p:cSld>
@@ -3899,7 +3948,7 @@
                   </a:schemeClr>
                 </a:solidFill>
               </a:rPr>
-              <a:t>Developer Support</a:t>
+              <a:t>Stability</a:t>
             </a:r>
             <a:endParaRPr lang="en-US" dirty="0">
               <a:solidFill>
@@ -3934,7 +3983,7 @@
     </p:spTree>
     <p:extLst>
       <p:ext uri="{BB962C8B-B14F-4D97-AF65-F5344CB8AC3E}">
-        <p14:creationId xmlns:p14="http://schemas.microsoft.com/office/powerpoint/2010/main" val="3611863778"/>
+        <p14:creationId xmlns:p14="http://schemas.microsoft.com/office/powerpoint/2010/main" val="3609019475"/>
       </p:ext>
     </p:extLst>
   </p:cSld>
@@ -3993,7 +4042,7 @@
                   </a:schemeClr>
                 </a:solidFill>
               </a:rPr>
-              <a:t>Size</a:t>
+              <a:t>Pros</a:t>
             </a:r>
             <a:endParaRPr lang="en-US" dirty="0">
               <a:solidFill>
@@ -4016,19 +4065,125 @@
             <p:ph idx="1"/>
           </p:nvPr>
         </p:nvSpPr>
-        <p:spPr/>
-        <p:txBody>
-          <a:bodyPr/>
-          <a:lstStyle/>
-          <a:p>
-            <a:endParaRPr lang="en-US"/>
+        <p:spPr>
+          <a:xfrm>
+            <a:off x="1143001" y="2057399"/>
+            <a:ext cx="9431448" cy="4596898"/>
+          </a:xfrm>
+        </p:spPr>
+        <p:txBody>
+          <a:bodyPr>
+            <a:normAutofit/>
+          </a:bodyPr>
+          <a:lstStyle/>
+          <a:p>
+            <a:r>
+              <a:rPr lang="en-CA" dirty="0" smtClean="0"/>
+              <a:t>Similar concepts and structure to our backend</a:t>
+            </a:r>
+            <a:endParaRPr lang="en-CA" dirty="0" smtClean="0"/>
+          </a:p>
+          <a:p>
+            <a:r>
+              <a:rPr lang="en-CA" dirty="0" smtClean="0"/>
+              <a:t>Lots </a:t>
+            </a:r>
+            <a:r>
+              <a:rPr lang="en-CA" dirty="0"/>
+              <a:t>of contributors (</a:t>
+            </a:r>
+            <a:r>
+              <a:rPr lang="en-CA" dirty="0">
+                <a:hlinkClick r:id="rId2"/>
+              </a:rPr>
+              <a:t>https://angular.io/about</a:t>
+            </a:r>
+            <a:r>
+              <a:rPr lang="en-CA" dirty="0" smtClean="0">
+                <a:hlinkClick r:id="rId2"/>
+              </a:rPr>
+              <a:t>/</a:t>
+            </a:r>
+            <a:r>
+              <a:rPr lang="en-CA" dirty="0" smtClean="0"/>
+              <a:t>)</a:t>
+            </a:r>
+            <a:endParaRPr lang="en-CA" dirty="0"/>
+          </a:p>
+          <a:p>
+            <a:r>
+              <a:rPr lang="en-CA" dirty="0"/>
+              <a:t>Low </a:t>
+            </a:r>
+            <a:r>
+              <a:rPr lang="en-CA" dirty="0" smtClean="0"/>
+              <a:t>JavaScript fatigue / reduced Churn</a:t>
+            </a:r>
+            <a:endParaRPr lang="en-CA" dirty="0"/>
+          </a:p>
+          <a:p>
+            <a:pPr marL="228600" lvl="1">
+              <a:spcBef>
+                <a:spcPts val="1400"/>
+              </a:spcBef>
+              <a:spcAft>
+                <a:spcPts val="0"/>
+              </a:spcAft>
+            </a:pPr>
+            <a:r>
+              <a:rPr lang="en-CA" sz="2200" dirty="0" smtClean="0"/>
+              <a:t>Advocates </a:t>
+            </a:r>
+            <a:r>
+              <a:rPr lang="en-CA" sz="2200" dirty="0"/>
+              <a:t>for the use of industry best practices such as: dependency injection, unit testing, service layers, interfaces and separation of concerns.  </a:t>
+            </a:r>
+          </a:p>
+          <a:p>
+            <a:r>
+              <a:rPr lang="en-US" dirty="0" smtClean="0"/>
+              <a:t>S</a:t>
+            </a:r>
+            <a:r>
+              <a:rPr lang="en-US" dirty="0"/>
+              <a:t>tatic type checking with </a:t>
+            </a:r>
+            <a:r>
+              <a:rPr lang="en-US" dirty="0" err="1"/>
+              <a:t>TypeScript</a:t>
+            </a:r>
+            <a:endParaRPr lang="en-US" dirty="0"/>
+          </a:p>
+          <a:p>
+            <a:r>
+              <a:rPr lang="en-US" dirty="0" smtClean="0"/>
+              <a:t>Consistent </a:t>
+            </a:r>
+            <a:r>
+              <a:rPr lang="en-US" dirty="0"/>
+              <a:t>documentation</a:t>
+            </a:r>
+            <a:endParaRPr lang="en-US" dirty="0"/>
+          </a:p>
+          <a:p>
+            <a:r>
+              <a:rPr lang="en-US" dirty="0" smtClean="0"/>
+              <a:t>Component structure lends itself to thoughtful coding patterns</a:t>
+            </a:r>
+          </a:p>
+          <a:p>
+            <a:r>
+              <a:rPr lang="en-CA" dirty="0" smtClean="0"/>
+              <a:t>Framework contains almost everything you will need</a:t>
+            </a:r>
+            <a:endParaRPr lang="en-US" dirty="0"/>
           </a:p>
         </p:txBody>
       </p:sp>
     </p:spTree>
     <p:extLst>
       <p:ext uri="{BB962C8B-B14F-4D97-AF65-F5344CB8AC3E}">
-        <p14:creationId xmlns:p14="http://schemas.microsoft.com/office/powerpoint/2010/main" val="669392247"/>
+        <p14:creationId xmlns:p14="http://schemas.microsoft.com/office/powerpoint/2010/main" val="1083996137"/>
       </p:ext>
     </p:extLst>
   </p:cSld>
@@ -4087,7 +4242,7 @@
                   </a:schemeClr>
                 </a:solidFill>
               </a:rPr>
-              <a:t>Stability</a:t>
+              <a:t>Cons</a:t>
             </a:r>
             <a:endParaRPr lang="en-US" dirty="0">
               <a:solidFill>
@@ -4115,14 +4270,132 @@
           <a:bodyPr/>
           <a:lstStyle/>
           <a:p>
-            <a:endParaRPr lang="en-US"/>
+            <a:r>
+              <a:rPr lang="en-CA" u="sng" dirty="0">
+                <a:solidFill>
+                  <a:srgbClr val="8ABC49"/>
+                </a:solidFill>
+              </a:rPr>
+              <a:t>Template</a:t>
+            </a:r>
+            <a:r>
+              <a:rPr lang="en-CA" dirty="0"/>
+              <a:t> </a:t>
+            </a:r>
+            <a:r>
+              <a:rPr lang="en-CA" dirty="0" smtClean="0"/>
+              <a:t>syntax takes some getting used to</a:t>
+            </a:r>
+            <a:endParaRPr lang="en-CA" dirty="0" smtClean="0"/>
+          </a:p>
+          <a:p>
+            <a:r>
+              <a:rPr lang="en-CA" dirty="0" smtClean="0"/>
+              <a:t>No </a:t>
+            </a:r>
+            <a:r>
+              <a:rPr lang="en-CA" dirty="0"/>
+              <a:t>syntax highlighting within </a:t>
+            </a:r>
+            <a:r>
+              <a:rPr lang="en-CA" u="sng" dirty="0">
+                <a:solidFill>
+                  <a:srgbClr val="8ABC49"/>
+                </a:solidFill>
+              </a:rPr>
+              <a:t>Template</a:t>
+            </a:r>
+            <a:r>
+              <a:rPr lang="en-CA" dirty="0"/>
+              <a:t> </a:t>
+            </a:r>
+            <a:r>
+              <a:rPr lang="en-CA" dirty="0" smtClean="0"/>
+              <a:t>or CSS strings</a:t>
+            </a:r>
+          </a:p>
+          <a:p>
+            <a:r>
+              <a:rPr lang="en-CA" dirty="0" smtClean="0"/>
+              <a:t>Many errors are caught at runtime</a:t>
+            </a:r>
+            <a:endParaRPr lang="en-CA" dirty="0"/>
+          </a:p>
+          <a:p>
+            <a:r>
+              <a:rPr lang="en-CA" dirty="0"/>
+              <a:t>Just came out with a release candidate</a:t>
+            </a:r>
+          </a:p>
+          <a:p>
+            <a:r>
+              <a:rPr lang="en-CA" dirty="0"/>
+              <a:t>Modified parts of the API and </a:t>
+            </a:r>
+            <a:r>
+              <a:rPr lang="en-CA" u="sng" dirty="0">
+                <a:solidFill>
+                  <a:srgbClr val="8ABC49"/>
+                </a:solidFill>
+              </a:rPr>
+              <a:t>Template</a:t>
+            </a:r>
+            <a:r>
+              <a:rPr lang="en-CA" dirty="0"/>
+              <a:t> format during our investigation</a:t>
+            </a:r>
+          </a:p>
+          <a:p>
+            <a:r>
+              <a:rPr lang="en-CA" dirty="0"/>
+              <a:t>Some coding errors will not produce runtime or compiler errors </a:t>
+            </a:r>
+            <a:r>
+              <a:rPr lang="en-CA" dirty="0">
+                <a:solidFill>
+                  <a:schemeClr val="tx2">
+                    <a:lumMod val="40000"/>
+                    <a:lumOff val="60000"/>
+                  </a:schemeClr>
+                </a:solidFill>
+              </a:rPr>
+              <a:t>(very uncommon</a:t>
+            </a:r>
+            <a:r>
+              <a:rPr lang="en-CA" dirty="0" smtClean="0">
+                <a:solidFill>
+                  <a:schemeClr val="tx2">
+                    <a:lumMod val="40000"/>
+                    <a:lumOff val="60000"/>
+                  </a:schemeClr>
+                </a:solidFill>
+              </a:rPr>
+              <a:t>)</a:t>
+            </a:r>
+          </a:p>
+          <a:p>
+            <a:r>
+              <a:rPr lang="en-CA" dirty="0" smtClean="0"/>
+              <a:t>Does not contain any built-in handlers for state</a:t>
+            </a:r>
+            <a:endParaRPr lang="en-US" dirty="0">
+              <a:solidFill>
+                <a:schemeClr val="tx2">
+                  <a:lumMod val="40000"/>
+                  <a:lumOff val="60000"/>
+                </a:schemeClr>
+              </a:solidFill>
+            </a:endParaRPr>
+          </a:p>
+          <a:p>
+            <a:endParaRPr lang="en-US" dirty="0"/>
           </a:p>
         </p:txBody>
       </p:sp>
     </p:spTree>
     <p:extLst>
       <p:ext uri="{BB962C8B-B14F-4D97-AF65-F5344CB8AC3E}">
-        <p14:creationId xmlns:p14="http://schemas.microsoft.com/office/powerpoint/2010/main" val="3609019475"/>
+        <p14:creationId xmlns:p14="http://schemas.microsoft.com/office/powerpoint/2010/main" val="1098847303"/>
       </p:ext>
     </p:extLst>
   </p:cSld>
@@ -4181,7 +4454,7 @@
                   </a:schemeClr>
                 </a:solidFill>
               </a:rPr>
-              <a:t>Pros</a:t>
+              <a:t>Sources</a:t>
             </a:r>
             <a:endParaRPr lang="en-US" dirty="0">
               <a:solidFill>
@@ -4204,311 +4477,12 @@
             <p:ph idx="1"/>
           </p:nvPr>
         </p:nvSpPr>
-        <p:spPr/>
-        <p:txBody>
-          <a:bodyPr/>
-          <a:lstStyle/>
-          <a:p>
-            <a:r>
-              <a:rPr lang="en-CA" dirty="0"/>
-              <a:t>Lots of contributors (</a:t>
-            </a:r>
-            <a:r>
-              <a:rPr lang="en-CA" dirty="0">
-                <a:hlinkClick r:id="rId2"/>
-              </a:rPr>
-              <a:t>https://angular.io/about/</a:t>
-            </a:r>
-            <a:r>
-              <a:rPr lang="en-CA" dirty="0"/>
-              <a:t>) and many large websites are using it!</a:t>
-            </a:r>
-          </a:p>
-          <a:p>
-            <a:r>
-              <a:rPr lang="en-CA" dirty="0"/>
-              <a:t>Low decision fatigue</a:t>
-            </a:r>
-          </a:p>
-          <a:p>
-            <a:pPr marL="228600" lvl="1">
-              <a:spcBef>
-                <a:spcPts val="1400"/>
-              </a:spcBef>
-              <a:spcAft>
-                <a:spcPts val="0"/>
-              </a:spcAft>
-            </a:pPr>
-            <a:r>
-              <a:rPr lang="en-CA" dirty="0"/>
-              <a:t>Opinionated documentation advocates for the use of industry best practices such as: dependency injection, unit testing, service layers, interfaces and separation of concerns.  </a:t>
-            </a:r>
-          </a:p>
-          <a:p>
-            <a:r>
-              <a:rPr lang="en-US" dirty="0" err="1"/>
-              <a:t>TypeScript</a:t>
-            </a:r>
-            <a:r>
-              <a:rPr lang="en-US" dirty="0"/>
-              <a:t> – consistent documentation</a:t>
-            </a:r>
-          </a:p>
-          <a:p>
-            <a:r>
-              <a:rPr lang="en-US" dirty="0"/>
-              <a:t>Reduced Churn</a:t>
-            </a:r>
-          </a:p>
-          <a:p>
-            <a:r>
-              <a:rPr lang="en-US" dirty="0"/>
-              <a:t>Web </a:t>
-            </a:r>
-            <a:r>
-              <a:rPr lang="en-US"/>
-              <a:t>component friendly</a:t>
-            </a:r>
-            <a:endParaRPr lang="en-US" dirty="0"/>
-          </a:p>
-        </p:txBody>
-      </p:sp>
-    </p:spTree>
-    <p:extLst>
-      <p:ext uri="{BB962C8B-B14F-4D97-AF65-F5344CB8AC3E}">
-        <p14:creationId xmlns:p14="http://schemas.microsoft.com/office/powerpoint/2010/main" val="1083996137"/>
-      </p:ext>
-    </p:extLst>
-  </p:cSld>
-  <p:clrMapOvr>
-    <a:masterClrMapping/>
-  </p:clrMapOvr>
-</p:sld>
-</file>
-
-<file path=ppt/slides/slide18.xml><?xml version="1.0" encoding="utf-8"?>
-<p:sld xmlns:a="http://schemas.openxmlformats.org/drawingml/2006/main" xmlns:r="http://schemas.openxmlformats.org/officeDocument/2006/relationships" xmlns:p="http://schemas.openxmlformats.org/presentationml/2006/main">
-  <p:cSld>
-    <p:bg>
-      <p:bgPr>
-        <a:solidFill>
-          <a:srgbClr val="1976D2"/>
-        </a:solidFill>
-        <a:effectLst/>
-      </p:bgPr>
-    </p:bg>
-    <p:spTree>
-      <p:nvGrpSpPr>
-        <p:cNvPr id="1" name=""/>
-        <p:cNvGrpSpPr/>
-        <p:nvPr/>
-      </p:nvGrpSpPr>
-      <p:grpSpPr>
-        <a:xfrm>
-          <a:off x="0" y="0"/>
-          <a:ext cx="0" cy="0"/>
-          <a:chOff x="0" y="0"/>
-          <a:chExt cx="0" cy="0"/>
-        </a:xfrm>
-      </p:grpSpPr>
-      <p:sp>
-        <p:nvSpPr>
-          <p:cNvPr id="2" name="Title 1"/>
-          <p:cNvSpPr>
-            <a:spLocks noGrp="1"/>
-          </p:cNvSpPr>
-          <p:nvPr>
-            <p:ph type="title"/>
-          </p:nvPr>
-        </p:nvSpPr>
-        <p:spPr/>
-        <p:txBody>
-          <a:bodyPr/>
-          <a:lstStyle/>
-          <a:p>
-            <a:r>
-              <a:rPr lang="en-CA" dirty="0">
-                <a:solidFill>
-                  <a:schemeClr val="tx1">
-                    <a:lumMod val="50000"/>
-                    <a:lumOff val="50000"/>
-                  </a:schemeClr>
-                </a:solidFill>
-              </a:rPr>
-              <a:t>Cons</a:t>
-            </a:r>
-            <a:endParaRPr lang="en-US" dirty="0">
-              <a:solidFill>
-                <a:schemeClr val="tx1">
-                  <a:lumMod val="50000"/>
-                  <a:lumOff val="50000"/>
-                </a:schemeClr>
-              </a:solidFill>
-            </a:endParaRPr>
-          </a:p>
-        </p:txBody>
-      </p:sp>
-      <p:sp>
-        <p:nvSpPr>
-          <p:cNvPr id="3" name="Content Placeholder 2"/>
-          <p:cNvSpPr>
-            <a:spLocks noGrp="1"/>
-          </p:cNvSpPr>
-          <p:nvPr>
-            <p:ph idx="1"/>
-          </p:nvPr>
-        </p:nvSpPr>
-        <p:spPr/>
-        <p:txBody>
-          <a:bodyPr/>
-          <a:lstStyle/>
-          <a:p>
-            <a:r>
-              <a:rPr lang="en-CA" dirty="0"/>
-              <a:t>No syntax highlighting within </a:t>
-            </a:r>
-            <a:r>
-              <a:rPr lang="en-CA" u="sng" dirty="0">
-                <a:solidFill>
-                  <a:srgbClr val="8ABC49"/>
-                </a:solidFill>
-              </a:rPr>
-              <a:t>Template</a:t>
-            </a:r>
-            <a:r>
-              <a:rPr lang="en-CA" dirty="0"/>
-              <a:t> strings</a:t>
-            </a:r>
-          </a:p>
-          <a:p>
-            <a:r>
-              <a:rPr lang="en-CA" dirty="0"/>
-              <a:t>Just came out with a release candidate</a:t>
-            </a:r>
-          </a:p>
-          <a:p>
-            <a:r>
-              <a:rPr lang="en-CA" dirty="0"/>
-              <a:t>Modified parts of the API and </a:t>
-            </a:r>
-            <a:r>
-              <a:rPr lang="en-CA" u="sng" dirty="0">
-                <a:solidFill>
-                  <a:srgbClr val="8ABC49"/>
-                </a:solidFill>
-              </a:rPr>
-              <a:t>Template</a:t>
-            </a:r>
-            <a:r>
-              <a:rPr lang="en-CA" dirty="0"/>
-              <a:t> format during our investigation</a:t>
-            </a:r>
-          </a:p>
-          <a:p>
-            <a:r>
-              <a:rPr lang="en-CA" dirty="0"/>
-              <a:t>Some coding errors will not produce runtime or compiler errors (very uncommon)</a:t>
-            </a:r>
-            <a:endParaRPr lang="en-US" dirty="0">
-              <a:solidFill>
-                <a:schemeClr val="tx2">
-                  <a:lumMod val="40000"/>
-                  <a:lumOff val="60000"/>
-                </a:schemeClr>
-              </a:solidFill>
-            </a:endParaRPr>
-          </a:p>
-          <a:p>
-            <a:endParaRPr lang="en-US" dirty="0"/>
-          </a:p>
-        </p:txBody>
-      </p:sp>
-    </p:spTree>
-    <p:extLst>
-      <p:ext uri="{BB962C8B-B14F-4D97-AF65-F5344CB8AC3E}">
-        <p14:creationId xmlns:p14="http://schemas.microsoft.com/office/powerpoint/2010/main" val="1098847303"/>
-      </p:ext>
-    </p:extLst>
-  </p:cSld>
-  <p:clrMapOvr>
-    <a:masterClrMapping/>
-  </p:clrMapOvr>
-</p:sld>
-</file>
-
-<file path=ppt/slides/slide19.xml><?xml version="1.0" encoding="utf-8"?>
-<p:sld xmlns:a="http://schemas.openxmlformats.org/drawingml/2006/main" xmlns:r="http://schemas.openxmlformats.org/officeDocument/2006/relationships" xmlns:p="http://schemas.openxmlformats.org/presentationml/2006/main">
-  <p:cSld>
-    <p:bg>
-      <p:bgPr>
-        <a:solidFill>
-          <a:srgbClr val="1976D2"/>
-        </a:solidFill>
-        <a:effectLst/>
-      </p:bgPr>
-    </p:bg>
-    <p:spTree>
-      <p:nvGrpSpPr>
-        <p:cNvPr id="1" name=""/>
-        <p:cNvGrpSpPr/>
-        <p:nvPr/>
-      </p:nvGrpSpPr>
-      <p:grpSpPr>
-        <a:xfrm>
-          <a:off x="0" y="0"/>
-          <a:ext cx="0" cy="0"/>
-          <a:chOff x="0" y="0"/>
-          <a:chExt cx="0" cy="0"/>
-        </a:xfrm>
-      </p:grpSpPr>
-      <p:sp>
-        <p:nvSpPr>
-          <p:cNvPr id="2" name="Title 1"/>
-          <p:cNvSpPr>
-            <a:spLocks noGrp="1"/>
-          </p:cNvSpPr>
-          <p:nvPr>
-            <p:ph type="title"/>
-          </p:nvPr>
-        </p:nvSpPr>
-        <p:spPr/>
-        <p:txBody>
-          <a:bodyPr/>
-          <a:lstStyle/>
-          <a:p>
-            <a:r>
-              <a:rPr lang="en-CA" dirty="0">
-                <a:solidFill>
-                  <a:schemeClr val="tx1">
-                    <a:lumMod val="50000"/>
-                    <a:lumOff val="50000"/>
-                  </a:schemeClr>
-                </a:solidFill>
-              </a:rPr>
-              <a:t>Sources</a:t>
-            </a:r>
-            <a:endParaRPr lang="en-US" dirty="0">
-              <a:solidFill>
-                <a:schemeClr val="tx1">
-                  <a:lumMod val="50000"/>
-                  <a:lumOff val="50000"/>
-                </a:schemeClr>
-              </a:solidFill>
-            </a:endParaRPr>
-          </a:p>
-        </p:txBody>
-      </p:sp>
-      <p:sp>
-        <p:nvSpPr>
-          <p:cNvPr id="3" name="Content Placeholder 2"/>
-          <p:cNvSpPr>
-            <a:spLocks noGrp="1"/>
-          </p:cNvSpPr>
-          <p:nvPr>
-            <p:ph idx="1"/>
-          </p:nvPr>
-        </p:nvSpPr>
-        <p:spPr/>
+        <p:spPr>
+          <a:xfrm>
+            <a:off x="1136195" y="2057400"/>
+            <a:ext cx="9872871" cy="4038600"/>
+          </a:xfrm>
+        </p:spPr>
         <p:txBody>
           <a:bodyPr/>
           <a:lstStyle/>
@@ -4535,8 +4509,50 @@
               <a:rPr lang="en-US" dirty="0">
                 <a:hlinkClick r:id="rId4"/>
               </a:rPr>
-              <a:t>http://www.gurustop.net/blog/2015/10/07/angularjs2-internet-explorer-support</a:t>
-            </a:r>
+              <a:t>http://</a:t>
+            </a:r>
+            <a:r>
+              <a:rPr lang="en-US" dirty="0" smtClean="0">
+                <a:hlinkClick r:id="rId4"/>
+              </a:rPr>
+              <a:t>www.gurustop.net/blog/2015/10/07/angularjs2-internet-explorer-support</a:t>
+            </a:r>
+            <a:endParaRPr lang="en-US" dirty="0" smtClean="0"/>
+          </a:p>
+          <a:p>
+            <a:r>
+              <a:rPr lang="en-US" dirty="0">
+                <a:hlinkClick r:id="rId5"/>
+              </a:rPr>
+              <a:t>https://</a:t>
+            </a:r>
+            <a:r>
+              <a:rPr lang="en-US" dirty="0" smtClean="0">
+                <a:hlinkClick r:id="rId5"/>
+              </a:rPr>
+              <a:t>medium.freecodecamp.com/angular-2-versus-react-there-will-be-blood-66595faafd51</a:t>
+            </a:r>
+            <a:endParaRPr lang="en-US" dirty="0" smtClean="0"/>
+          </a:p>
+          <a:p>
+            <a:r>
+              <a:rPr lang="en-US" dirty="0">
+                <a:hlinkClick r:id="rId6"/>
+              </a:rPr>
+              <a:t>http://</a:t>
+            </a:r>
+            <a:r>
+              <a:rPr lang="en-US" dirty="0" smtClean="0">
+                <a:hlinkClick r:id="rId6"/>
+              </a:rPr>
+              <a:t>www.syntaxsuccess.com/viewarticle/angular-2.0-unit-testing</a:t>
+            </a:r>
+            <a:endParaRPr lang="en-US" dirty="0" smtClean="0"/>
+          </a:p>
+          <a:p>
+            <a:endParaRPr lang="en-US" dirty="0" smtClean="0"/>
+          </a:p>
+          <a:p>
             <a:endParaRPr lang="en-US" dirty="0"/>
           </a:p>
           <a:p>
@@ -4769,7 +4785,7 @@
           <a:lstStyle/>
           <a:p>
             <a:r>
-              <a:rPr lang="en-CA" dirty="0">
+              <a:rPr lang="en-CA" dirty="0" smtClean="0">
                 <a:solidFill>
                   <a:schemeClr val="tx1">
                     <a:lumMod val="50000"/>
@@ -4777,7 +4793,7 @@
                   </a:schemeClr>
                 </a:solidFill>
               </a:rPr>
-              <a:t>Architecture</a:t>
+              <a:t>Fundamentals</a:t>
             </a:r>
             <a:endParaRPr lang="en-US" dirty="0">
               <a:solidFill>
@@ -4993,7 +5009,23 @@
             </a:r>
             <a:r>
               <a:rPr lang="en-CA" dirty="0"/>
-              <a:t> contain a template defined in its   metadata</a:t>
+              <a:t> contain a </a:t>
+            </a:r>
+            <a:r>
+              <a:rPr lang="en-CA" u="sng" dirty="0" smtClean="0">
+                <a:solidFill>
+                  <a:srgbClr val="8ABC49"/>
+                </a:solidFill>
+              </a:rPr>
+              <a:t>Template</a:t>
+            </a:r>
+            <a:r>
+              <a:rPr lang="en-CA" dirty="0" smtClean="0"/>
+              <a:t> </a:t>
+            </a:r>
+            <a:r>
+              <a:rPr lang="en-CA" dirty="0"/>
+              <a:t>defined in its   metadata</a:t>
             </a:r>
           </a:p>
           <a:p>
@@ -5010,7 +5042,7 @@
               <a:t> may contain </a:t>
             </a:r>
             <a:r>
-              <a:rPr lang="en-CA" u="sng" dirty="0">
+              <a:rPr lang="en-CA" u="sng" dirty="0" smtClean="0">
                 <a:solidFill>
                   <a:srgbClr val="8ABC49"/>
                 </a:solidFill>
@@ -5018,17 +5050,14 @@
               <a:t>Directives</a:t>
             </a:r>
             <a:r>
-              <a:rPr lang="en-CA" dirty="0"/>
-              <a:t>, which instruct the framework to load a specific </a:t>
-            </a:r>
-            <a:r>
-              <a:rPr lang="en-CA" u="sng" dirty="0">
-                <a:solidFill>
-                  <a:srgbClr val="8ABC49"/>
-                </a:solidFill>
-              </a:rPr>
-              <a:t>Component</a:t>
-            </a:r>
+              <a:rPr lang="en-CA" dirty="0" smtClean="0"/>
+              <a:t> which change the behaviour or appearance of the DOM</a:t>
+            </a:r>
+            <a:endParaRPr lang="en-CA" u="sng" dirty="0">
+              <a:solidFill>
+                <a:srgbClr val="8ABC49"/>
+              </a:solidFill>
+            </a:endParaRPr>
           </a:p>
         </p:txBody>
       </p:sp>
@@ -5383,7 +5412,7 @@
         <p:spPr>
           <a:xfrm>
             <a:off x="5414403" y="2734091"/>
-            <a:ext cx="6062250" cy="3013565"/>
+            <a:ext cx="6237408" cy="3013565"/>
           </a:xfrm>
         </p:spPr>
         <p:txBody>
@@ -5402,7 +5431,19 @@
             </a:r>
             <a:r>
               <a:rPr lang="en-CA" dirty="0"/>
-              <a:t>contain your business logic and make requests to your server endpoints</a:t>
+              <a:t>contain your business logic and </a:t>
+            </a:r>
+            <a:r>
+              <a:rPr lang="en-CA" dirty="0" smtClean="0"/>
+              <a:t>commonly make requests </a:t>
+            </a:r>
+            <a:r>
+              <a:rPr lang="en-CA" dirty="0"/>
+              <a:t>to your </a:t>
+            </a:r>
+            <a:r>
+              <a:rPr lang="en-CA" dirty="0" smtClean="0"/>
+              <a:t>server</a:t>
             </a:r>
             <a:endParaRPr lang="en-CA" u="sng" dirty="0">
               <a:solidFill>
@@ -5421,15 +5462,15 @@
             </a:r>
             <a:r>
               <a:rPr lang="en-CA" dirty="0"/>
-              <a:t>are commonly</a:t>
-            </a:r>
-            <a:r>
-              <a:rPr lang="en-CA" u="sng" dirty="0">
+              <a:t>are </a:t>
+            </a:r>
+            <a:r>
+              <a:rPr lang="en-CA" u="sng" dirty="0" smtClean="0">
                 <a:solidFill>
                   <a:srgbClr val="8ABC49"/>
                 </a:solidFill>
               </a:rPr>
-              <a:t> Injected </a:t>
+              <a:t>Injected </a:t>
             </a:r>
             <a:r>
               <a:rPr lang="en-CA" dirty="0"/>
@@ -5598,7 +5639,12 @@
             <p:ph idx="1"/>
           </p:nvPr>
         </p:nvSpPr>
-        <p:spPr/>
+        <p:spPr>
+          <a:xfrm>
+            <a:off x="1143000" y="2057399"/>
+            <a:ext cx="9872871" cy="4334347"/>
+          </a:xfrm>
+        </p:spPr>
         <p:txBody>
           <a:bodyPr>
             <a:normAutofit/>
@@ -5607,8 +5653,19 @@
           <a:p>
             <a:r>
               <a:rPr lang="en-CA" dirty="0"/>
-              <a:t>Fairly easy to pick</a:t>
-            </a:r>
+              <a:t>Fairly easy to </a:t>
+            </a:r>
+            <a:r>
+              <a:rPr lang="en-CA" dirty="0" smtClean="0"/>
+              <a:t>pick</a:t>
+            </a:r>
+          </a:p>
+          <a:p>
+            <a:r>
+              <a:rPr lang="en-CA" dirty="0" smtClean="0"/>
+              <a:t>Has similar concepts and structure to our backend</a:t>
+            </a:r>
+            <a:endParaRPr lang="en-CA" dirty="0"/>
           </a:p>
           <a:p>
             <a:r>
@@ -5705,7 +5762,7 @@
               <a:t>AngularJs</a:t>
             </a:r>
             <a:r>
-              <a:rPr lang="en-CA" dirty="0">
+              <a:rPr lang="en-CA" dirty="0" smtClean="0">
                 <a:solidFill>
                   <a:schemeClr val="tx2">
                     <a:lumMod val="40000"/>
@@ -5718,16 +5775,10 @@
           </a:p>
           <a:p>
             <a:r>
-              <a:rPr lang="en-CA" dirty="0"/>
-              <a:t>HTML template syntax gets some getting used to</a:t>
-            </a:r>
-          </a:p>
-          <a:p>
-            <a:r>
-              <a:rPr lang="en-CA" dirty="0"/>
-              <a:t>Positive changes have been made to their template API since we began</a:t>
-            </a:r>
-            <a:endParaRPr lang="en-CA" u="sng" dirty="0">
+              <a:rPr lang="en-CA" dirty="0" smtClean="0"/>
+              <a:t>Stack overflow / Gits repos might be outdated due to changes during beta</a:t>
+            </a:r>
+            <a:endParaRPr lang="en-CA" dirty="0">
               <a:solidFill>
                 <a:schemeClr val="tx2">
                   <a:lumMod val="40000"/>
@@ -5735,6 +5786,38 @@
                 </a:schemeClr>
               </a:solidFill>
             </a:endParaRPr>
+          </a:p>
+          <a:p>
+            <a:r>
+              <a:rPr lang="en-CA" dirty="0"/>
+              <a:t>HTML template syntax gets some getting used to</a:t>
+            </a:r>
+          </a:p>
+          <a:p>
+            <a:r>
+              <a:rPr lang="en-CA" dirty="0"/>
+              <a:t>Positive changes have been made to their </a:t>
+            </a:r>
+            <a:r>
+              <a:rPr lang="en-CA" u="sng" dirty="0" smtClean="0">
+                <a:solidFill>
+                  <a:srgbClr val="8ABC49"/>
+                </a:solidFill>
+              </a:rPr>
+              <a:t>Template</a:t>
+            </a:r>
+            <a:r>
+              <a:rPr lang="en-CA" dirty="0" smtClean="0"/>
+              <a:t> </a:t>
+            </a:r>
+            <a:r>
+              <a:rPr lang="en-CA" dirty="0"/>
+              <a:t>API since we </a:t>
+            </a:r>
+            <a:r>
+              <a:rPr lang="en-CA" dirty="0" smtClean="0"/>
+              <a:t>began</a:t>
+            </a:r>
           </a:p>
         </p:txBody>
       </p:sp>
@@ -5813,9 +5896,58 @@
           </a:p>
         </p:txBody>
       </p:sp>
+      <p:sp>
+        <p:nvSpPr>
+          <p:cNvPr id="5" name="Content Placeholder 2"/>
+          <p:cNvSpPr>
+            <a:spLocks noGrp="1"/>
+          </p:cNvSpPr>
+          <p:nvPr>
+            <p:ph idx="1"/>
+          </p:nvPr>
+        </p:nvSpPr>
+        <p:spPr>
+          <a:xfrm>
+            <a:off x="6689576" y="5329566"/>
+            <a:ext cx="5004955" cy="931807"/>
+          </a:xfrm>
+        </p:spPr>
+        <p:txBody>
+          <a:bodyPr>
+            <a:normAutofit/>
+          </a:bodyPr>
+          <a:lstStyle/>
+          <a:p>
+            <a:r>
+              <a:rPr lang="en-CA" dirty="0" smtClean="0"/>
+              <a:t>Code is easy </a:t>
+            </a:r>
+            <a:r>
+              <a:rPr lang="en-CA" dirty="0"/>
+              <a:t>to read and comprehend</a:t>
+            </a:r>
+            <a:endParaRPr lang="en-CA" u="sng" dirty="0">
+              <a:solidFill>
+                <a:srgbClr val="8ABC49"/>
+              </a:solidFill>
+            </a:endParaRPr>
+          </a:p>
+          <a:p>
+            <a:r>
+              <a:rPr lang="en-CA" dirty="0" smtClean="0"/>
+              <a:t>Favors composition over inheritance</a:t>
+            </a:r>
+            <a:endParaRPr lang="en-CA" u="sng" dirty="0">
+              <a:solidFill>
+                <a:srgbClr val="8ABC49"/>
+              </a:solidFill>
+            </a:endParaRPr>
+          </a:p>
+        </p:txBody>
+      </p:sp>
       <p:pic>
         <p:nvPicPr>
-          <p:cNvPr id="4" name="Picture 3"/>
+          <p:cNvPr id="3" name="Picture 2"/>
           <p:cNvPicPr>
             <a:picLocks noChangeAspect="1"/>
           </p:cNvPicPr>
@@ -5835,8 +5967,8 @@
         </p:blipFill>
         <p:spPr>
           <a:xfrm>
-            <a:off x="1143000" y="1965960"/>
-            <a:ext cx="5505450" cy="2038350"/>
+            <a:off x="614779" y="1965960"/>
+            <a:ext cx="5865385" cy="3149200"/>
           </a:xfrm>
           <a:prstGeom prst="rect">
             <a:avLst/>
@@ -5845,29 +5977,277 @@
       </p:pic>
       <p:sp>
         <p:nvSpPr>
-          <p:cNvPr id="5" name="Content Placeholder 2"/>
-          <p:cNvSpPr>
-            <a:spLocks noGrp="1"/>
-          </p:cNvSpPr>
-          <p:nvPr>
-            <p:ph idx="1"/>
-          </p:nvPr>
+          <p:cNvPr id="6" name="Content Placeholder 2"/>
+          <p:cNvSpPr txBox="1">
+            <a:spLocks/>
+          </p:cNvSpPr>
+          <p:nvPr/>
         </p:nvSpPr>
         <p:spPr>
           <a:xfrm>
-            <a:off x="1143000" y="4314883"/>
-            <a:ext cx="6062250" cy="2085976"/>
+            <a:off x="614779" y="5329566"/>
+            <a:ext cx="6062250" cy="1528434"/>
           </a:xfrm>
+          <a:prstGeom prst="rect">
+            <a:avLst/>
+          </a:prstGeom>
         </p:spPr>
         <p:txBody>
-          <a:bodyPr>
+          <a:bodyPr vert="horz" lIns="91440" tIns="45720" rIns="91440" bIns="45720" rtlCol="0">
             <a:normAutofit/>
           </a:bodyPr>
-          <a:lstStyle/>
-          <a:p>
-            <a:r>
-              <a:rPr lang="en-CA" dirty="0"/>
-              <a:t>At-a-glance, easy to read and comprehend</a:t>
+          <a:lstStyle>
+            <a:lvl1pPr marL="228600" indent="-182880" algn="l" defTabSz="914400" rtl="0" eaLnBrk="1" latinLnBrk="0" hangingPunct="1">
+              <a:lnSpc>
+                <a:spcPct val="90000"/>
+              </a:lnSpc>
+              <a:spcBef>
+                <a:spcPts val="1400"/>
+              </a:spcBef>
+              <a:buClr>
+                <a:schemeClr val="accent1"/>
+              </a:buClr>
+              <a:buSzPct val="80000"/>
+              <a:buFont typeface="Corbel" pitchFamily="34" charset="0"/>
+              <a:buChar char="•"/>
+              <a:defRPr sz="2200" kern="1200">
+                <a:solidFill>
+                  <a:schemeClr val="accent1"/>
+                </a:solidFill>
+                <a:latin typeface="+mn-lt"/>
+                <a:ea typeface="+mn-ea"/>
+                <a:cs typeface="+mn-cs"/>
+              </a:defRPr>
+            </a:lvl1pPr>
+            <a:lvl2pPr marL="457200" indent="-182880" algn="l" defTabSz="914400" rtl="0" eaLnBrk="1" latinLnBrk="0" hangingPunct="1">
+              <a:lnSpc>
+                <a:spcPct val="90000"/>
+              </a:lnSpc>
+              <a:spcBef>
+                <a:spcPts val="200"/>
+              </a:spcBef>
+              <a:spcAft>
+                <a:spcPts val="400"/>
+              </a:spcAft>
+              <a:buClr>
+                <a:schemeClr val="accent1"/>
+              </a:buClr>
+              <a:buSzPct val="80000"/>
+              <a:buFont typeface="Corbel" pitchFamily="34" charset="0"/>
+              <a:buChar char="•"/>
+              <a:defRPr sz="2000" kern="1200">
+                <a:solidFill>
+                  <a:schemeClr val="accent1"/>
+                </a:solidFill>
+                <a:latin typeface="+mn-lt"/>
+                <a:ea typeface="+mn-ea"/>
+                <a:cs typeface="+mn-cs"/>
+              </a:defRPr>
+            </a:lvl2pPr>
+            <a:lvl3pPr marL="731520" indent="-182880" algn="l" defTabSz="914400" rtl="0" eaLnBrk="1" latinLnBrk="0" hangingPunct="1">
+              <a:lnSpc>
+                <a:spcPct val="90000"/>
+              </a:lnSpc>
+              <a:spcBef>
+                <a:spcPts val="200"/>
+              </a:spcBef>
+              <a:spcAft>
+                <a:spcPts val="400"/>
+              </a:spcAft>
+              <a:buClr>
+                <a:schemeClr val="accent1"/>
+              </a:buClr>
+              <a:buSzPct val="80000"/>
+              <a:buFont typeface="Corbel" pitchFamily="34" charset="0"/>
+              <a:buChar char="•"/>
+              <a:defRPr sz="1800" kern="1200">
+                <a:solidFill>
+                  <a:schemeClr val="accent1"/>
+                </a:solidFill>
+                <a:latin typeface="+mn-lt"/>
+                <a:ea typeface="+mn-ea"/>
+                <a:cs typeface="+mn-cs"/>
+              </a:defRPr>
+            </a:lvl3pPr>
+            <a:lvl4pPr marL="1005840" indent="-182880" algn="l" defTabSz="914400" rtl="0" eaLnBrk="1" latinLnBrk="0" hangingPunct="1">
+              <a:lnSpc>
+                <a:spcPct val="90000"/>
+              </a:lnSpc>
+              <a:spcBef>
+                <a:spcPts val="200"/>
+              </a:spcBef>
+              <a:spcAft>
+                <a:spcPts val="400"/>
+              </a:spcAft>
+              <a:buClr>
+                <a:schemeClr val="accent1"/>
+              </a:buClr>
+              <a:buSzPct val="80000"/>
+              <a:buFont typeface="Corbel" pitchFamily="34" charset="0"/>
+              <a:buChar char="•"/>
+              <a:defRPr sz="1600" kern="1200">
+                <a:solidFill>
+                  <a:schemeClr val="accent1"/>
+                </a:solidFill>
+                <a:latin typeface="+mn-lt"/>
+                <a:ea typeface="+mn-ea"/>
+                <a:cs typeface="+mn-cs"/>
+              </a:defRPr>
+            </a:lvl4pPr>
+            <a:lvl5pPr marL="1280160" indent="-182880" algn="l" defTabSz="914400" rtl="0" eaLnBrk="1" latinLnBrk="0" hangingPunct="1">
+              <a:lnSpc>
+                <a:spcPct val="90000"/>
+              </a:lnSpc>
+              <a:spcBef>
+                <a:spcPts val="200"/>
+              </a:spcBef>
+              <a:spcAft>
+                <a:spcPts val="400"/>
+              </a:spcAft>
+              <a:buClr>
+                <a:schemeClr val="accent1"/>
+              </a:buClr>
+              <a:buSzPct val="80000"/>
+              <a:buFont typeface="Corbel" pitchFamily="34" charset="0"/>
+              <a:buChar char="•"/>
+              <a:defRPr sz="1600" kern="1200">
+                <a:solidFill>
+                  <a:schemeClr val="accent1"/>
+                </a:solidFill>
+                <a:latin typeface="+mn-lt"/>
+                <a:ea typeface="+mn-ea"/>
+                <a:cs typeface="+mn-cs"/>
+              </a:defRPr>
+            </a:lvl5pPr>
+            <a:lvl6pPr marL="1600000" indent="-228600" algn="l" defTabSz="914400" rtl="0" eaLnBrk="1" latinLnBrk="0" hangingPunct="1">
+              <a:lnSpc>
+                <a:spcPct val="90000"/>
+              </a:lnSpc>
+              <a:spcBef>
+                <a:spcPts val="200"/>
+              </a:spcBef>
+              <a:spcAft>
+                <a:spcPts val="400"/>
+              </a:spcAft>
+              <a:buClr>
+                <a:schemeClr val="accent1"/>
+              </a:buClr>
+              <a:buSzPct val="80000"/>
+              <a:buFont typeface="Corbel" pitchFamily="34" charset="0"/>
+              <a:buChar char="•"/>
+              <a:defRPr sz="1600" kern="1200">
+                <a:solidFill>
+                  <a:schemeClr val="accent1"/>
+                </a:solidFill>
+                <a:latin typeface="+mn-lt"/>
+                <a:ea typeface="+mn-ea"/>
+                <a:cs typeface="+mn-cs"/>
+              </a:defRPr>
+            </a:lvl6pPr>
+            <a:lvl7pPr marL="1900000" indent="-228600" algn="l" defTabSz="914400" rtl="0" eaLnBrk="1" latinLnBrk="0" hangingPunct="1">
+              <a:lnSpc>
+                <a:spcPct val="90000"/>
+              </a:lnSpc>
+              <a:spcBef>
+                <a:spcPts val="200"/>
+              </a:spcBef>
+              <a:spcAft>
+                <a:spcPts val="400"/>
+              </a:spcAft>
+              <a:buClr>
+                <a:schemeClr val="accent1"/>
+              </a:buClr>
+              <a:buSzPct val="80000"/>
+              <a:buFont typeface="Corbel" pitchFamily="34" charset="0"/>
+              <a:buChar char="•"/>
+              <a:defRPr sz="1600" kern="1200">
+                <a:solidFill>
+                  <a:schemeClr val="accent1"/>
+                </a:solidFill>
+                <a:latin typeface="+mn-lt"/>
+                <a:ea typeface="+mn-ea"/>
+                <a:cs typeface="+mn-cs"/>
+              </a:defRPr>
+            </a:lvl7pPr>
+            <a:lvl8pPr marL="2200000" indent="-228600" algn="l" defTabSz="914400" rtl="0" eaLnBrk="1" latinLnBrk="0" hangingPunct="1">
+              <a:lnSpc>
+                <a:spcPct val="90000"/>
+              </a:lnSpc>
+              <a:spcBef>
+                <a:spcPts val="200"/>
+              </a:spcBef>
+              <a:spcAft>
+                <a:spcPts val="400"/>
+              </a:spcAft>
+              <a:buClr>
+                <a:schemeClr val="accent1"/>
+              </a:buClr>
+              <a:buSzPct val="80000"/>
+              <a:buFont typeface="Corbel" pitchFamily="34" charset="0"/>
+              <a:buChar char="•"/>
+              <a:defRPr sz="1600" kern="1200">
+                <a:solidFill>
+                  <a:schemeClr val="accent1"/>
+                </a:solidFill>
+                <a:latin typeface="+mn-lt"/>
+                <a:ea typeface="+mn-ea"/>
+                <a:cs typeface="+mn-cs"/>
+              </a:defRPr>
+            </a:lvl8pPr>
+            <a:lvl9pPr marL="2500000" indent="-228600" algn="l" defTabSz="914400" rtl="0" eaLnBrk="1" latinLnBrk="0" hangingPunct="1">
+              <a:lnSpc>
+                <a:spcPct val="90000"/>
+              </a:lnSpc>
+              <a:spcBef>
+                <a:spcPts val="200"/>
+              </a:spcBef>
+              <a:spcAft>
+                <a:spcPts val="400"/>
+              </a:spcAft>
+              <a:buClr>
+                <a:schemeClr val="accent1"/>
+              </a:buClr>
+              <a:buSzPct val="80000"/>
+              <a:buFont typeface="Corbel" pitchFamily="34" charset="0"/>
+              <a:buChar char="•"/>
+              <a:defRPr sz="1600" kern="1200">
+                <a:solidFill>
+                  <a:schemeClr val="accent1"/>
+                </a:solidFill>
+                <a:latin typeface="+mn-lt"/>
+                <a:ea typeface="+mn-ea"/>
+                <a:cs typeface="+mn-cs"/>
+              </a:defRPr>
+            </a:lvl9pPr>
+          </a:lstStyle>
+          <a:p>
+            <a:r>
+              <a:rPr lang="en-CA" u="sng" dirty="0" smtClean="0">
+                <a:solidFill>
+                  <a:srgbClr val="8ABC49"/>
+                </a:solidFill>
+              </a:rPr>
+              <a:t>Template </a:t>
+            </a:r>
+            <a:r>
+              <a:rPr lang="en-CA" dirty="0" smtClean="0">
+                <a:solidFill>
+                  <a:srgbClr val="1CADE4"/>
+                </a:solidFill>
+              </a:rPr>
+              <a:t>and</a:t>
+            </a:r>
+            <a:r>
+              <a:rPr lang="en-CA" u="sng" dirty="0" smtClean="0">
+                <a:solidFill>
+                  <a:srgbClr val="8ABC49"/>
+                </a:solidFill>
+              </a:rPr>
+              <a:t> CSS </a:t>
+            </a:r>
+            <a:r>
+              <a:rPr lang="en-CA" dirty="0" smtClean="0"/>
+              <a:t>can contain syntax highlighting when in separate files</a:t>
             </a:r>
             <a:endParaRPr lang="en-CA" u="sng" dirty="0">
               <a:solidFill>
@@ -5875,43 +6255,38 @@
               </a:solidFill>
             </a:endParaRPr>
           </a:p>
-          <a:p>
-            <a:r>
-              <a:rPr lang="en-CA" u="sng" dirty="0">
-                <a:solidFill>
-                  <a:srgbClr val="8ABC49"/>
-                </a:solidFill>
-              </a:rPr>
-              <a:t>Template </a:t>
-            </a:r>
-            <a:r>
-              <a:rPr lang="en-CA" dirty="0">
-                <a:solidFill>
-                  <a:srgbClr val="1CADE4"/>
-                </a:solidFill>
-              </a:rPr>
-              <a:t>and</a:t>
-            </a:r>
-            <a:r>
-              <a:rPr lang="en-CA" u="sng" dirty="0">
-                <a:solidFill>
-                  <a:srgbClr val="8ABC49"/>
-                </a:solidFill>
-              </a:rPr>
-              <a:t> CSS </a:t>
-            </a:r>
-            <a:r>
-              <a:rPr lang="en-CA" dirty="0"/>
-              <a:t>can contain syntax highlighting when in separate files</a:t>
-            </a:r>
-            <a:endParaRPr lang="en-CA" u="sng" dirty="0">
-              <a:solidFill>
-                <a:srgbClr val="8ABC49"/>
-              </a:solidFill>
-            </a:endParaRPr>
-          </a:p>
-        </p:txBody>
-      </p:sp>
+        </p:txBody>
+      </p:sp>
+      <p:pic>
+        <p:nvPicPr>
+          <p:cNvPr id="7" name="Picture 6"/>
+          <p:cNvPicPr>
+            <a:picLocks noChangeAspect="1"/>
+          </p:cNvPicPr>
+          <p:nvPr/>
+        </p:nvPicPr>
+        <p:blipFill>
+          <a:blip r:embed="rId3">
+            <a:extLst>
+              <a:ext uri="{28A0092B-C50C-407E-A947-70E740481C1C}">
+                <a14:useLocalDpi xmlns:a14="http://schemas.microsoft.com/office/drawing/2010/main" val="0"/>
+              </a:ext>
+            </a:extLst>
+          </a:blip>
+          <a:stretch>
+            <a:fillRect/>
+          </a:stretch>
+        </p:blipFill>
+        <p:spPr>
+          <a:xfrm>
+            <a:off x="6758510" y="1313288"/>
+            <a:ext cx="4867088" cy="3801872"/>
+          </a:xfrm>
+          <a:prstGeom prst="rect">
+            <a:avLst/>
+          </a:prstGeom>
+        </p:spPr>
+      </p:pic>
     </p:spTree>
     <p:extLst>
       <p:ext uri="{BB962C8B-B14F-4D97-AF65-F5344CB8AC3E}">
@@ -5989,7 +6364,12 @@
             <p:ph idx="1"/>
           </p:nvPr>
         </p:nvSpPr>
-        <p:spPr/>
+        <p:spPr>
+          <a:xfrm>
+            <a:off x="1143001" y="2057400"/>
+            <a:ext cx="4388666" cy="4038600"/>
+          </a:xfrm>
+        </p:spPr>
         <p:txBody>
           <a:bodyPr/>
           <a:lstStyle/>
@@ -6002,8 +6382,19 @@
           <a:p>
             <a:r>
               <a:rPr lang="en-CA" dirty="0"/>
-              <a:t>Runtime errors in browser console are easy to understand and well-documented</a:t>
-            </a:r>
+              <a:t>Runtime errors in browser console are </a:t>
+            </a:r>
+            <a:r>
+              <a:rPr lang="en-CA" dirty="0" smtClean="0"/>
+              <a:t>well-documented</a:t>
+            </a:r>
+          </a:p>
+          <a:p>
+            <a:r>
+              <a:rPr lang="en-CA" dirty="0" smtClean="0"/>
+              <a:t>Runtime errors don’t always come with line numbers</a:t>
+            </a:r>
+            <a:endParaRPr lang="en-CA" dirty="0"/>
           </a:p>
           <a:p>
             <a:r>
@@ -6024,6 +6415,36 @@
           </a:p>
         </p:txBody>
       </p:sp>
+      <p:pic>
+        <p:nvPicPr>
+          <p:cNvPr id="5" name="Picture 4"/>
+          <p:cNvPicPr>
+            <a:picLocks noChangeAspect="1"/>
+          </p:cNvPicPr>
+          <p:nvPr/>
+        </p:nvPicPr>
+        <p:blipFill>
+          <a:blip r:embed="rId2">
+            <a:extLst>
+              <a:ext uri="{28A0092B-C50C-407E-A947-70E740481C1C}">
+                <a14:useLocalDpi xmlns:a14="http://schemas.microsoft.com/office/drawing/2010/main" val="0"/>
+              </a:ext>
+            </a:extLst>
+          </a:blip>
+          <a:stretch>
+            <a:fillRect/>
+          </a:stretch>
+        </p:blipFill>
+        <p:spPr>
+          <a:xfrm>
+            <a:off x="5845973" y="1965960"/>
+            <a:ext cx="5696745" cy="4010585"/>
+          </a:xfrm>
+          <a:prstGeom prst="rect">
+            <a:avLst/>
+          </a:prstGeom>
+        </p:spPr>
+      </p:pic>
     </p:spTree>
     <p:extLst>
       <p:ext uri="{BB962C8B-B14F-4D97-AF65-F5344CB8AC3E}">

</xml_diff>

<commit_message>
added info to ppt
</commit_message>
<xml_diff>
--- a/Angular2.pptx
+++ b/Angular2.pptx
@@ -324,7 +324,7 @@
           <a:p>
             <a:fld id="{96DFF08F-DC6B-4601-B491-B0F83F6DD2DA}" type="datetimeFigureOut">
               <a:rPr lang="en-US" dirty="0"/>
-              <a:t>5/10/2016</a:t>
+              <a:t>5/11/2016</a:t>
             </a:fld>
             <a:endParaRPr lang="en-US" dirty="0"/>
           </a:p>
@@ -540,7 +540,7 @@
           <a:p>
             <a:fld id="{96DFF08F-DC6B-4601-B491-B0F83F6DD2DA}" type="datetimeFigureOut">
               <a:rPr lang="en-US" dirty="0"/>
-              <a:t>5/10/2016</a:t>
+              <a:t>5/11/2016</a:t>
             </a:fld>
             <a:endParaRPr lang="en-US" dirty="0"/>
           </a:p>
@@ -715,7 +715,7 @@
           <a:p>
             <a:fld id="{96DFF08F-DC6B-4601-B491-B0F83F6DD2DA}" type="datetimeFigureOut">
               <a:rPr lang="en-US" dirty="0"/>
-              <a:t>5/10/2016</a:t>
+              <a:t>5/11/2016</a:t>
             </a:fld>
             <a:endParaRPr lang="en-US" dirty="0"/>
           </a:p>
@@ -880,7 +880,7 @@
           <a:p>
             <a:fld id="{96DFF08F-DC6B-4601-B491-B0F83F6DD2DA}" type="datetimeFigureOut">
               <a:rPr lang="en-US" dirty="0"/>
-              <a:t>5/10/2016</a:t>
+              <a:t>5/11/2016</a:t>
             </a:fld>
             <a:endParaRPr lang="en-US" dirty="0"/>
           </a:p>
@@ -1126,7 +1126,7 @@
           <a:p>
             <a:fld id="{96DFF08F-DC6B-4601-B491-B0F83F6DD2DA}" type="datetimeFigureOut">
               <a:rPr lang="en-US" dirty="0"/>
-              <a:t>5/10/2016</a:t>
+              <a:t>5/11/2016</a:t>
             </a:fld>
             <a:endParaRPr lang="en-US" dirty="0"/>
           </a:p>
@@ -1444,7 +1444,7 @@
           <a:p>
             <a:fld id="{96DFF08F-DC6B-4601-B491-B0F83F6DD2DA}" type="datetimeFigureOut">
               <a:rPr lang="en-US" dirty="0"/>
-              <a:t>5/10/2016</a:t>
+              <a:t>5/11/2016</a:t>
             </a:fld>
             <a:endParaRPr lang="en-US" dirty="0"/>
           </a:p>
@@ -1863,7 +1863,7 @@
           <a:p>
             <a:fld id="{96DFF08F-DC6B-4601-B491-B0F83F6DD2DA}" type="datetimeFigureOut">
               <a:rPr lang="en-US" dirty="0"/>
-              <a:t>5/10/2016</a:t>
+              <a:t>5/11/2016</a:t>
             </a:fld>
             <a:endParaRPr lang="en-US" dirty="0"/>
           </a:p>
@@ -1976,7 +1976,7 @@
           <a:p>
             <a:fld id="{96DFF08F-DC6B-4601-B491-B0F83F6DD2DA}" type="datetimeFigureOut">
               <a:rPr lang="en-US" dirty="0"/>
-              <a:t>5/10/2016</a:t>
+              <a:t>5/11/2016</a:t>
             </a:fld>
             <a:endParaRPr lang="en-US" dirty="0"/>
           </a:p>
@@ -2066,7 +2066,7 @@
           <a:p>
             <a:fld id="{96DFF08F-DC6B-4601-B491-B0F83F6DD2DA}" type="datetimeFigureOut">
               <a:rPr lang="en-US" dirty="0"/>
-              <a:t>5/10/2016</a:t>
+              <a:t>5/11/2016</a:t>
             </a:fld>
             <a:endParaRPr lang="en-US" dirty="0"/>
           </a:p>
@@ -2351,7 +2351,7 @@
           <a:p>
             <a:fld id="{96DFF08F-DC6B-4601-B491-B0F83F6DD2DA}" type="datetimeFigureOut">
               <a:rPr lang="en-US" dirty="0"/>
-              <a:t>5/10/2016</a:t>
+              <a:t>5/11/2016</a:t>
             </a:fld>
             <a:endParaRPr lang="en-US" dirty="0"/>
           </a:p>
@@ -2618,7 +2618,7 @@
           <a:p>
             <a:fld id="{96DFF08F-DC6B-4601-B491-B0F83F6DD2DA}" type="datetimeFigureOut">
               <a:rPr lang="en-US" dirty="0"/>
-              <a:t>5/10/2016</a:t>
+              <a:t>5/11/2016</a:t>
             </a:fld>
             <a:endParaRPr lang="en-US" dirty="0"/>
           </a:p>
@@ -2868,7 +2868,7 @@
             <a:fld id="{96DFF08F-DC6B-4601-B491-B0F83F6DD2DA}" type="datetimeFigureOut">
               <a:rPr lang="en-US" dirty="0"/>
               <a:pPr/>
-              <a:t>5/10/2016</a:t>
+              <a:t>5/11/2016</a:t>
             </a:fld>
             <a:endParaRPr lang="en-US" dirty="0"/>
           </a:p>
@@ -3683,11 +3683,6 @@
               </a:rPr>
               <a:t>Setup of test framework dependencies can be overwhelming and hard to follow</a:t>
             </a:r>
-            <a:endParaRPr lang="en-CA" dirty="0" smtClean="0">
-              <a:solidFill>
-                <a:srgbClr val="1CADE4"/>
-              </a:solidFill>
-            </a:endParaRPr>
           </a:p>
           <a:p>
             <a:endParaRPr lang="en-CA" dirty="0">
@@ -3788,7 +3783,45 @@
           <a:bodyPr/>
           <a:lstStyle/>
           <a:p>
-            <a:endParaRPr lang="en-US"/>
+            <a:r>
+              <a:rPr lang="en-CA" dirty="0" smtClean="0"/>
+              <a:t>Optimized </a:t>
+            </a:r>
+            <a:r>
+              <a:rPr lang="en-CA" dirty="0"/>
+              <a:t>for today's JavaScript virtual </a:t>
+            </a:r>
+            <a:r>
+              <a:rPr lang="en-CA" dirty="0" smtClean="0"/>
+              <a:t>machines using an advanced change detection algorithm</a:t>
+            </a:r>
+          </a:p>
+          <a:p>
+            <a:r>
+              <a:rPr lang="en-CA" dirty="0"/>
+              <a:t>Serve the first view of your application on node.js, .NET, PHP and other servers for near-instant </a:t>
+            </a:r>
+            <a:r>
+              <a:rPr lang="en-CA" dirty="0" smtClean="0"/>
+              <a:t>rendering</a:t>
+            </a:r>
+          </a:p>
+          <a:p>
+            <a:r>
+              <a:rPr lang="en-CA" dirty="0" smtClean="0"/>
+              <a:t>Component router delivers automatic code-splitting</a:t>
+            </a:r>
+          </a:p>
+          <a:p>
+            <a:r>
+              <a:rPr lang="en-CA" dirty="0" err="1" smtClean="0"/>
+              <a:t>RxJS</a:t>
+            </a:r>
+            <a:r>
+              <a:rPr lang="en-CA" dirty="0" smtClean="0"/>
+              <a:t> Observables offer push-model data flows letting you optimize the change detection strategy</a:t>
+            </a:r>
+            <a:endParaRPr lang="en-US" dirty="0"/>
           </a:p>
         </p:txBody>
       </p:sp>
@@ -3882,7 +3915,50 @@
           <a:bodyPr/>
           <a:lstStyle/>
           <a:p>
-            <a:endParaRPr lang="en-US"/>
+            <a:r>
+              <a:rPr lang="en-US" dirty="0" smtClean="0"/>
+              <a:t>Ridiculously large community of long time angular developers and new adopters</a:t>
+            </a:r>
+          </a:p>
+          <a:p>
+            <a:r>
+              <a:rPr lang="en-US" dirty="0" smtClean="0"/>
+              <a:t>Built by the same people who built Angular 1</a:t>
+            </a:r>
+          </a:p>
+          <a:p>
+            <a:r>
+              <a:rPr lang="en-US" dirty="0" err="1" smtClean="0"/>
+              <a:t>ngUpgrade</a:t>
+            </a:r>
+            <a:r>
+              <a:rPr lang="en-US" dirty="0" smtClean="0"/>
+              <a:t> and </a:t>
+            </a:r>
+            <a:r>
+              <a:rPr lang="en-US" dirty="0" err="1" smtClean="0"/>
+              <a:t>ngForward</a:t>
+            </a:r>
+            <a:r>
+              <a:rPr lang="en-US" dirty="0" smtClean="0"/>
+              <a:t> offers detailed and seamless upgrade strategies from Angular 1 to 2</a:t>
+            </a:r>
+          </a:p>
+          <a:p>
+            <a:r>
+              <a:rPr lang="en-US" dirty="0" smtClean="0"/>
+              <a:t>Open to community, collaborating closely</a:t>
+            </a:r>
+          </a:p>
+          <a:p>
+            <a:pPr marL="45720" indent="0">
+              <a:buNone/>
+            </a:pPr>
+            <a:r>
+              <a:rPr lang="en-US" dirty="0"/>
+              <a:t> </a:t>
+            </a:r>
+            <a:endParaRPr lang="en-US" dirty="0"/>
           </a:p>
         </p:txBody>
       </p:sp>
@@ -3976,7 +4052,27 @@
           <a:bodyPr/>
           <a:lstStyle/>
           <a:p>
-            <a:endParaRPr lang="en-US"/>
+            <a:r>
+              <a:rPr lang="en-US" dirty="0" smtClean="0"/>
+              <a:t>Careful, methodical reinvention of mature, comprehensive framework</a:t>
+            </a:r>
+          </a:p>
+          <a:p>
+            <a:r>
+              <a:rPr lang="en-US" dirty="0" smtClean="0"/>
+              <a:t>Less churn after release than other frameworks</a:t>
+            </a:r>
+          </a:p>
+          <a:p>
+            <a:r>
+              <a:rPr lang="en-US" dirty="0" smtClean="0"/>
+              <a:t>Single team making decisions about future</a:t>
+            </a:r>
+            <a:r>
+              <a:rPr lang="en-US" dirty="0" smtClean="0"/>
+              <a:t> </a:t>
+            </a:r>
+            <a:endParaRPr lang="en-US" dirty="0"/>
           </a:p>
         </p:txBody>
       </p:sp>
@@ -4081,7 +4177,6 @@
               <a:rPr lang="en-CA" dirty="0" smtClean="0"/>
               <a:t>Similar concepts and structure to our backend</a:t>
             </a:r>
-            <a:endParaRPr lang="en-CA" dirty="0" smtClean="0"/>
           </a:p>
           <a:p>
             <a:r>
@@ -4163,20 +4258,31 @@
               <a:rPr lang="en-US" dirty="0"/>
               <a:t>documentation</a:t>
             </a:r>
-            <a:endParaRPr lang="en-US" dirty="0"/>
           </a:p>
           <a:p>
             <a:r>
               <a:rPr lang="en-US" dirty="0" smtClean="0"/>
-              <a:t>Component structure lends itself to thoughtful coding patterns</a:t>
-            </a:r>
-          </a:p>
-          <a:p>
-            <a:r>
-              <a:rPr lang="en-CA" dirty="0" smtClean="0"/>
-              <a:t>Framework contains almost everything you will need</a:t>
-            </a:r>
-            <a:endParaRPr lang="en-US" dirty="0"/>
+              <a:t>Angular 2’s design embraces web component’s standard </a:t>
+            </a:r>
+            <a:r>
+              <a:rPr lang="en-US" dirty="0">
+                <a:solidFill>
+                  <a:schemeClr val="tx2">
+                    <a:lumMod val="40000"/>
+                    <a:lumOff val="60000"/>
+                  </a:schemeClr>
+                </a:solidFill>
+              </a:rPr>
+              <a:t>(rendering cross-platform native UI for iOS and Android)</a:t>
+            </a:r>
+            <a:endParaRPr lang="en-US" dirty="0">
+              <a:solidFill>
+                <a:schemeClr val="tx2">
+                  <a:lumMod val="40000"/>
+                  <a:lumOff val="60000"/>
+                </a:schemeClr>
+              </a:solidFill>
+            </a:endParaRPr>
           </a:p>
         </p:txBody>
       </p:sp>
@@ -4286,7 +4392,6 @@
               <a:rPr lang="en-CA" dirty="0" smtClean="0"/>
               <a:t>syntax takes some getting used to</a:t>
             </a:r>
-            <a:endParaRPr lang="en-CA" dirty="0" smtClean="0"/>
           </a:p>
           <a:p>
             <a:r>
@@ -4491,16 +4596,28 @@
               <a:rPr lang="en-US" dirty="0">
                 <a:hlinkClick r:id="rId2"/>
               </a:rPr>
-              <a:t>https://angular.io/docs/ts/latest/guide/architecture.html</a:t>
-            </a:r>
-            <a:endParaRPr lang="en-US" dirty="0"/>
-          </a:p>
-          <a:p>
+              <a:t>https://</a:t>
+            </a:r>
+            <a:r>
+              <a:rPr lang="en-US" dirty="0" smtClean="0">
+                <a:hlinkClick r:id="rId2"/>
+              </a:rPr>
+              <a:t>angular.io/</a:t>
+            </a:r>
+            <a:endParaRPr lang="en-US" dirty="0" smtClean="0"/>
+          </a:p>
+          <a:p>
+            <a:r>
+              <a:rPr lang="en-US" dirty="0" smtClean="0">
+                <a:hlinkClick r:id="rId3"/>
+              </a:rPr>
+              <a:t>https</a:t>
+            </a:r>
             <a:r>
               <a:rPr lang="en-US" dirty="0">
                 <a:hlinkClick r:id="rId3"/>
               </a:rPr>
-              <a:t>https://en.wikipedia.org/wiki/AngularJS</a:t>
+              <a:t>://en.wikipedia.org/wiki/AngularJS</a:t>
             </a:r>
             <a:endParaRPr lang="en-US" dirty="0"/>
           </a:p>
@@ -4546,6 +4663,13 @@
                 <a:hlinkClick r:id="rId6"/>
               </a:rPr>
               <a:t>www.syntaxsuccess.com/viewarticle/angular-2.0-unit-testing</a:t>
+            </a:r>
+            <a:endParaRPr lang="en-US" dirty="0" smtClean="0"/>
+          </a:p>
+          <a:p>
+            <a:r>
+              <a:rPr lang="en-US" dirty="0"/>
+              <a:t>http://developer.telerik.com/featured/will-angular-2-be-a-success-you-bet/</a:t>
             </a:r>
             <a:endParaRPr lang="en-US" dirty="0" smtClean="0"/>
           </a:p>

</xml_diff>

<commit_message>
added names to first slide
</commit_message>
<xml_diff>
--- a/Angular2.pptx
+++ b/Angular2.pptx
@@ -3405,6 +3405,74 @@
           </a:extLst>
         </p:spPr>
       </p:pic>
+      <p:sp>
+        <p:nvSpPr>
+          <p:cNvPr id="3" name="TextBox 2"/>
+          <p:cNvSpPr txBox="1"/>
+          <p:nvPr/>
+        </p:nvSpPr>
+        <p:spPr>
+          <a:xfrm>
+            <a:off x="112902" y="5717904"/>
+            <a:ext cx="6325985" cy="923330"/>
+          </a:xfrm>
+          <a:prstGeom prst="rect">
+            <a:avLst/>
+          </a:prstGeom>
+          <a:noFill/>
+        </p:spPr>
+        <p:txBody>
+          <a:bodyPr wrap="square" rtlCol="0">
+            <a:spAutoFit/>
+          </a:bodyPr>
+          <a:lstStyle/>
+          <a:p>
+            <a:r>
+              <a:rPr lang="en-CA" dirty="0" smtClean="0">
+                <a:solidFill>
+                  <a:schemeClr val="bg1"/>
+                </a:solidFill>
+              </a:rPr>
+              <a:t>Presenters:</a:t>
+            </a:r>
+            <a:br>
+              <a:rPr lang="en-CA" dirty="0" smtClean="0">
+                <a:solidFill>
+                  <a:schemeClr val="bg1"/>
+                </a:solidFill>
+              </a:rPr>
+            </a:br>
+            <a:r>
+              <a:rPr lang="en-CA" dirty="0" smtClean="0">
+                <a:solidFill>
+                  <a:schemeClr val="bg1"/>
+                </a:solidFill>
+              </a:rPr>
+              <a:t>Justin Bicknell</a:t>
+            </a:r>
+            <a:br>
+              <a:rPr lang="en-CA" dirty="0" smtClean="0">
+                <a:solidFill>
+                  <a:schemeClr val="bg1"/>
+                </a:solidFill>
+              </a:rPr>
+            </a:br>
+            <a:r>
+              <a:rPr lang="en-CA" dirty="0" smtClean="0">
+                <a:solidFill>
+                  <a:schemeClr val="bg1"/>
+                </a:solidFill>
+              </a:rPr>
+              <a:t>Colin Kirk</a:t>
+            </a:r>
+            <a:endParaRPr lang="en-CA" dirty="0">
+              <a:solidFill>
+                <a:schemeClr val="bg1"/>
+              </a:solidFill>
+            </a:endParaRPr>
+          </a:p>
+        </p:txBody>
+      </p:sp>
     </p:spTree>
     <p:extLst>
       <p:ext uri="{BB962C8B-B14F-4D97-AF65-F5344CB8AC3E}">
@@ -3415,6 +3483,13 @@
   <p:clrMapOvr>
     <a:masterClrMapping/>
   </p:clrMapOvr>
+  <p:timing>
+    <p:tnLst>
+      <p:par>
+        <p:cTn id="1" dur="indefinite" restart="never" nodeType="tmRoot"/>
+      </p:par>
+    </p:tnLst>
+  </p:timing>
 </p:sld>
 </file>
 

</xml_diff>

<commit_message>
- updates to PPTX
</commit_message>
<xml_diff>
--- a/Angular2.pptx
+++ b/Angular2.pptx
@@ -3694,19 +3694,32 @@
           <a:lstStyle/>
           <a:p>
             <a:r>
-              <a:rPr lang="en-CA" dirty="0"/>
+              <a:rPr lang="en-CA" dirty="0">
+                <a:solidFill>
+                  <a:schemeClr val="tx1">
+                    <a:lumMod val="75000"/>
+                    <a:lumOff val="25000"/>
+                  </a:schemeClr>
+                </a:solidFill>
+              </a:rPr>
               <a:t>Most test libraries should work</a:t>
             </a:r>
             <a:r>
-              <a:rPr lang="en-US" dirty="0"/>
+              <a:rPr lang="en-US" dirty="0">
+                <a:solidFill>
+                  <a:schemeClr val="tx1">
+                    <a:lumMod val="75000"/>
+                    <a:lumOff val="25000"/>
+                  </a:schemeClr>
+                </a:solidFill>
+              </a:rPr>
               <a:t> </a:t>
             </a:r>
             <a:r>
               <a:rPr lang="en-US" dirty="0">
                 <a:solidFill>
-                  <a:schemeClr val="tx2">
-                    <a:lumMod val="40000"/>
-                    <a:lumOff val="60000"/>
+                  <a:schemeClr val="bg1">
+                    <a:lumMod val="65000"/>
                   </a:schemeClr>
                 </a:solidFill>
               </a:rPr>
@@ -3715,11 +3728,25 @@
           </a:p>
           <a:p>
             <a:r>
-              <a:rPr lang="en-CA" dirty="0"/>
+              <a:rPr lang="en-CA" dirty="0">
+                <a:solidFill>
+                  <a:schemeClr val="tx1">
+                    <a:lumMod val="75000"/>
+                    <a:lumOff val="25000"/>
+                  </a:schemeClr>
+                </a:solidFill>
+              </a:rPr>
               <a:t>Can configure to run on live-server which automatically </a:t>
             </a:r>
             <a:r>
-              <a:rPr lang="en-CA" dirty="0" smtClean="0"/>
+              <a:rPr lang="en-CA" dirty="0" smtClean="0">
+                <a:solidFill>
+                  <a:schemeClr val="tx1">
+                    <a:lumMod val="75000"/>
+                    <a:lumOff val="25000"/>
+                  </a:schemeClr>
+                </a:solidFill>
+              </a:rPr>
               <a:t>refreshes</a:t>
             </a:r>
           </a:p>
@@ -3727,7 +3754,10 @@
             <a:r>
               <a:rPr lang="en-CA" dirty="0" smtClean="0">
                 <a:solidFill>
-                  <a:srgbClr val="1CADE4"/>
+                  <a:schemeClr val="tx1">
+                    <a:lumMod val="75000"/>
+                    <a:lumOff val="25000"/>
+                  </a:schemeClr>
                 </a:solidFill>
               </a:rPr>
               <a:t>Dependency Injection makes objects within the application </a:t>
@@ -3735,14 +3765,20 @@
             <a:r>
               <a:rPr lang="en-CA" dirty="0" err="1" smtClean="0">
                 <a:solidFill>
-                  <a:srgbClr val="1CADE4"/>
+                  <a:schemeClr val="tx1">
+                    <a:lumMod val="75000"/>
+                    <a:lumOff val="25000"/>
+                  </a:schemeClr>
                 </a:solidFill>
               </a:rPr>
               <a:t>mockable</a:t>
             </a:r>
             <a:endParaRPr lang="en-CA" dirty="0" smtClean="0">
               <a:solidFill>
-                <a:srgbClr val="1CADE4"/>
+                <a:schemeClr val="tx1">
+                  <a:lumMod val="75000"/>
+                  <a:lumOff val="25000"/>
+                </a:schemeClr>
               </a:solidFill>
             </a:endParaRPr>
           </a:p>
@@ -3750,7 +3786,10 @@
             <a:r>
               <a:rPr lang="en-CA" dirty="0" smtClean="0">
                 <a:solidFill>
-                  <a:srgbClr val="1CADE4"/>
+                  <a:schemeClr val="tx1">
+                    <a:lumMod val="75000"/>
+                    <a:lumOff val="25000"/>
+                  </a:schemeClr>
                 </a:solidFill>
               </a:rPr>
               <a:t>Able to test everything </a:t>
@@ -3760,41 +3799,19 @@
             <a:r>
               <a:rPr lang="en-CA" dirty="0" smtClean="0">
                 <a:solidFill>
-                  <a:srgbClr val="1CADE4"/>
-                </a:solidFill>
-              </a:rPr>
-              <a:t>Setup of test </a:t>
-            </a:r>
-            <a:r>
-              <a:rPr lang="en-CA" dirty="0" smtClean="0">
-                <a:solidFill>
-                  <a:srgbClr val="1CADE4"/>
-                </a:solidFill>
-              </a:rPr>
-              <a:t>framework </a:t>
-            </a:r>
-            <a:r>
-              <a:rPr lang="en-CA" dirty="0" smtClean="0">
-                <a:solidFill>
-                  <a:srgbClr val="1CADE4"/>
-                </a:solidFill>
-              </a:rPr>
-              <a:t>dependencies can be overwhelming and hard to </a:t>
-            </a:r>
-            <a:r>
-              <a:rPr lang="en-CA" dirty="0" smtClean="0">
-                <a:solidFill>
-                  <a:srgbClr val="1CADE4"/>
-                </a:solidFill>
-              </a:rPr>
-              <a:t>follow </a:t>
-            </a:r>
-            <a:r>
-              <a:rPr lang="en-CA" dirty="0">
-                <a:solidFill>
-                  <a:schemeClr val="tx2">
-                    <a:lumMod val="40000"/>
-                    <a:lumOff val="60000"/>
+                  <a:schemeClr val="tx1">
+                    <a:lumMod val="75000"/>
+                    <a:lumOff val="25000"/>
+                  </a:schemeClr>
+                </a:solidFill>
+              </a:rPr>
+              <a:t>Setup of test framework dependencies can be overwhelming and hard to follow </a:t>
+            </a:r>
+            <a:r>
+              <a:rPr lang="en-CA" dirty="0">
+                <a:solidFill>
+                  <a:schemeClr val="bg1">
+                    <a:lumMod val="65000"/>
                   </a:schemeClr>
                 </a:solidFill>
               </a:rPr>
@@ -3901,54 +3918,120 @@
           <a:lstStyle/>
           <a:p>
             <a:r>
-              <a:rPr lang="en-CA" dirty="0" smtClean="0"/>
+              <a:rPr lang="en-CA" dirty="0" smtClean="0">
+                <a:solidFill>
+                  <a:schemeClr val="tx1">
+                    <a:lumMod val="75000"/>
+                    <a:lumOff val="25000"/>
+                  </a:schemeClr>
+                </a:solidFill>
+              </a:rPr>
               <a:t>Optimized </a:t>
             </a:r>
             <a:r>
-              <a:rPr lang="en-CA" dirty="0"/>
+              <a:rPr lang="en-CA" dirty="0">
+                <a:solidFill>
+                  <a:schemeClr val="tx1">
+                    <a:lumMod val="75000"/>
+                    <a:lumOff val="25000"/>
+                  </a:schemeClr>
+                </a:solidFill>
+              </a:rPr>
               <a:t>for today's JavaScript virtual </a:t>
             </a:r>
             <a:r>
-              <a:rPr lang="en-CA" dirty="0" smtClean="0"/>
+              <a:rPr lang="en-CA" dirty="0" smtClean="0">
+                <a:solidFill>
+                  <a:schemeClr val="tx1">
+                    <a:lumMod val="75000"/>
+                    <a:lumOff val="25000"/>
+                  </a:schemeClr>
+                </a:solidFill>
+              </a:rPr>
               <a:t>machines using an advanced change detection algorithm</a:t>
             </a:r>
           </a:p>
           <a:p>
             <a:r>
-              <a:rPr lang="en-CA" dirty="0"/>
+              <a:rPr lang="en-CA" dirty="0">
+                <a:solidFill>
+                  <a:schemeClr val="tx1">
+                    <a:lumMod val="75000"/>
+                    <a:lumOff val="25000"/>
+                  </a:schemeClr>
+                </a:solidFill>
+              </a:rPr>
               <a:t>Serve the first view of your application on node.js, .NET, PHP and other servers for near-instant </a:t>
             </a:r>
             <a:r>
-              <a:rPr lang="en-CA" dirty="0" smtClean="0"/>
+              <a:rPr lang="en-CA" dirty="0" smtClean="0">
+                <a:solidFill>
+                  <a:schemeClr val="tx1">
+                    <a:lumMod val="75000"/>
+                    <a:lumOff val="25000"/>
+                  </a:schemeClr>
+                </a:solidFill>
+              </a:rPr>
               <a:t>rendering</a:t>
             </a:r>
           </a:p>
           <a:p>
             <a:r>
-              <a:rPr lang="en-CA" dirty="0" smtClean="0"/>
+              <a:rPr lang="en-CA" dirty="0" smtClean="0">
+                <a:solidFill>
+                  <a:schemeClr val="tx1">
+                    <a:lumMod val="75000"/>
+                    <a:lumOff val="25000"/>
+                  </a:schemeClr>
+                </a:solidFill>
+              </a:rPr>
               <a:t>Component router delivers automatic code-splitting</a:t>
             </a:r>
           </a:p>
           <a:p>
             <a:r>
-              <a:rPr lang="en-CA" dirty="0" err="1" smtClean="0"/>
+              <a:rPr lang="en-CA" dirty="0" err="1" smtClean="0">
+                <a:solidFill>
+                  <a:schemeClr val="tx1">
+                    <a:lumMod val="75000"/>
+                    <a:lumOff val="25000"/>
+                  </a:schemeClr>
+                </a:solidFill>
+              </a:rPr>
               <a:t>RxJS</a:t>
             </a:r>
             <a:r>
-              <a:rPr lang="en-CA" dirty="0" smtClean="0"/>
+              <a:rPr lang="en-CA" dirty="0" smtClean="0">
+                <a:solidFill>
+                  <a:schemeClr val="tx1">
+                    <a:lumMod val="75000"/>
+                    <a:lumOff val="25000"/>
+                  </a:schemeClr>
+                </a:solidFill>
+              </a:rPr>
               <a:t> Observables offer push-model data flows letting you optimize the change detection strategy</a:t>
             </a:r>
           </a:p>
           <a:p>
             <a:r>
-              <a:rPr lang="en-CA" dirty="0" smtClean="0"/>
-              <a:t>Out of the box </a:t>
-            </a:r>
-            <a:r>
-              <a:rPr lang="en-CA" smtClean="0"/>
-              <a:t>support for web workers</a:t>
-            </a:r>
-            <a:endParaRPr lang="en-US" dirty="0"/>
+              <a:rPr lang="en-CA" dirty="0" smtClean="0">
+                <a:solidFill>
+                  <a:schemeClr val="tx1">
+                    <a:lumMod val="75000"/>
+                    <a:lumOff val="25000"/>
+                  </a:schemeClr>
+                </a:solidFill>
+              </a:rPr>
+              <a:t>Out of the box support for web workers</a:t>
+            </a:r>
+            <a:endParaRPr lang="en-US" dirty="0">
+              <a:solidFill>
+                <a:schemeClr val="tx1">
+                  <a:lumMod val="75000"/>
+                  <a:lumOff val="25000"/>
+                </a:schemeClr>
+              </a:solidFill>
+            </a:endParaRPr>
           </a:p>
         </p:txBody>
       </p:sp>
@@ -4050,37 +4133,108 @@
           <a:lstStyle/>
           <a:p>
             <a:r>
-              <a:rPr lang="en-US" dirty="0" smtClean="0"/>
-              <a:t>Ridiculously large community of long time angular developers and new adopters</a:t>
-            </a:r>
-          </a:p>
-          <a:p>
-            <a:r>
-              <a:rPr lang="en-US" dirty="0" smtClean="0"/>
+              <a:rPr lang="en-US" dirty="0" smtClean="0">
+                <a:solidFill>
+                  <a:schemeClr val="tx1">
+                    <a:lumMod val="75000"/>
+                    <a:lumOff val="25000"/>
+                  </a:schemeClr>
+                </a:solidFill>
+              </a:rPr>
+              <a:t>Ridiculously large community of </a:t>
+            </a:r>
+            <a:r>
+              <a:rPr lang="en-US" dirty="0" smtClean="0">
+                <a:solidFill>
+                  <a:schemeClr val="tx1">
+                    <a:lumMod val="75000"/>
+                    <a:lumOff val="25000"/>
+                  </a:schemeClr>
+                </a:solidFill>
+              </a:rPr>
+              <a:t>long-time </a:t>
+            </a:r>
+            <a:r>
+              <a:rPr lang="en-US" dirty="0" smtClean="0">
+                <a:solidFill>
+                  <a:schemeClr val="tx1">
+                    <a:lumMod val="75000"/>
+                    <a:lumOff val="25000"/>
+                  </a:schemeClr>
+                </a:solidFill>
+              </a:rPr>
+              <a:t>angular developers and new adopters</a:t>
+            </a:r>
+          </a:p>
+          <a:p>
+            <a:r>
+              <a:rPr lang="en-US" dirty="0" smtClean="0">
+                <a:solidFill>
+                  <a:schemeClr val="tx1">
+                    <a:lumMod val="75000"/>
+                    <a:lumOff val="25000"/>
+                  </a:schemeClr>
+                </a:solidFill>
+              </a:rPr>
               <a:t>Built by the same people who built Angular 1</a:t>
             </a:r>
           </a:p>
           <a:p>
             <a:r>
-              <a:rPr lang="en-US" dirty="0" err="1" smtClean="0"/>
+              <a:rPr lang="en-US" dirty="0" err="1" smtClean="0">
+                <a:solidFill>
+                  <a:schemeClr val="tx1">
+                    <a:lumMod val="75000"/>
+                    <a:lumOff val="25000"/>
+                  </a:schemeClr>
+                </a:solidFill>
+              </a:rPr>
               <a:t>ngUpgrade</a:t>
             </a:r>
             <a:r>
-              <a:rPr lang="en-US" dirty="0" smtClean="0"/>
+              <a:rPr lang="en-US" dirty="0" smtClean="0">
+                <a:solidFill>
+                  <a:schemeClr val="tx1">
+                    <a:lumMod val="75000"/>
+                    <a:lumOff val="25000"/>
+                  </a:schemeClr>
+                </a:solidFill>
+              </a:rPr>
               <a:t> and </a:t>
             </a:r>
             <a:r>
-              <a:rPr lang="en-US" dirty="0" err="1" smtClean="0"/>
+              <a:rPr lang="en-US" dirty="0" err="1" smtClean="0">
+                <a:solidFill>
+                  <a:schemeClr val="tx1">
+                    <a:lumMod val="75000"/>
+                    <a:lumOff val="25000"/>
+                  </a:schemeClr>
+                </a:solidFill>
+              </a:rPr>
               <a:t>ngForward</a:t>
             </a:r>
             <a:r>
-              <a:rPr lang="en-US" dirty="0" smtClean="0"/>
+              <a:rPr lang="en-US" dirty="0" smtClean="0">
+                <a:solidFill>
+                  <a:schemeClr val="tx1">
+                    <a:lumMod val="75000"/>
+                    <a:lumOff val="25000"/>
+                  </a:schemeClr>
+                </a:solidFill>
+              </a:rPr>
               <a:t> offers detailed and seamless upgrade strategies from Angular 1 to 2</a:t>
             </a:r>
           </a:p>
           <a:p>
             <a:r>
-              <a:rPr lang="en-US" dirty="0" smtClean="0"/>
+              <a:rPr lang="en-US" dirty="0" smtClean="0">
+                <a:solidFill>
+                  <a:schemeClr val="tx1">
+                    <a:lumMod val="75000"/>
+                    <a:lumOff val="25000"/>
+                  </a:schemeClr>
+                </a:solidFill>
+              </a:rPr>
               <a:t>Open to community, collaborating closely</a:t>
             </a:r>
           </a:p>
@@ -4089,10 +4243,16 @@
               <a:buNone/>
             </a:pPr>
             <a:r>
-              <a:rPr lang="en-US" dirty="0"/>
+              <a:rPr lang="en-US" dirty="0">
+                <a:solidFill>
+                  <a:schemeClr val="tx1">
+                    <a:lumMod val="75000"/>
+                    <a:lumOff val="25000"/>
+                  </a:schemeClr>
+                </a:solidFill>
+              </a:rPr>
               <a:t> </a:t>
             </a:r>
-            <a:endParaRPr lang="en-US" dirty="0"/>
           </a:p>
         </p:txBody>
       </p:sp>
@@ -4194,26 +4354,50 @@
           <a:lstStyle/>
           <a:p>
             <a:r>
-              <a:rPr lang="en-US" dirty="0" smtClean="0"/>
+              <a:rPr lang="en-US" dirty="0" smtClean="0">
+                <a:solidFill>
+                  <a:schemeClr val="tx1">
+                    <a:lumMod val="75000"/>
+                    <a:lumOff val="25000"/>
+                  </a:schemeClr>
+                </a:solidFill>
+              </a:rPr>
               <a:t>Careful, methodical reinvention of mature, comprehensive framework</a:t>
             </a:r>
           </a:p>
           <a:p>
             <a:r>
-              <a:rPr lang="en-US" dirty="0" smtClean="0"/>
+              <a:rPr lang="en-US" dirty="0" smtClean="0">
+                <a:solidFill>
+                  <a:schemeClr val="tx1">
+                    <a:lumMod val="75000"/>
+                    <a:lumOff val="25000"/>
+                  </a:schemeClr>
+                </a:solidFill>
+              </a:rPr>
               <a:t>Less churn after release than other frameworks</a:t>
             </a:r>
           </a:p>
           <a:p>
             <a:r>
-              <a:rPr lang="en-US" dirty="0" smtClean="0"/>
-              <a:t>Single team making decisions about future</a:t>
-            </a:r>
-            <a:r>
-              <a:rPr lang="en-US" dirty="0" smtClean="0"/>
-              <a:t> </a:t>
-            </a:r>
-            <a:endParaRPr lang="en-US" dirty="0"/>
+              <a:rPr lang="en-US" dirty="0" smtClean="0">
+                <a:solidFill>
+                  <a:schemeClr val="tx1">
+                    <a:lumMod val="75000"/>
+                    <a:lumOff val="25000"/>
+                  </a:schemeClr>
+                </a:solidFill>
+              </a:rPr>
+              <a:t>Single team making decisions about future </a:t>
+            </a:r>
+            <a:endParaRPr lang="en-US" dirty="0">
+              <a:solidFill>
+                <a:schemeClr val="tx1">
+                  <a:lumMod val="75000"/>
+                  <a:lumOff val="25000"/>
+                </a:schemeClr>
+              </a:solidFill>
+            </a:endParaRPr>
           </a:p>
         </p:txBody>
       </p:sp>
@@ -4315,47 +4499,121 @@
           <a:lstStyle/>
           <a:p>
             <a:r>
-              <a:rPr lang="en-CA" dirty="0" smtClean="0"/>
+              <a:rPr lang="en-CA" dirty="0" smtClean="0">
+                <a:solidFill>
+                  <a:schemeClr val="tx1">
+                    <a:lumMod val="75000"/>
+                    <a:lumOff val="25000"/>
+                  </a:schemeClr>
+                </a:solidFill>
+              </a:rPr>
               <a:t>Similar concepts and structure to our backend</a:t>
             </a:r>
           </a:p>
           <a:p>
             <a:r>
-              <a:rPr lang="en-CA" dirty="0" smtClean="0"/>
+              <a:rPr lang="en-CA" dirty="0" smtClean="0">
+                <a:solidFill>
+                  <a:schemeClr val="tx1">
+                    <a:lumMod val="75000"/>
+                    <a:lumOff val="25000"/>
+                  </a:schemeClr>
+                </a:solidFill>
+              </a:rPr>
               <a:t>Lots </a:t>
             </a:r>
             <a:r>
-              <a:rPr lang="en-CA" dirty="0"/>
-              <a:t>of contributors (</a:t>
-            </a:r>
-            <a:r>
-              <a:rPr lang="en-CA" dirty="0">
+              <a:rPr lang="en-CA" dirty="0">
+                <a:solidFill>
+                  <a:schemeClr val="tx1">
+                    <a:lumMod val="75000"/>
+                    <a:lumOff val="25000"/>
+                  </a:schemeClr>
+                </a:solidFill>
+              </a:rPr>
+              <a:t>of contributors </a:t>
+            </a:r>
+            <a:r>
+              <a:rPr lang="en-CA" dirty="0">
+                <a:solidFill>
+                  <a:schemeClr val="bg1">
+                    <a:lumMod val="65000"/>
+                  </a:schemeClr>
+                </a:solidFill>
+              </a:rPr>
+              <a:t>(</a:t>
+            </a:r>
+            <a:r>
+              <a:rPr lang="en-CA" dirty="0">
+                <a:solidFill>
+                  <a:schemeClr val="bg1">
+                    <a:lumMod val="65000"/>
+                  </a:schemeClr>
+                </a:solidFill>
                 <a:hlinkClick r:id="rId2"/>
               </a:rPr>
               <a:t>https://angular.io/about</a:t>
             </a:r>
             <a:r>
               <a:rPr lang="en-CA" dirty="0" smtClean="0">
+                <a:solidFill>
+                  <a:schemeClr val="bg1">
+                    <a:lumMod val="65000"/>
+                  </a:schemeClr>
+                </a:solidFill>
                 <a:hlinkClick r:id="rId2"/>
               </a:rPr>
               <a:t>/</a:t>
             </a:r>
             <a:r>
-              <a:rPr lang="en-CA" dirty="0" smtClean="0"/>
+              <a:rPr lang="en-CA" dirty="0" smtClean="0">
+                <a:solidFill>
+                  <a:schemeClr val="bg1">
+                    <a:lumMod val="65000"/>
+                  </a:schemeClr>
+                </a:solidFill>
+              </a:rPr>
               <a:t>)</a:t>
             </a:r>
-            <a:endParaRPr lang="en-CA" dirty="0"/>
-          </a:p>
-          <a:p>
-            <a:r>
-              <a:rPr lang="en-CA" dirty="0"/>
+            <a:endParaRPr lang="en-CA" dirty="0">
+              <a:solidFill>
+                <a:schemeClr val="bg1">
+                  <a:lumMod val="65000"/>
+                </a:schemeClr>
+              </a:solidFill>
+            </a:endParaRPr>
+          </a:p>
+          <a:p>
+            <a:r>
+              <a:rPr lang="en-CA" dirty="0">
+                <a:solidFill>
+                  <a:schemeClr val="tx1">
+                    <a:lumMod val="75000"/>
+                    <a:lumOff val="25000"/>
+                  </a:schemeClr>
+                </a:solidFill>
+              </a:rPr>
               <a:t>Low </a:t>
             </a:r>
             <a:r>
-              <a:rPr lang="en-CA" dirty="0" smtClean="0"/>
+              <a:rPr lang="en-CA" dirty="0" smtClean="0">
+                <a:solidFill>
+                  <a:schemeClr val="tx1">
+                    <a:lumMod val="75000"/>
+                    <a:lumOff val="25000"/>
+                  </a:schemeClr>
+                </a:solidFill>
+              </a:rPr>
               <a:t>JavaScript fatigue / reduced Churn</a:t>
             </a:r>
-            <a:endParaRPr lang="en-CA" dirty="0"/>
+            <a:endParaRPr lang="en-CA" dirty="0">
+              <a:solidFill>
+                <a:schemeClr val="tx1">
+                  <a:lumMod val="75000"/>
+                  <a:lumOff val="25000"/>
+                </a:schemeClr>
+              </a:solidFill>
+            </a:endParaRPr>
           </a:p>
           <a:p>
             <a:pPr marL="228600" lvl="1">
@@ -4367,63 +4625,117 @@
               </a:spcAft>
             </a:pPr>
             <a:r>
-              <a:rPr lang="en-CA" sz="2200" dirty="0" smtClean="0"/>
+              <a:rPr lang="en-CA" sz="2200" dirty="0" smtClean="0">
+                <a:solidFill>
+                  <a:schemeClr val="tx1">
+                    <a:lumMod val="75000"/>
+                    <a:lumOff val="25000"/>
+                  </a:schemeClr>
+                </a:solidFill>
+              </a:rPr>
               <a:t>Advocates </a:t>
             </a:r>
             <a:r>
-              <a:rPr lang="en-CA" sz="2200" dirty="0"/>
+              <a:rPr lang="en-CA" sz="2200" dirty="0">
+                <a:solidFill>
+                  <a:schemeClr val="tx1">
+                    <a:lumMod val="75000"/>
+                    <a:lumOff val="25000"/>
+                  </a:schemeClr>
+                </a:solidFill>
+              </a:rPr>
               <a:t>for the use of industry best practices such as: dependency injection, unit testing, service layers, interfaces and separation of concerns.  </a:t>
             </a:r>
           </a:p>
           <a:p>
             <a:r>
-              <a:rPr lang="en-US" dirty="0" smtClean="0"/>
+              <a:rPr lang="en-US" dirty="0" smtClean="0">
+                <a:solidFill>
+                  <a:schemeClr val="tx1">
+                    <a:lumMod val="75000"/>
+                    <a:lumOff val="25000"/>
+                  </a:schemeClr>
+                </a:solidFill>
+              </a:rPr>
               <a:t>S</a:t>
             </a:r>
             <a:r>
-              <a:rPr lang="en-US" dirty="0"/>
+              <a:rPr lang="en-US" dirty="0">
+                <a:solidFill>
+                  <a:schemeClr val="tx1">
+                    <a:lumMod val="75000"/>
+                    <a:lumOff val="25000"/>
+                  </a:schemeClr>
+                </a:solidFill>
+              </a:rPr>
               <a:t>tatic type checking with </a:t>
             </a:r>
             <a:r>
-              <a:rPr lang="en-US" dirty="0" err="1"/>
+              <a:rPr lang="en-US" dirty="0" err="1">
+                <a:solidFill>
+                  <a:schemeClr val="tx1">
+                    <a:lumMod val="75000"/>
+                    <a:lumOff val="25000"/>
+                  </a:schemeClr>
+                </a:solidFill>
+              </a:rPr>
               <a:t>TypeScript</a:t>
-            </a:r>
-            <a:endParaRPr lang="en-US" dirty="0"/>
-          </a:p>
-          <a:p>
-            <a:r>
-              <a:rPr lang="en-US" dirty="0" smtClean="0"/>
-              <a:t>Consistent </a:t>
-            </a:r>
-            <a:r>
-              <a:rPr lang="en-US" dirty="0"/>
-              <a:t>documentation</a:t>
-            </a:r>
-          </a:p>
-          <a:p>
-            <a:r>
-              <a:rPr lang="en-US" dirty="0" smtClean="0"/>
-              <a:t>Angular 2’s design embraces web component’s standard </a:t>
-            </a:r>
-            <a:r>
-              <a:rPr lang="en-US" dirty="0">
-                <a:solidFill>
-                  <a:schemeClr val="tx2">
-                    <a:lumMod val="40000"/>
-                    <a:lumOff val="60000"/>
-                  </a:schemeClr>
-                </a:solidFill>
-              </a:rPr>
-              <a:t>(rendering cross-platform native UI for iOS and Android)</a:t>
             </a:r>
             <a:endParaRPr lang="en-US" dirty="0">
               <a:solidFill>
-                <a:schemeClr val="tx2">
-                  <a:lumMod val="40000"/>
-                  <a:lumOff val="60000"/>
+                <a:schemeClr val="tx1">
+                  <a:lumMod val="75000"/>
+                  <a:lumOff val="25000"/>
                 </a:schemeClr>
               </a:solidFill>
             </a:endParaRPr>
+          </a:p>
+          <a:p>
+            <a:r>
+              <a:rPr lang="en-US" dirty="0" smtClean="0">
+                <a:solidFill>
+                  <a:schemeClr val="tx1">
+                    <a:lumMod val="75000"/>
+                    <a:lumOff val="25000"/>
+                  </a:schemeClr>
+                </a:solidFill>
+              </a:rPr>
+              <a:t>Consistent </a:t>
+            </a:r>
+            <a:r>
+              <a:rPr lang="en-US" dirty="0">
+                <a:solidFill>
+                  <a:schemeClr val="tx1">
+                    <a:lumMod val="75000"/>
+                    <a:lumOff val="25000"/>
+                  </a:schemeClr>
+                </a:solidFill>
+              </a:rPr>
+              <a:t>documentation</a:t>
+            </a:r>
+          </a:p>
+          <a:p>
+            <a:r>
+              <a:rPr lang="en-US" dirty="0" smtClean="0">
+                <a:solidFill>
+                  <a:schemeClr val="tx1">
+                    <a:lumMod val="75000"/>
+                    <a:lumOff val="25000"/>
+                  </a:schemeClr>
+                </a:solidFill>
+              </a:rPr>
+              <a:t>Angular 2’s design embraces web component’s standard </a:t>
+            </a:r>
+            <a:r>
+              <a:rPr lang="en-US" dirty="0">
+                <a:solidFill>
+                  <a:schemeClr val="bg1">
+                    <a:lumMod val="65000"/>
+                  </a:schemeClr>
+                </a:solidFill>
+              </a:rPr>
+              <a:t>(rendering cross-platform native UI for iOS and Android)</a:t>
+            </a:r>
           </a:p>
         </p:txBody>
       </p:sp>
@@ -4518,123 +4830,173 @@
           <a:lstStyle/>
           <a:p>
             <a:r>
-              <a:rPr lang="en-CA" u="sng" dirty="0">
-                <a:solidFill>
-                  <a:srgbClr val="8ABC49"/>
-                </a:solidFill>
-              </a:rPr>
-              <a:t>Template</a:t>
-            </a:r>
-            <a:r>
-              <a:rPr lang="en-CA" dirty="0"/>
-              <a:t> </a:t>
-            </a:r>
-            <a:r>
-              <a:rPr lang="en-CA" dirty="0" smtClean="0"/>
+              <a:rPr lang="en-CA" dirty="0">
+                <a:solidFill>
+                  <a:schemeClr val="tx1">
+                    <a:lumMod val="75000"/>
+                    <a:lumOff val="25000"/>
+                  </a:schemeClr>
+                </a:solidFill>
+              </a:rPr>
+              <a:t>Template </a:t>
+            </a:r>
+            <a:r>
+              <a:rPr lang="en-CA" dirty="0" smtClean="0">
+                <a:solidFill>
+                  <a:schemeClr val="tx1">
+                    <a:lumMod val="75000"/>
+                    <a:lumOff val="25000"/>
+                  </a:schemeClr>
+                </a:solidFill>
+              </a:rPr>
               <a:t>syntax takes some getting used to</a:t>
             </a:r>
           </a:p>
           <a:p>
             <a:r>
-              <a:rPr lang="en-CA" dirty="0" smtClean="0"/>
+              <a:rPr lang="en-CA" dirty="0" smtClean="0">
+                <a:solidFill>
+                  <a:schemeClr val="tx1">
+                    <a:lumMod val="75000"/>
+                    <a:lumOff val="25000"/>
+                  </a:schemeClr>
+                </a:solidFill>
+              </a:rPr>
               <a:t>No </a:t>
             </a:r>
             <a:r>
-              <a:rPr lang="en-CA" dirty="0"/>
-              <a:t>syntax highlighting within </a:t>
-            </a:r>
-            <a:r>
-              <a:rPr lang="en-CA" u="sng" dirty="0">
-                <a:solidFill>
-                  <a:srgbClr val="8ABC49"/>
-                </a:solidFill>
-              </a:rPr>
-              <a:t>Template</a:t>
-            </a:r>
-            <a:r>
-              <a:rPr lang="en-CA" dirty="0"/>
-              <a:t> </a:t>
-            </a:r>
-            <a:r>
-              <a:rPr lang="en-CA" dirty="0" smtClean="0"/>
+              <a:rPr lang="en-CA" dirty="0">
+                <a:solidFill>
+                  <a:schemeClr val="tx1">
+                    <a:lumMod val="75000"/>
+                    <a:lumOff val="25000"/>
+                  </a:schemeClr>
+                </a:solidFill>
+              </a:rPr>
+              <a:t>syntax highlighting within Template </a:t>
+            </a:r>
+            <a:r>
+              <a:rPr lang="en-CA" dirty="0" smtClean="0">
+                <a:solidFill>
+                  <a:schemeClr val="tx1">
+                    <a:lumMod val="75000"/>
+                    <a:lumOff val="25000"/>
+                  </a:schemeClr>
+                </a:solidFill>
+              </a:rPr>
               <a:t>or CSS strings</a:t>
             </a:r>
           </a:p>
           <a:p>
             <a:r>
-              <a:rPr lang="en-CA" dirty="0" smtClean="0"/>
+              <a:rPr lang="en-CA" dirty="0" smtClean="0">
+                <a:solidFill>
+                  <a:schemeClr val="tx1">
+                    <a:lumMod val="75000"/>
+                    <a:lumOff val="25000"/>
+                  </a:schemeClr>
+                </a:solidFill>
+              </a:rPr>
               <a:t>Many errors are caught at runtime</a:t>
             </a:r>
-            <a:endParaRPr lang="en-CA" dirty="0"/>
-          </a:p>
-          <a:p>
-            <a:r>
-              <a:rPr lang="en-CA" dirty="0"/>
-              <a:t>Just came out with a release candidate</a:t>
-            </a:r>
-          </a:p>
-          <a:p>
-            <a:r>
-              <a:rPr lang="en-CA" dirty="0"/>
-              <a:t>Modified parts of the API and </a:t>
-            </a:r>
-            <a:r>
-              <a:rPr lang="en-CA" u="sng" dirty="0">
-                <a:solidFill>
-                  <a:srgbClr val="8ABC49"/>
-                </a:solidFill>
-              </a:rPr>
-              <a:t>Template</a:t>
-            </a:r>
-            <a:r>
-              <a:rPr lang="en-CA" dirty="0"/>
-              <a:t> format during our investigation</a:t>
-            </a:r>
-          </a:p>
-          <a:p>
-            <a:r>
-              <a:rPr lang="en-CA" dirty="0"/>
-              <a:t>Some coding errors will not produce runtime or compiler errors </a:t>
-            </a:r>
-            <a:r>
-              <a:rPr lang="en-CA" dirty="0">
-                <a:solidFill>
-                  <a:schemeClr val="tx2">
-                    <a:lumMod val="40000"/>
-                    <a:lumOff val="60000"/>
-                  </a:schemeClr>
-                </a:solidFill>
-              </a:rPr>
-              <a:t>(very uncommon</a:t>
-            </a:r>
-            <a:r>
-              <a:rPr lang="en-CA" dirty="0" smtClean="0">
-                <a:solidFill>
-                  <a:schemeClr val="tx2">
-                    <a:lumMod val="40000"/>
-                    <a:lumOff val="60000"/>
-                  </a:schemeClr>
-                </a:solidFill>
-              </a:rPr>
-              <a:t>)</a:t>
-            </a:r>
-          </a:p>
-          <a:p>
-            <a:r>
-              <a:rPr lang="en-CA" dirty="0" smtClean="0"/>
-              <a:t>Does not contain any built-in handlers for state</a:t>
-            </a:r>
-            <a:endParaRPr lang="en-US" dirty="0">
+            <a:endParaRPr lang="en-CA" dirty="0">
               <a:solidFill>
-                <a:schemeClr val="tx2">
-                  <a:lumMod val="40000"/>
-                  <a:lumOff val="60000"/>
+                <a:schemeClr val="tx1">
+                  <a:lumMod val="75000"/>
+                  <a:lumOff val="25000"/>
                 </a:schemeClr>
               </a:solidFill>
             </a:endParaRPr>
           </a:p>
           <a:p>
-            <a:endParaRPr lang="en-US" dirty="0"/>
+            <a:r>
+              <a:rPr lang="en-CA" dirty="0">
+                <a:solidFill>
+                  <a:schemeClr val="tx1">
+                    <a:lumMod val="75000"/>
+                    <a:lumOff val="25000"/>
+                  </a:schemeClr>
+                </a:solidFill>
+              </a:rPr>
+              <a:t>Just came out with a release candidate</a:t>
+            </a:r>
+          </a:p>
+          <a:p>
+            <a:r>
+              <a:rPr lang="en-CA" dirty="0">
+                <a:solidFill>
+                  <a:schemeClr val="tx1">
+                    <a:lumMod val="75000"/>
+                    <a:lumOff val="25000"/>
+                  </a:schemeClr>
+                </a:solidFill>
+              </a:rPr>
+              <a:t>Modified parts of the API and Template format during our investigation</a:t>
+            </a:r>
+          </a:p>
+          <a:p>
+            <a:r>
+              <a:rPr lang="en-CA" dirty="0">
+                <a:solidFill>
+                  <a:schemeClr val="tx1">
+                    <a:lumMod val="75000"/>
+                    <a:lumOff val="25000"/>
+                  </a:schemeClr>
+                </a:solidFill>
+              </a:rPr>
+              <a:t>Some coding errors will not produce runtime or compiler errors </a:t>
+            </a:r>
+            <a:r>
+              <a:rPr lang="en-CA" dirty="0">
+                <a:solidFill>
+                  <a:schemeClr val="bg1">
+                    <a:lumMod val="65000"/>
+                  </a:schemeClr>
+                </a:solidFill>
+              </a:rPr>
+              <a:t>(very uncommon</a:t>
+            </a:r>
+            <a:r>
+              <a:rPr lang="en-CA" dirty="0" smtClean="0">
+                <a:solidFill>
+                  <a:schemeClr val="bg1">
+                    <a:lumMod val="65000"/>
+                  </a:schemeClr>
+                </a:solidFill>
+              </a:rPr>
+              <a:t>)</a:t>
+            </a:r>
+          </a:p>
+          <a:p>
+            <a:r>
+              <a:rPr lang="en-CA" dirty="0" smtClean="0">
+                <a:solidFill>
+                  <a:schemeClr val="tx1">
+                    <a:lumMod val="75000"/>
+                    <a:lumOff val="25000"/>
+                  </a:schemeClr>
+                </a:solidFill>
+              </a:rPr>
+              <a:t>Does not contain any built-in handlers for state</a:t>
+            </a:r>
+            <a:endParaRPr lang="en-US" dirty="0">
+              <a:solidFill>
+                <a:schemeClr val="tx1">
+                  <a:lumMod val="75000"/>
+                  <a:lumOff val="25000"/>
+                </a:schemeClr>
+              </a:solidFill>
+            </a:endParaRPr>
+          </a:p>
+          <a:p>
+            <a:endParaRPr lang="en-US" dirty="0">
+              <a:solidFill>
+                <a:schemeClr val="tx1">
+                  <a:lumMod val="75000"/>
+                  <a:lumOff val="25000"/>
+                </a:schemeClr>
+              </a:solidFill>
+            </a:endParaRPr>
           </a:p>
         </p:txBody>
       </p:sp>
@@ -4809,9 +5171,23 @@
           </a:p>
           <a:p>
             <a:r>
-              <a:rPr lang="en-US" dirty="0"/>
-              <a:t>http://developer.telerik.com/featured/will-angular-2-be-a-success-you-bet/</a:t>
-            </a:r>
+              <a:rPr lang="en-US" dirty="0">
+                <a:hlinkClick r:id="rId7"/>
+              </a:rPr>
+              <a:t>http://developer.telerik.com/featured/will-angular-2-be-a-success-you-bet</a:t>
+            </a:r>
+            <a:r>
+              <a:rPr lang="en-US" dirty="0" smtClean="0">
+                <a:hlinkClick r:id="rId7"/>
+              </a:rPr>
+              <a:t>/</a:t>
+            </a:r>
+            <a:endParaRPr lang="en-US" dirty="0" smtClean="0"/>
+          </a:p>
+          <a:p>
+            <a:pPr marL="45720" indent="0">
+              <a:buNone/>
+            </a:pPr>
             <a:endParaRPr lang="en-US" dirty="0" smtClean="0"/>
           </a:p>
           <a:p>
@@ -4922,77 +5298,173 @@
               <a:buNone/>
             </a:pPr>
             <a:r>
-              <a:rPr lang="en-CA" b="1" dirty="0"/>
+              <a:rPr lang="en-CA" b="1" dirty="0">
+                <a:solidFill>
+                  <a:schemeClr val="tx1">
+                    <a:lumMod val="75000"/>
+                    <a:lumOff val="25000"/>
+                  </a:schemeClr>
+                </a:solidFill>
+              </a:rPr>
               <a:t>AngularJS</a:t>
             </a:r>
             <a:r>
-              <a:rPr lang="en-CA" dirty="0"/>
+              <a:rPr lang="en-CA" dirty="0">
+                <a:solidFill>
+                  <a:schemeClr val="tx1">
+                    <a:lumMod val="75000"/>
+                    <a:lumOff val="25000"/>
+                  </a:schemeClr>
+                </a:solidFill>
+              </a:rPr>
               <a:t> is an </a:t>
             </a:r>
             <a:r>
               <a:rPr lang="en-CA" dirty="0">
                 <a:solidFill>
-                  <a:srgbClr val="8ABC49"/>
+                  <a:schemeClr val="tx1">
+                    <a:lumMod val="75000"/>
+                    <a:lumOff val="25000"/>
+                  </a:schemeClr>
                 </a:solidFill>
                 <a:hlinkClick r:id="rId2" tooltip="Open-source software"/>
               </a:rPr>
               <a:t>open-source</a:t>
             </a:r>
             <a:r>
-              <a:rPr lang="en-CA" dirty="0"/>
+              <a:rPr lang="en-CA" dirty="0">
+                <a:solidFill>
+                  <a:schemeClr val="tx1">
+                    <a:lumMod val="75000"/>
+                    <a:lumOff val="25000"/>
+                  </a:schemeClr>
+                </a:solidFill>
+              </a:rPr>
               <a:t> </a:t>
             </a:r>
             <a:r>
               <a:rPr lang="en-CA" dirty="0">
+                <a:solidFill>
+                  <a:schemeClr val="tx1">
+                    <a:lumMod val="75000"/>
+                    <a:lumOff val="25000"/>
+                  </a:schemeClr>
+                </a:solidFill>
                 <a:hlinkClick r:id="rId3" tooltip="Web application framework"/>
               </a:rPr>
               <a:t>web application framework</a:t>
             </a:r>
             <a:r>
-              <a:rPr lang="en-CA" dirty="0"/>
+              <a:rPr lang="en-CA" dirty="0">
+                <a:solidFill>
+                  <a:schemeClr val="tx1">
+                    <a:lumMod val="75000"/>
+                    <a:lumOff val="25000"/>
+                  </a:schemeClr>
+                </a:solidFill>
+              </a:rPr>
               <a:t> mainly maintained by </a:t>
             </a:r>
             <a:r>
               <a:rPr lang="en-CA" dirty="0">
+                <a:solidFill>
+                  <a:schemeClr val="tx1">
+                    <a:lumMod val="75000"/>
+                    <a:lumOff val="25000"/>
+                  </a:schemeClr>
+                </a:solidFill>
                 <a:hlinkClick r:id="rId4" tooltip="Google"/>
               </a:rPr>
               <a:t>Google</a:t>
             </a:r>
             <a:r>
-              <a:rPr lang="en-CA" dirty="0"/>
+              <a:rPr lang="en-CA" dirty="0">
+                <a:solidFill>
+                  <a:schemeClr val="tx1">
+                    <a:lumMod val="75000"/>
+                    <a:lumOff val="25000"/>
+                  </a:schemeClr>
+                </a:solidFill>
+              </a:rPr>
               <a:t> and by a community of individuals and corporations to address many of the challenges encountered in developing </a:t>
             </a:r>
             <a:r>
               <a:rPr lang="en-CA" dirty="0">
+                <a:solidFill>
+                  <a:schemeClr val="tx1">
+                    <a:lumMod val="75000"/>
+                    <a:lumOff val="25000"/>
+                  </a:schemeClr>
+                </a:solidFill>
                 <a:hlinkClick r:id="rId5" tooltip="Single-page application"/>
               </a:rPr>
               <a:t>single-page applications</a:t>
             </a:r>
             <a:r>
-              <a:rPr lang="en-CA" dirty="0"/>
+              <a:rPr lang="en-CA" dirty="0">
+                <a:solidFill>
+                  <a:schemeClr val="tx1">
+                    <a:lumMod val="75000"/>
+                    <a:lumOff val="25000"/>
+                  </a:schemeClr>
+                </a:solidFill>
+              </a:rPr>
               <a:t>. It aims to simplify both the development and the </a:t>
             </a:r>
             <a:r>
               <a:rPr lang="en-CA" dirty="0">
+                <a:solidFill>
+                  <a:schemeClr val="tx1">
+                    <a:lumMod val="75000"/>
+                    <a:lumOff val="25000"/>
+                  </a:schemeClr>
+                </a:solidFill>
                 <a:hlinkClick r:id="rId6" tooltip="Software testing"/>
               </a:rPr>
               <a:t>testing</a:t>
             </a:r>
             <a:r>
-              <a:rPr lang="en-CA" dirty="0"/>
+              <a:rPr lang="en-CA" dirty="0">
+                <a:solidFill>
+                  <a:schemeClr val="tx1">
+                    <a:lumMod val="75000"/>
+                    <a:lumOff val="25000"/>
+                  </a:schemeClr>
+                </a:solidFill>
+              </a:rPr>
               <a:t> of such applications by providing a framework for client-side architectures, along with components commonly used in </a:t>
             </a:r>
             <a:r>
               <a:rPr lang="en-CA" dirty="0">
+                <a:solidFill>
+                  <a:schemeClr val="tx1">
+                    <a:lumMod val="75000"/>
+                    <a:lumOff val="25000"/>
+                  </a:schemeClr>
+                </a:solidFill>
                 <a:hlinkClick r:id="rId7" tooltip="Rich Internet Application"/>
               </a:rPr>
               <a:t>rich Internet applications</a:t>
             </a:r>
             <a:r>
-              <a:rPr lang="en-CA" dirty="0"/>
+              <a:rPr lang="en-CA" dirty="0">
+                <a:solidFill>
+                  <a:schemeClr val="tx1">
+                    <a:lumMod val="75000"/>
+                    <a:lumOff val="25000"/>
+                  </a:schemeClr>
+                </a:solidFill>
+              </a:rPr>
               <a:t>.</a:t>
             </a:r>
-            <a:endParaRPr lang="en-US" dirty="0"/>
+            <a:endParaRPr lang="en-US" dirty="0">
+              <a:solidFill>
+                <a:schemeClr val="tx1">
+                  <a:lumMod val="75000"/>
+                  <a:lumOff val="25000"/>
+                </a:schemeClr>
+              </a:solidFill>
+            </a:endParaRPr>
           </a:p>
         </p:txBody>
       </p:sp>
@@ -5265,13 +5737,20 @@
           <a:lstStyle/>
           <a:p>
             <a:r>
-              <a:rPr lang="en-CA" dirty="0"/>
+              <a:rPr lang="en-CA" dirty="0">
+                <a:solidFill>
+                  <a:schemeClr val="tx1">
+                    <a:lumMod val="75000"/>
+                    <a:lumOff val="25000"/>
+                  </a:schemeClr>
+                </a:solidFill>
+              </a:rPr>
               <a:t>Projects contain a single root </a:t>
             </a:r>
             <a:r>
-              <a:rPr lang="en-CA" u="sng" dirty="0">
-                <a:solidFill>
-                  <a:srgbClr val="8ABC49"/>
+              <a:rPr lang="en-CA" dirty="0">
+                <a:solidFill>
+                  <a:srgbClr val="1CADE4"/>
                 </a:solidFill>
               </a:rPr>
               <a:t>Component</a:t>
@@ -5279,62 +5758,100 @@
           </a:p>
           <a:p>
             <a:r>
-              <a:rPr lang="en-CA" u="sng" dirty="0">
-                <a:solidFill>
-                  <a:srgbClr val="8ABC49"/>
+              <a:rPr lang="en-CA" dirty="0">
+                <a:solidFill>
+                  <a:srgbClr val="1CADE4"/>
                 </a:solidFill>
               </a:rPr>
               <a:t>Components</a:t>
             </a:r>
             <a:r>
-              <a:rPr lang="en-CA" dirty="0"/>
+              <a:rPr lang="en-CA" dirty="0">
+                <a:solidFill>
+                  <a:schemeClr val="tx1">
+                    <a:lumMod val="75000"/>
+                    <a:lumOff val="25000"/>
+                  </a:schemeClr>
+                </a:solidFill>
+              </a:rPr>
               <a:t> contain a </a:t>
             </a:r>
             <a:r>
-              <a:rPr lang="en-CA" u="sng" dirty="0" smtClean="0">
-                <a:solidFill>
-                  <a:srgbClr val="8ABC49"/>
+              <a:rPr lang="en-CA" dirty="0" smtClean="0">
+                <a:solidFill>
+                  <a:srgbClr val="1CADE4"/>
                 </a:solidFill>
               </a:rPr>
               <a:t>Template</a:t>
             </a:r>
             <a:r>
-              <a:rPr lang="en-CA" dirty="0" smtClean="0"/>
+              <a:rPr lang="en-CA" dirty="0" smtClean="0">
+                <a:solidFill>
+                  <a:schemeClr val="tx1">
+                    <a:lumMod val="75000"/>
+                    <a:lumOff val="25000"/>
+                  </a:schemeClr>
+                </a:solidFill>
+              </a:rPr>
               <a:t> </a:t>
             </a:r>
             <a:r>
-              <a:rPr lang="en-CA" dirty="0"/>
+              <a:rPr lang="en-CA" dirty="0">
+                <a:solidFill>
+                  <a:schemeClr val="tx1">
+                    <a:lumMod val="75000"/>
+                    <a:lumOff val="25000"/>
+                  </a:schemeClr>
+                </a:solidFill>
+              </a:rPr>
               <a:t>defined in its   metadata</a:t>
             </a:r>
           </a:p>
           <a:p>
             <a:r>
-              <a:rPr lang="en-CA" u="sng" dirty="0">
-                <a:solidFill>
-                  <a:srgbClr val="8ABC49"/>
+              <a:rPr lang="en-CA" dirty="0">
+                <a:solidFill>
+                  <a:srgbClr val="1CADE4"/>
                 </a:solidFill>
               </a:rPr>
               <a:t>Templates</a:t>
             </a:r>
             <a:r>
-              <a:rPr lang="en-CA" dirty="0"/>
+              <a:rPr lang="en-CA" dirty="0">
+                <a:solidFill>
+                  <a:schemeClr val="tx1">
+                    <a:lumMod val="75000"/>
+                    <a:lumOff val="25000"/>
+                  </a:schemeClr>
+                </a:solidFill>
+              </a:rPr>
               <a:t> may contain </a:t>
             </a:r>
             <a:r>
-              <a:rPr lang="en-CA" u="sng" dirty="0" smtClean="0">
-                <a:solidFill>
-                  <a:srgbClr val="8ABC49"/>
+              <a:rPr lang="en-CA" dirty="0" smtClean="0">
+                <a:solidFill>
+                  <a:srgbClr val="1CADE4"/>
                 </a:solidFill>
               </a:rPr>
               <a:t>Directives</a:t>
             </a:r>
             <a:r>
-              <a:rPr lang="en-CA" dirty="0" smtClean="0"/>
+              <a:rPr lang="en-CA" dirty="0" smtClean="0">
+                <a:solidFill>
+                  <a:schemeClr val="tx1">
+                    <a:lumMod val="75000"/>
+                    <a:lumOff val="25000"/>
+                  </a:schemeClr>
+                </a:solidFill>
+              </a:rPr>
               <a:t> which change the behaviour or appearance of the DOM</a:t>
             </a:r>
             <a:endParaRPr lang="en-CA" u="sng" dirty="0">
               <a:solidFill>
-                <a:srgbClr val="8ABC49"/>
+                <a:schemeClr val="tx1">
+                  <a:lumMod val="75000"/>
+                  <a:lumOff val="25000"/>
+                </a:schemeClr>
               </a:solidFill>
             </a:endParaRPr>
           </a:p>
@@ -5475,7 +5992,7 @@
         </p:nvSpPr>
         <p:spPr>
           <a:xfrm>
-            <a:off x="5414403" y="2967357"/>
+            <a:off x="5414403" y="2799406"/>
             <a:ext cx="6062250" cy="2085976"/>
           </a:xfrm>
         </p:spPr>
@@ -5486,82 +6003,138 @@
           <a:lstStyle/>
           <a:p>
             <a:r>
-              <a:rPr lang="en-CA" u="sng" dirty="0">
-                <a:solidFill>
-                  <a:srgbClr val="8ABC49"/>
-                </a:solidFill>
-              </a:rPr>
-              <a:t>Components </a:t>
-            </a:r>
-            <a:r>
-              <a:rPr lang="en-CA" dirty="0"/>
+              <a:rPr lang="en-CA" dirty="0" smtClean="0">
+                <a:solidFill>
+                  <a:srgbClr val="1CADE4"/>
+                </a:solidFill>
+              </a:rPr>
+              <a:t>Components</a:t>
+            </a:r>
+            <a:r>
+              <a:rPr lang="en-CA" dirty="0" smtClean="0">
+                <a:solidFill>
+                  <a:schemeClr val="tx1">
+                    <a:lumMod val="75000"/>
+                    <a:lumOff val="25000"/>
+                  </a:schemeClr>
+                </a:solidFill>
+              </a:rPr>
+              <a:t> </a:t>
+            </a:r>
+            <a:r>
+              <a:rPr lang="en-CA" dirty="0" smtClean="0">
+                <a:solidFill>
+                  <a:schemeClr val="tx1">
+                    <a:lumMod val="75000"/>
+                    <a:lumOff val="25000"/>
+                  </a:schemeClr>
+                </a:solidFill>
+              </a:rPr>
               <a:t>and </a:t>
             </a:r>
             <a:r>
-              <a:rPr lang="en-CA" u="sng" dirty="0">
-                <a:solidFill>
-                  <a:srgbClr val="8ABC49"/>
+              <a:rPr lang="en-CA" dirty="0">
+                <a:solidFill>
+                  <a:srgbClr val="1CADE4"/>
                 </a:solidFill>
               </a:rPr>
               <a:t>Templates</a:t>
             </a:r>
             <a:r>
-              <a:rPr lang="en-CA" dirty="0"/>
+              <a:rPr lang="en-CA" dirty="0">
+                <a:solidFill>
+                  <a:schemeClr val="tx1">
+                    <a:lumMod val="75000"/>
+                    <a:lumOff val="25000"/>
+                  </a:schemeClr>
+                </a:solidFill>
+              </a:rPr>
               <a:t> communicate through their bindings</a:t>
             </a:r>
             <a:endParaRPr lang="en-CA" u="sng" dirty="0">
               <a:solidFill>
-                <a:srgbClr val="8ABC49"/>
+                <a:schemeClr val="tx1">
+                  <a:lumMod val="75000"/>
+                  <a:lumOff val="25000"/>
+                </a:schemeClr>
               </a:solidFill>
             </a:endParaRPr>
           </a:p>
           <a:p>
             <a:r>
-              <a:rPr lang="en-CA" u="sng" dirty="0">
-                <a:solidFill>
-                  <a:srgbClr val="8ABC49"/>
+              <a:rPr lang="en-CA" dirty="0">
+                <a:solidFill>
+                  <a:srgbClr val="1CADE4"/>
                 </a:solidFill>
               </a:rPr>
               <a:t>Property-bindings</a:t>
             </a:r>
             <a:r>
-              <a:rPr lang="en-CA" dirty="0"/>
+              <a:rPr lang="en-CA" dirty="0">
+                <a:solidFill>
+                  <a:schemeClr val="tx1">
+                    <a:lumMod val="75000"/>
+                    <a:lumOff val="25000"/>
+                  </a:schemeClr>
+                </a:solidFill>
+              </a:rPr>
               <a:t> and </a:t>
             </a:r>
             <a:r>
-              <a:rPr lang="en-CA" u="sng" dirty="0">
-                <a:solidFill>
-                  <a:srgbClr val="8ABC49"/>
+              <a:rPr lang="en-CA" dirty="0">
+                <a:solidFill>
+                  <a:srgbClr val="1CADE4"/>
                 </a:solidFill>
               </a:rPr>
               <a:t>Event-bindings</a:t>
             </a:r>
             <a:r>
-              <a:rPr lang="en-CA" dirty="0"/>
+              <a:rPr lang="en-CA" dirty="0">
+                <a:solidFill>
+                  <a:schemeClr val="tx1">
+                    <a:lumMod val="75000"/>
+                    <a:lumOff val="25000"/>
+                  </a:schemeClr>
+                </a:solidFill>
+              </a:rPr>
               <a:t> are one-way</a:t>
             </a:r>
           </a:p>
           <a:p>
             <a:r>
-              <a:rPr lang="en-CA" dirty="0"/>
+              <a:rPr lang="en-CA" dirty="0">
+                <a:solidFill>
+                  <a:schemeClr val="tx1">
+                    <a:lumMod val="75000"/>
+                    <a:lumOff val="25000"/>
+                  </a:schemeClr>
+                </a:solidFill>
+              </a:rPr>
               <a:t>A </a:t>
             </a:r>
             <a:r>
-              <a:rPr lang="en-CA" u="sng" dirty="0">
-                <a:solidFill>
-                  <a:srgbClr val="8ABC49"/>
+              <a:rPr lang="en-CA" dirty="0">
+                <a:solidFill>
+                  <a:srgbClr val="1CADE4"/>
                 </a:solidFill>
               </a:rPr>
               <a:t>Component</a:t>
             </a:r>
             <a:r>
-              <a:rPr lang="en-CA" dirty="0"/>
+              <a:rPr lang="en-CA" dirty="0">
+                <a:solidFill>
+                  <a:schemeClr val="tx1">
+                    <a:lumMod val="75000"/>
+                    <a:lumOff val="25000"/>
+                  </a:schemeClr>
+                </a:solidFill>
+              </a:rPr>
               <a:t> can expose specific properties or methods to other </a:t>
             </a:r>
             <a:r>
-              <a:rPr lang="en-CA" u="sng" dirty="0">
-                <a:solidFill>
-                  <a:srgbClr val="8ABC49"/>
+              <a:rPr lang="en-CA" dirty="0">
+                <a:solidFill>
+                  <a:srgbClr val="1CADE4"/>
                 </a:solidFill>
               </a:rPr>
               <a:t>Components</a:t>
@@ -5715,64 +6288,142 @@
           <a:lstStyle/>
           <a:p>
             <a:r>
-              <a:rPr lang="en-CA" u="sng" dirty="0">
-                <a:solidFill>
-                  <a:srgbClr val="8ABC49"/>
-                </a:solidFill>
-              </a:rPr>
-              <a:t>Services </a:t>
-            </a:r>
-            <a:r>
-              <a:rPr lang="en-CA" dirty="0"/>
-              <a:t>contain your business logic and </a:t>
-            </a:r>
-            <a:r>
-              <a:rPr lang="en-CA" dirty="0" smtClean="0"/>
+              <a:rPr lang="en-CA" dirty="0" smtClean="0">
+                <a:solidFill>
+                  <a:srgbClr val="1CADE4"/>
+                </a:solidFill>
+              </a:rPr>
+              <a:t>Services</a:t>
+            </a:r>
+            <a:r>
+              <a:rPr lang="en-CA" dirty="0" smtClean="0">
+                <a:solidFill>
+                  <a:schemeClr val="tx1">
+                    <a:lumMod val="75000"/>
+                    <a:lumOff val="25000"/>
+                  </a:schemeClr>
+                </a:solidFill>
+              </a:rPr>
+              <a:t> contain </a:t>
+            </a:r>
+            <a:r>
+              <a:rPr lang="en-CA" dirty="0">
+                <a:solidFill>
+                  <a:schemeClr val="tx1">
+                    <a:lumMod val="75000"/>
+                    <a:lumOff val="25000"/>
+                  </a:schemeClr>
+                </a:solidFill>
+              </a:rPr>
+              <a:t>your business logic and </a:t>
+            </a:r>
+            <a:r>
+              <a:rPr lang="en-CA" dirty="0" smtClean="0">
+                <a:solidFill>
+                  <a:schemeClr val="tx1">
+                    <a:lumMod val="75000"/>
+                    <a:lumOff val="25000"/>
+                  </a:schemeClr>
+                </a:solidFill>
+              </a:rPr>
               <a:t>commonly make requests </a:t>
             </a:r>
             <a:r>
-              <a:rPr lang="en-CA" dirty="0"/>
+              <a:rPr lang="en-CA" dirty="0">
+                <a:solidFill>
+                  <a:schemeClr val="tx1">
+                    <a:lumMod val="75000"/>
+                    <a:lumOff val="25000"/>
+                  </a:schemeClr>
+                </a:solidFill>
+              </a:rPr>
               <a:t>to your </a:t>
             </a:r>
             <a:r>
-              <a:rPr lang="en-CA" dirty="0" smtClean="0"/>
+              <a:rPr lang="en-CA" dirty="0" smtClean="0">
+                <a:solidFill>
+                  <a:schemeClr val="tx1">
+                    <a:lumMod val="75000"/>
+                    <a:lumOff val="25000"/>
+                  </a:schemeClr>
+                </a:solidFill>
+              </a:rPr>
               <a:t>server</a:t>
             </a:r>
             <a:endParaRPr lang="en-CA" u="sng" dirty="0">
               <a:solidFill>
-                <a:srgbClr val="8ABC49"/>
+                <a:schemeClr val="tx1">
+                  <a:lumMod val="75000"/>
+                  <a:lumOff val="25000"/>
+                </a:schemeClr>
               </a:solidFill>
             </a:endParaRPr>
           </a:p>
           <a:p>
             <a:r>
-              <a:rPr lang="en-CA" u="sng" dirty="0">
-                <a:solidFill>
-                  <a:srgbClr val="8ABC49"/>
-                </a:solidFill>
-              </a:rPr>
-              <a:t>Services </a:t>
-            </a:r>
-            <a:r>
-              <a:rPr lang="en-CA" dirty="0"/>
-              <a:t>are </a:t>
-            </a:r>
-            <a:r>
-              <a:rPr lang="en-CA" u="sng" dirty="0" smtClean="0">
-                <a:solidFill>
-                  <a:srgbClr val="8ABC49"/>
-                </a:solidFill>
-              </a:rPr>
-              <a:t>Injected </a:t>
-            </a:r>
-            <a:r>
-              <a:rPr lang="en-CA" dirty="0"/>
+              <a:rPr lang="en-CA" dirty="0">
+                <a:solidFill>
+                  <a:srgbClr val="1CADE4"/>
+                </a:solidFill>
+              </a:rPr>
+              <a:t>Services</a:t>
+            </a:r>
+            <a:r>
+              <a:rPr lang="en-CA" dirty="0">
+                <a:solidFill>
+                  <a:schemeClr val="tx1">
+                    <a:lumMod val="75000"/>
+                    <a:lumOff val="25000"/>
+                  </a:schemeClr>
+                </a:solidFill>
+              </a:rPr>
+              <a:t> </a:t>
+            </a:r>
+            <a:r>
+              <a:rPr lang="en-CA" dirty="0" smtClean="0">
+                <a:solidFill>
+                  <a:schemeClr val="tx1">
+                    <a:lumMod val="75000"/>
+                    <a:lumOff val="25000"/>
+                  </a:schemeClr>
+                </a:solidFill>
+              </a:rPr>
+              <a:t>can be </a:t>
+            </a:r>
+            <a:r>
+              <a:rPr lang="en-CA" dirty="0" smtClean="0">
+                <a:solidFill>
+                  <a:srgbClr val="1CADE4"/>
+                </a:solidFill>
+              </a:rPr>
+              <a:t>Injected</a:t>
+            </a:r>
+            <a:r>
+              <a:rPr lang="en-CA" dirty="0" smtClean="0">
+                <a:solidFill>
+                  <a:schemeClr val="tx1">
+                    <a:lumMod val="75000"/>
+                    <a:lumOff val="25000"/>
+                  </a:schemeClr>
+                </a:solidFill>
+              </a:rPr>
+              <a:t> </a:t>
+            </a:r>
+            <a:r>
+              <a:rPr lang="en-CA" dirty="0">
+                <a:solidFill>
+                  <a:schemeClr val="tx1">
+                    <a:lumMod val="75000"/>
+                    <a:lumOff val="25000"/>
+                  </a:schemeClr>
+                </a:solidFill>
+              </a:rPr>
               <a:t>into </a:t>
             </a:r>
             <a:r>
-              <a:rPr lang="en-CA" u="sng" dirty="0">
-                <a:solidFill>
-                  <a:srgbClr val="8ABC49"/>
+              <a:rPr lang="en-CA" dirty="0">
+                <a:solidFill>
+                  <a:srgbClr val="1CADE4"/>
                 </a:solidFill>
               </a:rPr>
               <a:t>Components</a:t>
@@ -5780,12 +6431,22 @@
           </a:p>
           <a:p>
             <a:r>
-              <a:rPr lang="en-CA" dirty="0"/>
+              <a:rPr lang="en-CA" dirty="0">
+                <a:solidFill>
+                  <a:schemeClr val="tx1">
+                    <a:lumMod val="75000"/>
+                    <a:lumOff val="25000"/>
+                  </a:schemeClr>
+                </a:solidFill>
+              </a:rPr>
               <a:t>This approach increases testability across the whole application</a:t>
             </a:r>
             <a:endParaRPr lang="en-CA" u="sng" dirty="0">
               <a:solidFill>
-                <a:srgbClr val="8ABC49"/>
+                <a:schemeClr val="tx1">
+                  <a:lumMod val="75000"/>
+                  <a:lumOff val="25000"/>
+                </a:schemeClr>
               </a:solidFill>
             </a:endParaRPr>
           </a:p>
@@ -5952,32 +6613,66 @@
           <a:lstStyle/>
           <a:p>
             <a:r>
-              <a:rPr lang="en-CA" dirty="0"/>
+              <a:rPr lang="en-CA" dirty="0">
+                <a:solidFill>
+                  <a:schemeClr val="tx1">
+                    <a:lumMod val="75000"/>
+                    <a:lumOff val="25000"/>
+                  </a:schemeClr>
+                </a:solidFill>
+              </a:rPr>
               <a:t>Fairly easy to </a:t>
             </a:r>
             <a:r>
-              <a:rPr lang="en-CA" dirty="0" smtClean="0"/>
+              <a:rPr lang="en-CA" dirty="0" smtClean="0">
+                <a:solidFill>
+                  <a:schemeClr val="tx1">
+                    <a:lumMod val="75000"/>
+                    <a:lumOff val="25000"/>
+                  </a:schemeClr>
+                </a:solidFill>
+              </a:rPr>
               <a:t>pick</a:t>
             </a:r>
           </a:p>
           <a:p>
             <a:r>
-              <a:rPr lang="en-CA" dirty="0" smtClean="0"/>
+              <a:rPr lang="en-CA" dirty="0" smtClean="0">
+                <a:solidFill>
+                  <a:schemeClr val="tx1">
+                    <a:lumMod val="75000"/>
+                    <a:lumOff val="25000"/>
+                  </a:schemeClr>
+                </a:solidFill>
+              </a:rPr>
               <a:t>Has similar concepts and structure to our backend</a:t>
             </a:r>
-            <a:endParaRPr lang="en-CA" dirty="0"/>
-          </a:p>
-          <a:p>
-            <a:r>
-              <a:rPr lang="en-CA" dirty="0"/>
+            <a:endParaRPr lang="en-CA" dirty="0">
+              <a:solidFill>
+                <a:schemeClr val="tx1">
+                  <a:lumMod val="75000"/>
+                  <a:lumOff val="25000"/>
+                </a:schemeClr>
+              </a:solidFill>
+            </a:endParaRPr>
+          </a:p>
+          <a:p>
+            <a:r>
+              <a:rPr lang="en-CA" dirty="0">
+                <a:solidFill>
+                  <a:schemeClr val="tx1">
+                    <a:lumMod val="75000"/>
+                    <a:lumOff val="25000"/>
+                  </a:schemeClr>
+                </a:solidFill>
+              </a:rPr>
               <a:t>Lots of training videos already </a:t>
             </a:r>
             <a:r>
               <a:rPr lang="en-CA" dirty="0">
                 <a:solidFill>
-                  <a:schemeClr val="tx2">
-                    <a:lumMod val="40000"/>
-                    <a:lumOff val="60000"/>
+                  <a:schemeClr val="bg1">
+                    <a:lumMod val="75000"/>
                   </a:schemeClr>
                 </a:solidFill>
               </a:rPr>
@@ -5986,9 +6681,8 @@
             <a:r>
               <a:rPr lang="en-CA" dirty="0" err="1">
                 <a:solidFill>
-                  <a:schemeClr val="tx2">
-                    <a:lumMod val="40000"/>
-                    <a:lumOff val="60000"/>
+                  <a:schemeClr val="bg1">
+                    <a:lumMod val="75000"/>
                   </a:schemeClr>
                 </a:solidFill>
               </a:rPr>
@@ -5997,9 +6691,8 @@
             <a:r>
               <a:rPr lang="en-CA" dirty="0">
                 <a:solidFill>
-                  <a:schemeClr val="tx2">
-                    <a:lumMod val="40000"/>
-                    <a:lumOff val="60000"/>
+                  <a:schemeClr val="bg1">
+                    <a:lumMod val="75000"/>
                   </a:schemeClr>
                 </a:solidFill>
               </a:rPr>
@@ -6008,9 +6701,8 @@
             <a:r>
               <a:rPr lang="en-CA" dirty="0" err="1">
                 <a:solidFill>
-                  <a:schemeClr val="tx2">
-                    <a:lumMod val="40000"/>
-                    <a:lumOff val="60000"/>
+                  <a:schemeClr val="bg1">
+                    <a:lumMod val="75000"/>
                   </a:schemeClr>
                 </a:solidFill>
               </a:rPr>
@@ -6019,9 +6711,8 @@
             <a:r>
               <a:rPr lang="en-CA" dirty="0">
                 <a:solidFill>
-                  <a:schemeClr val="tx2">
-                    <a:lumMod val="40000"/>
-                    <a:lumOff val="60000"/>
+                  <a:schemeClr val="bg1">
+                    <a:lumMod val="75000"/>
                   </a:schemeClr>
                 </a:solidFill>
               </a:rPr>
@@ -6030,21 +6721,34 @@
           </a:p>
           <a:p>
             <a:r>
-              <a:rPr lang="en-CA" dirty="0"/>
+              <a:rPr lang="en-CA" dirty="0">
+                <a:solidFill>
+                  <a:schemeClr val="tx1">
+                    <a:lumMod val="75000"/>
+                    <a:lumOff val="25000"/>
+                  </a:schemeClr>
+                </a:solidFill>
+              </a:rPr>
               <a:t>Angular.io contains a thorough tutorial project</a:t>
             </a:r>
           </a:p>
           <a:p>
             <a:r>
-              <a:rPr lang="en-CA" dirty="0"/>
+              <a:rPr lang="en-CA" dirty="0">
+                <a:solidFill>
+                  <a:schemeClr val="tx1">
+                    <a:lumMod val="75000"/>
+                    <a:lumOff val="25000"/>
+                  </a:schemeClr>
+                </a:solidFill>
+              </a:rPr>
               <a:t>Already contains 7500+ stack overflow questions </a:t>
             </a:r>
             <a:r>
               <a:rPr lang="en-CA" dirty="0">
                 <a:solidFill>
-                  <a:schemeClr val="tx2">
-                    <a:lumMod val="40000"/>
-                    <a:lumOff val="60000"/>
+                  <a:schemeClr val="bg1">
+                    <a:lumMod val="75000"/>
                   </a:schemeClr>
                 </a:solidFill>
               </a:rPr>
@@ -6053,9 +6757,8 @@
             <a:r>
               <a:rPr lang="en-CA" dirty="0" err="1">
                 <a:solidFill>
-                  <a:schemeClr val="tx2">
-                    <a:lumMod val="40000"/>
-                    <a:lumOff val="60000"/>
+                  <a:schemeClr val="bg1">
+                    <a:lumMod val="75000"/>
                   </a:schemeClr>
                 </a:solidFill>
               </a:rPr>
@@ -6064,9 +6767,8 @@
             <a:r>
               <a:rPr lang="en-CA" dirty="0" smtClean="0">
                 <a:solidFill>
-                  <a:schemeClr val="tx2">
-                    <a:lumMod val="40000"/>
-                    <a:lumOff val="60000"/>
+                  <a:schemeClr val="bg1">
+                    <a:lumMod val="75000"/>
                   </a:schemeClr>
                 </a:solidFill>
               </a:rPr>
@@ -6075,37 +6777,71 @@
           </a:p>
           <a:p>
             <a:r>
-              <a:rPr lang="en-CA" dirty="0" smtClean="0"/>
+              <a:rPr lang="en-CA" dirty="0" smtClean="0">
+                <a:solidFill>
+                  <a:schemeClr val="tx1">
+                    <a:lumMod val="75000"/>
+                    <a:lumOff val="25000"/>
+                  </a:schemeClr>
+                </a:solidFill>
+              </a:rPr>
               <a:t>HTML </a:t>
             </a:r>
             <a:r>
-              <a:rPr lang="en-CA" dirty="0"/>
+              <a:rPr lang="en-CA" dirty="0">
+                <a:solidFill>
+                  <a:schemeClr val="tx1">
+                    <a:lumMod val="75000"/>
+                    <a:lumOff val="25000"/>
+                  </a:schemeClr>
+                </a:solidFill>
+              </a:rPr>
               <a:t>template syntax gets some getting used to</a:t>
             </a:r>
           </a:p>
           <a:p>
             <a:r>
-              <a:rPr lang="en-CA" dirty="0"/>
+              <a:rPr lang="en-CA" dirty="0">
+                <a:solidFill>
+                  <a:schemeClr val="tx1">
+                    <a:lumMod val="75000"/>
+                    <a:lumOff val="25000"/>
+                  </a:schemeClr>
+                </a:solidFill>
+              </a:rPr>
               <a:t>Positive changes have been made to their </a:t>
             </a:r>
             <a:r>
-              <a:rPr lang="en-CA" u="sng" dirty="0" smtClean="0">
-                <a:solidFill>
-                  <a:srgbClr val="8ABC49"/>
-                </a:solidFill>
-              </a:rPr>
-              <a:t>Template</a:t>
-            </a:r>
-            <a:r>
-              <a:rPr lang="en-CA" dirty="0" smtClean="0"/>
-              <a:t> </a:t>
-            </a:r>
-            <a:r>
-              <a:rPr lang="en-CA" dirty="0"/>
+              <a:rPr lang="en-CA" dirty="0" smtClean="0">
+                <a:solidFill>
+                  <a:schemeClr val="tx1">
+                    <a:lumMod val="75000"/>
+                    <a:lumOff val="25000"/>
+                  </a:schemeClr>
+                </a:solidFill>
+              </a:rPr>
+              <a:t>Template </a:t>
+            </a:r>
+            <a:r>
+              <a:rPr lang="en-CA" dirty="0">
+                <a:solidFill>
+                  <a:schemeClr val="tx1">
+                    <a:lumMod val="75000"/>
+                    <a:lumOff val="25000"/>
+                  </a:schemeClr>
+                </a:solidFill>
+              </a:rPr>
               <a:t>API since we </a:t>
             </a:r>
             <a:r>
-              <a:rPr lang="en-CA" dirty="0" smtClean="0"/>
+              <a:rPr lang="en-CA" dirty="0" smtClean="0">
+                <a:solidFill>
+                  <a:schemeClr val="tx1">
+                    <a:lumMod val="75000"/>
+                    <a:lumOff val="25000"/>
+                  </a:schemeClr>
+                </a:solidFill>
+              </a:rPr>
               <a:t>began</a:t>
             </a:r>
           </a:p>
@@ -6132,12 +6868,12 @@
 </file>
 
 <file path=ppt/slides/slide8.xml><?xml version="1.0" encoding="utf-8"?>
-<p:sld xmlns:a="http://schemas.openxmlformats.org/drawingml/2006/main" xmlns:r="http://schemas.openxmlformats.org/officeDocument/2006/relationships" xmlns:p="http://schemas.openxmlformats.org/presentationml/2006/main">
+<p:sld xmlns:a="http://schemas.openxmlformats.org/drawingml/2006/main" xmlns:r="http://schemas.openxmlformats.org/officeDocument/2006/relationships" xmlns:p="http://schemas.openxmlformats.org/presentationml/2006/main" showMasterSp="0">
   <p:cSld>
     <p:bg>
       <p:bgPr>
         <a:solidFill>
-          <a:srgbClr val="1976D2"/>
+          <a:srgbClr val="282C34"/>
         </a:solidFill>
         <a:effectLst/>
       </p:bgPr>
@@ -6174,9 +6910,8 @@
             <a:r>
               <a:rPr lang="en-CA" dirty="0">
                 <a:solidFill>
-                  <a:schemeClr val="tx1">
-                    <a:lumMod val="50000"/>
-                    <a:lumOff val="50000"/>
+                  <a:schemeClr val="bg1">
+                    <a:lumMod val="85000"/>
                   </a:schemeClr>
                 </a:solidFill>
               </a:rPr>
@@ -6184,9 +6919,8 @@
             </a:r>
             <a:endParaRPr lang="en-US" dirty="0">
               <a:solidFill>
-                <a:schemeClr val="tx1">
-                  <a:lumMod val="50000"/>
-                  <a:lumOff val="50000"/>
+                <a:schemeClr val="bg1">
+                  <a:lumMod val="85000"/>
                 </a:schemeClr>
               </a:solidFill>
             </a:endParaRPr>
@@ -6205,7 +6939,7 @@
         </p:nvSpPr>
         <p:spPr>
           <a:xfrm>
-            <a:off x="6689576" y="5329566"/>
+            <a:off x="6689576" y="5497156"/>
             <a:ext cx="5004955" cy="931807"/>
           </a:xfrm>
         </p:spPr>
@@ -6216,27 +6950,39 @@
           <a:lstStyle/>
           <a:p>
             <a:r>
-              <a:rPr lang="en-CA" dirty="0" smtClean="0"/>
+              <a:rPr lang="en-CA" dirty="0" smtClean="0">
+                <a:solidFill>
+                  <a:schemeClr val="bg1"/>
+                </a:solidFill>
+              </a:rPr>
               <a:t>Code is easy </a:t>
             </a:r>
             <a:r>
-              <a:rPr lang="en-CA" dirty="0"/>
+              <a:rPr lang="en-CA" dirty="0">
+                <a:solidFill>
+                  <a:schemeClr val="bg1"/>
+                </a:solidFill>
+              </a:rPr>
               <a:t>to read and comprehend</a:t>
             </a:r>
             <a:endParaRPr lang="en-CA" u="sng" dirty="0">
               <a:solidFill>
-                <a:srgbClr val="8ABC49"/>
+                <a:schemeClr val="bg1"/>
               </a:solidFill>
             </a:endParaRPr>
           </a:p>
           <a:p>
             <a:r>
-              <a:rPr lang="en-CA" dirty="0" smtClean="0"/>
+              <a:rPr lang="en-CA" dirty="0" smtClean="0">
+                <a:solidFill>
+                  <a:schemeClr val="bg1"/>
+                </a:solidFill>
+              </a:rPr>
               <a:t>Favors composition over inheritance</a:t>
             </a:r>
             <a:endParaRPr lang="en-CA" u="sng" dirty="0">
               <a:solidFill>
-                <a:srgbClr val="8ABC49"/>
+                <a:schemeClr val="bg1"/>
               </a:solidFill>
             </a:endParaRPr>
           </a:p>
@@ -6282,7 +7028,7 @@
         </p:nvSpPr>
         <p:spPr>
           <a:xfrm>
-            <a:off x="614779" y="5329566"/>
+            <a:off x="516346" y="5497156"/>
             <a:ext cx="6062250" cy="1528434"/>
           </a:xfrm>
           <a:prstGeom prst="rect">
@@ -6519,36 +7265,40 @@
           </a:lstStyle>
           <a:p>
             <a:r>
-              <a:rPr lang="en-CA" u="sng" dirty="0" smtClean="0">
-                <a:solidFill>
-                  <a:srgbClr val="8ABC49"/>
-                </a:solidFill>
-              </a:rPr>
-              <a:t>Template </a:t>
-            </a:r>
-            <a:r>
               <a:rPr lang="en-CA" dirty="0" smtClean="0">
                 <a:solidFill>
-                  <a:srgbClr val="1CADE4"/>
-                </a:solidFill>
-              </a:rPr>
-              <a:t>and</a:t>
-            </a:r>
-            <a:r>
-              <a:rPr lang="en-CA" u="sng" dirty="0" smtClean="0">
-                <a:solidFill>
-                  <a:srgbClr val="8ABC49"/>
-                </a:solidFill>
-              </a:rPr>
-              <a:t> CSS </a:t>
-            </a:r>
-            <a:r>
-              <a:rPr lang="en-CA" dirty="0" smtClean="0"/>
-              <a:t>can contain syntax highlighting when in separate files</a:t>
+                  <a:schemeClr val="bg1"/>
+                </a:solidFill>
+              </a:rPr>
+              <a:t>Template and CSS</a:t>
+            </a:r>
+            <a:r>
+              <a:rPr lang="en-CA" dirty="0" smtClean="0">
+                <a:solidFill>
+                  <a:schemeClr val="bg1"/>
+                </a:solidFill>
+              </a:rPr>
+              <a:t> </a:t>
+            </a:r>
+            <a:r>
+              <a:rPr lang="en-CA" dirty="0" smtClean="0">
+                <a:solidFill>
+                  <a:schemeClr val="bg1"/>
+                </a:solidFill>
+              </a:rPr>
+              <a:t>can </a:t>
+            </a:r>
+            <a:r>
+              <a:rPr lang="en-CA" dirty="0" smtClean="0">
+                <a:solidFill>
+                  <a:schemeClr val="bg1"/>
+                </a:solidFill>
+              </a:rPr>
+              <a:t>contain syntax highlighting when in separate files</a:t>
             </a:r>
             <a:endParaRPr lang="en-CA" u="sng" dirty="0">
               <a:solidFill>
-                <a:srgbClr val="8ABC49"/>
+                <a:schemeClr val="bg1"/>
               </a:solidFill>
             </a:endParaRPr>
           </a:p>
@@ -6607,6 +7357,14 @@
 <file path=ppt/slides/slide9.xml><?xml version="1.0" encoding="utf-8"?>
 <p:sld xmlns:a="http://schemas.openxmlformats.org/drawingml/2006/main" xmlns:r="http://schemas.openxmlformats.org/officeDocument/2006/relationships" xmlns:p="http://schemas.openxmlformats.org/presentationml/2006/main">
   <p:cSld>
+    <p:bg>
+      <p:bgPr>
+        <a:solidFill>
+          <a:srgbClr val="1976D2"/>
+        </a:solidFill>
+        <a:effectLst/>
+      </p:bgPr>
+    </p:bg>
     <p:spTree>
       <p:nvGrpSpPr>
         <p:cNvPr id="1" name=""/>
@@ -6679,48 +7437,125 @@
           <a:lstStyle/>
           <a:p>
             <a:r>
-              <a:rPr lang="en-CA" dirty="0"/>
+              <a:rPr lang="en-CA" dirty="0">
+                <a:solidFill>
+                  <a:schemeClr val="tx1">
+                    <a:lumMod val="75000"/>
+                    <a:lumOff val="25000"/>
+                  </a:schemeClr>
+                </a:solidFill>
+              </a:rPr>
               <a:t>Syntax highlighting occurs for compiler </a:t>
             </a:r>
             <a:r>
-              <a:rPr lang="en-CA" dirty="0" smtClean="0"/>
+              <a:rPr lang="en-CA" dirty="0" smtClean="0">
+                <a:solidFill>
+                  <a:schemeClr val="tx1">
+                    <a:lumMod val="75000"/>
+                    <a:lumOff val="25000"/>
+                  </a:schemeClr>
+                </a:solidFill>
+              </a:rPr>
               <a:t>errors</a:t>
             </a:r>
-            <a:endParaRPr lang="en-CA" dirty="0"/>
-          </a:p>
-          <a:p>
-            <a:r>
-              <a:rPr lang="en-CA" dirty="0"/>
+            <a:endParaRPr lang="en-CA" dirty="0">
+              <a:solidFill>
+                <a:schemeClr val="tx1">
+                  <a:lumMod val="75000"/>
+                  <a:lumOff val="25000"/>
+                </a:schemeClr>
+              </a:solidFill>
+            </a:endParaRPr>
+          </a:p>
+          <a:p>
+            <a:r>
+              <a:rPr lang="en-CA" dirty="0">
+                <a:solidFill>
+                  <a:schemeClr val="tx1">
+                    <a:lumMod val="75000"/>
+                    <a:lumOff val="25000"/>
+                  </a:schemeClr>
+                </a:solidFill>
+              </a:rPr>
               <a:t>Runtime errors in browser console are </a:t>
             </a:r>
             <a:r>
-              <a:rPr lang="en-CA" dirty="0" smtClean="0"/>
+              <a:rPr lang="en-CA" dirty="0" smtClean="0">
+                <a:solidFill>
+                  <a:schemeClr val="tx1">
+                    <a:lumMod val="75000"/>
+                    <a:lumOff val="25000"/>
+                  </a:schemeClr>
+                </a:solidFill>
+              </a:rPr>
               <a:t>well-documented</a:t>
             </a:r>
           </a:p>
           <a:p>
             <a:r>
-              <a:rPr lang="en-CA" dirty="0" smtClean="0"/>
+              <a:rPr lang="en-CA" dirty="0" smtClean="0">
+                <a:solidFill>
+                  <a:schemeClr val="tx1">
+                    <a:lumMod val="75000"/>
+                    <a:lumOff val="25000"/>
+                  </a:schemeClr>
+                </a:solidFill>
+              </a:rPr>
               <a:t>Runtime errors don’t always come with line numbers</a:t>
             </a:r>
-            <a:endParaRPr lang="en-CA" dirty="0"/>
-          </a:p>
-          <a:p>
-            <a:r>
-              <a:rPr lang="en-CA" dirty="0"/>
+            <a:endParaRPr lang="en-CA" dirty="0">
+              <a:solidFill>
+                <a:schemeClr val="tx1">
+                  <a:lumMod val="75000"/>
+                  <a:lumOff val="25000"/>
+                </a:schemeClr>
+              </a:solidFill>
+            </a:endParaRPr>
+          </a:p>
+          <a:p>
+            <a:r>
+              <a:rPr lang="en-CA" dirty="0">
+                <a:solidFill>
+                  <a:schemeClr val="tx1">
+                    <a:lumMod val="75000"/>
+                    <a:lumOff val="25000"/>
+                  </a:schemeClr>
+                </a:solidFill>
+              </a:rPr>
               <a:t>Compiled .MAP files allow for </a:t>
             </a:r>
             <a:r>
-              <a:rPr lang="en-CA" dirty="0" err="1"/>
+              <a:rPr lang="en-CA" dirty="0" err="1">
+                <a:solidFill>
+                  <a:schemeClr val="tx1">
+                    <a:lumMod val="75000"/>
+                    <a:lumOff val="25000"/>
+                  </a:schemeClr>
+                </a:solidFill>
+              </a:rPr>
               <a:t>TypeScript</a:t>
             </a:r>
             <a:r>
-              <a:rPr lang="en-CA" dirty="0"/>
+              <a:rPr lang="en-CA" dirty="0">
+                <a:solidFill>
+                  <a:schemeClr val="tx1">
+                    <a:lumMod val="75000"/>
+                    <a:lumOff val="25000"/>
+                  </a:schemeClr>
+                </a:solidFill>
+              </a:rPr>
               <a:t> debugging</a:t>
             </a:r>
           </a:p>
           <a:p>
-            <a:endParaRPr lang="en-CA" dirty="0"/>
+            <a:endParaRPr lang="en-CA" dirty="0">
+              <a:solidFill>
+                <a:schemeClr val="tx1">
+                  <a:lumMod val="75000"/>
+                  <a:lumOff val="25000"/>
+                </a:schemeClr>
+              </a:solidFill>
+            </a:endParaRPr>
           </a:p>
         </p:txBody>
       </p:sp>

</xml_diff>

<commit_message>
worked on powerpoint - fix for no translations in inactive/active dd
</commit_message>
<xml_diff>
--- a/Angular2.pptx
+++ b/Angular2.pptx
@@ -13,15 +13,17 @@
     <p:sldId id="276" r:id="rId7"/>
     <p:sldId id="277" r:id="rId8"/>
     <p:sldId id="261" r:id="rId9"/>
-    <p:sldId id="278" r:id="rId10"/>
-    <p:sldId id="263" r:id="rId11"/>
-    <p:sldId id="264" r:id="rId12"/>
-    <p:sldId id="265" r:id="rId13"/>
-    <p:sldId id="267" r:id="rId14"/>
-    <p:sldId id="269" r:id="rId15"/>
-    <p:sldId id="258" r:id="rId16"/>
-    <p:sldId id="259" r:id="rId17"/>
-    <p:sldId id="260" r:id="rId18"/>
+    <p:sldId id="279" r:id="rId10"/>
+    <p:sldId id="278" r:id="rId11"/>
+    <p:sldId id="263" r:id="rId12"/>
+    <p:sldId id="264" r:id="rId13"/>
+    <p:sldId id="265" r:id="rId14"/>
+    <p:sldId id="267" r:id="rId15"/>
+    <p:sldId id="269" r:id="rId16"/>
+    <p:sldId id="258" r:id="rId17"/>
+    <p:sldId id="259" r:id="rId18"/>
+    <p:sldId id="280" r:id="rId19"/>
+    <p:sldId id="260" r:id="rId20"/>
   </p:sldIdLst>
   <p:sldSz cx="12192000" cy="6858000"/>
   <p:notesSz cx="6858000" cy="9144000"/>
@@ -3542,7 +3544,7 @@
                   </a:schemeClr>
                 </a:solidFill>
               </a:rPr>
-              <a:t>Browser Support</a:t>
+              <a:t>Debugging</a:t>
             </a:r>
             <a:endParaRPr lang="en-US" dirty="0">
               <a:solidFill>
@@ -3555,11 +3557,154 @@
           </a:p>
         </p:txBody>
       </p:sp>
+      <p:sp>
+        <p:nvSpPr>
+          <p:cNvPr id="3" name="Content Placeholder 2"/>
+          <p:cNvSpPr>
+            <a:spLocks noGrp="1"/>
+          </p:cNvSpPr>
+          <p:nvPr>
+            <p:ph idx="1"/>
+          </p:nvPr>
+        </p:nvSpPr>
+        <p:spPr>
+          <a:xfrm>
+            <a:off x="1143001" y="2057400"/>
+            <a:ext cx="4388666" cy="4038600"/>
+          </a:xfrm>
+        </p:spPr>
+        <p:txBody>
+          <a:bodyPr/>
+          <a:lstStyle/>
+          <a:p>
+            <a:r>
+              <a:rPr lang="en-CA" dirty="0">
+                <a:solidFill>
+                  <a:schemeClr val="tx1">
+                    <a:lumMod val="75000"/>
+                    <a:lumOff val="25000"/>
+                  </a:schemeClr>
+                </a:solidFill>
+              </a:rPr>
+              <a:t>Syntax highlighting occurs for compiler </a:t>
+            </a:r>
+            <a:r>
+              <a:rPr lang="en-CA" dirty="0" smtClean="0">
+                <a:solidFill>
+                  <a:schemeClr val="tx1">
+                    <a:lumMod val="75000"/>
+                    <a:lumOff val="25000"/>
+                  </a:schemeClr>
+                </a:solidFill>
+              </a:rPr>
+              <a:t>errors</a:t>
+            </a:r>
+            <a:endParaRPr lang="en-CA" dirty="0">
+              <a:solidFill>
+                <a:schemeClr val="tx1">
+                  <a:lumMod val="75000"/>
+                  <a:lumOff val="25000"/>
+                </a:schemeClr>
+              </a:solidFill>
+            </a:endParaRPr>
+          </a:p>
+          <a:p>
+            <a:r>
+              <a:rPr lang="en-CA" dirty="0">
+                <a:solidFill>
+                  <a:schemeClr val="tx1">
+                    <a:lumMod val="75000"/>
+                    <a:lumOff val="25000"/>
+                  </a:schemeClr>
+                </a:solidFill>
+              </a:rPr>
+              <a:t>Runtime errors in browser console are </a:t>
+            </a:r>
+            <a:r>
+              <a:rPr lang="en-CA" dirty="0" smtClean="0">
+                <a:solidFill>
+                  <a:schemeClr val="tx1">
+                    <a:lumMod val="75000"/>
+                    <a:lumOff val="25000"/>
+                  </a:schemeClr>
+                </a:solidFill>
+              </a:rPr>
+              <a:t>well-documented</a:t>
+            </a:r>
+          </a:p>
+          <a:p>
+            <a:r>
+              <a:rPr lang="en-CA" dirty="0" smtClean="0">
+                <a:solidFill>
+                  <a:schemeClr val="tx1">
+                    <a:lumMod val="75000"/>
+                    <a:lumOff val="25000"/>
+                  </a:schemeClr>
+                </a:solidFill>
+              </a:rPr>
+              <a:t>Runtime errors don’t always come with line numbers</a:t>
+            </a:r>
+            <a:endParaRPr lang="en-CA" dirty="0">
+              <a:solidFill>
+                <a:schemeClr val="tx1">
+                  <a:lumMod val="75000"/>
+                  <a:lumOff val="25000"/>
+                </a:schemeClr>
+              </a:solidFill>
+            </a:endParaRPr>
+          </a:p>
+          <a:p>
+            <a:r>
+              <a:rPr lang="en-CA" dirty="0">
+                <a:solidFill>
+                  <a:schemeClr val="tx1">
+                    <a:lumMod val="75000"/>
+                    <a:lumOff val="25000"/>
+                  </a:schemeClr>
+                </a:solidFill>
+              </a:rPr>
+              <a:t>Compiled .MAP files allow for </a:t>
+            </a:r>
+            <a:r>
+              <a:rPr lang="en-CA" dirty="0" err="1">
+                <a:solidFill>
+                  <a:schemeClr val="tx1">
+                    <a:lumMod val="75000"/>
+                    <a:lumOff val="25000"/>
+                  </a:schemeClr>
+                </a:solidFill>
+              </a:rPr>
+              <a:t>TypeScript</a:t>
+            </a:r>
+            <a:r>
+              <a:rPr lang="en-CA" dirty="0">
+                <a:solidFill>
+                  <a:schemeClr val="tx1">
+                    <a:lumMod val="75000"/>
+                    <a:lumOff val="25000"/>
+                  </a:schemeClr>
+                </a:solidFill>
+              </a:rPr>
+              <a:t> debugging</a:t>
+            </a:r>
+          </a:p>
+          <a:p>
+            <a:endParaRPr lang="en-CA" dirty="0">
+              <a:solidFill>
+                <a:schemeClr val="tx1">
+                  <a:lumMod val="75000"/>
+                  <a:lumOff val="25000"/>
+                </a:schemeClr>
+              </a:solidFill>
+            </a:endParaRPr>
+          </a:p>
+        </p:txBody>
+      </p:sp>
       <p:pic>
         <p:nvPicPr>
-          <p:cNvPr id="1026" name="Picture 2" descr="https://pbs.twimg.com/media/CQqbS9GVAAATWSj.png:large"/>
+          <p:cNvPr id="5" name="Picture 4"/>
           <p:cNvPicPr>
-            <a:picLocks noChangeAspect="1" noChangeArrowheads="1"/>
+            <a:picLocks noChangeAspect="1"/>
           </p:cNvPicPr>
           <p:nvPr/>
         </p:nvPicPr>
@@ -3571,35 +3716,48 @@
               </a:ext>
             </a:extLst>
           </a:blip>
-          <a:srcRect/>
           <a:stretch>
             <a:fillRect/>
           </a:stretch>
         </p:blipFill>
-        <p:spPr bwMode="auto">
+        <p:spPr>
           <a:xfrm>
-            <a:off x="1280160" y="2828030"/>
-            <a:ext cx="9601200" cy="2133601"/>
+            <a:off x="6080760" y="669360"/>
+            <a:ext cx="4244143" cy="2987934"/>
           </a:xfrm>
           <a:prstGeom prst="rect">
             <a:avLst/>
           </a:prstGeom>
-          <a:noFill/>
-          <a:extLst>
-            <a:ext uri="{909E8E84-426E-40DD-AFC4-6F175D3DCCD1}">
-              <a14:hiddenFill xmlns:a14="http://schemas.microsoft.com/office/drawing/2010/main">
-                <a:solidFill>
-                  <a:srgbClr val="FFFFFF"/>
-                </a:solidFill>
-              </a14:hiddenFill>
-            </a:ext>
-          </a:extLst>
+        </p:spPr>
+      </p:pic>
+      <p:pic>
+        <p:nvPicPr>
+          <p:cNvPr id="4" name="Picture 3"/>
+          <p:cNvPicPr>
+            <a:picLocks noChangeAspect="1"/>
+          </p:cNvPicPr>
+          <p:nvPr/>
+        </p:nvPicPr>
+        <p:blipFill>
+          <a:blip r:embed="rId3"/>
+          <a:stretch>
+            <a:fillRect/>
+          </a:stretch>
+        </p:blipFill>
+        <p:spPr>
+          <a:xfrm>
+            <a:off x="5294515" y="4201043"/>
+            <a:ext cx="5724005" cy="853095"/>
+          </a:xfrm>
+          <a:prstGeom prst="rect">
+            <a:avLst/>
+          </a:prstGeom>
         </p:spPr>
       </p:pic>
     </p:spTree>
     <p:extLst>
       <p:ext uri="{BB962C8B-B14F-4D97-AF65-F5344CB8AC3E}">
-        <p14:creationId xmlns:p14="http://schemas.microsoft.com/office/powerpoint/2010/main" val="2415730987"/>
+        <p14:creationId xmlns:p14="http://schemas.microsoft.com/office/powerpoint/2010/main" val="344836450"/>
       </p:ext>
     </p:extLst>
   </p:cSld>
@@ -3665,7 +3823,7 @@
                   </a:schemeClr>
                 </a:solidFill>
               </a:rPr>
-              <a:t>Testing Support</a:t>
+              <a:t>Browser Support</a:t>
             </a:r>
             <a:endParaRPr lang="en-US" dirty="0">
               <a:solidFill>
@@ -3678,152 +3836,51 @@
           </a:p>
         </p:txBody>
       </p:sp>
-      <p:sp>
-        <p:nvSpPr>
-          <p:cNvPr id="3" name="Content Placeholder 2"/>
-          <p:cNvSpPr>
-            <a:spLocks noGrp="1"/>
-          </p:cNvSpPr>
-          <p:nvPr>
-            <p:ph idx="1"/>
-          </p:nvPr>
-        </p:nvSpPr>
-        <p:spPr/>
-        <p:txBody>
-          <a:bodyPr/>
-          <a:lstStyle/>
-          <a:p>
-            <a:r>
-              <a:rPr lang="en-CA" dirty="0">
-                <a:solidFill>
-                  <a:schemeClr val="tx1">
-                    <a:lumMod val="75000"/>
-                    <a:lumOff val="25000"/>
-                  </a:schemeClr>
-                </a:solidFill>
-              </a:rPr>
-              <a:t>Most test libraries should work</a:t>
-            </a:r>
-            <a:r>
-              <a:rPr lang="en-US" dirty="0">
-                <a:solidFill>
-                  <a:schemeClr val="tx1">
-                    <a:lumMod val="75000"/>
-                    <a:lumOff val="25000"/>
-                  </a:schemeClr>
-                </a:solidFill>
-              </a:rPr>
-              <a:t> </a:t>
-            </a:r>
-            <a:r>
-              <a:rPr lang="en-US" dirty="0">
-                <a:solidFill>
-                  <a:schemeClr val="bg1">
-                    <a:lumMod val="65000"/>
-                  </a:schemeClr>
-                </a:solidFill>
-              </a:rPr>
-              <a:t>(Jasmine was used in the Angular.io tutorial)</a:t>
-            </a:r>
-          </a:p>
-          <a:p>
-            <a:r>
-              <a:rPr lang="en-CA" dirty="0">
-                <a:solidFill>
-                  <a:schemeClr val="tx1">
-                    <a:lumMod val="75000"/>
-                    <a:lumOff val="25000"/>
-                  </a:schemeClr>
-                </a:solidFill>
-              </a:rPr>
-              <a:t>Can configure to run on live-server which automatically </a:t>
-            </a:r>
-            <a:r>
-              <a:rPr lang="en-CA" dirty="0" smtClean="0">
-                <a:solidFill>
-                  <a:schemeClr val="tx1">
-                    <a:lumMod val="75000"/>
-                    <a:lumOff val="25000"/>
-                  </a:schemeClr>
-                </a:solidFill>
-              </a:rPr>
-              <a:t>refreshes</a:t>
-            </a:r>
-          </a:p>
-          <a:p>
-            <a:r>
-              <a:rPr lang="en-CA" dirty="0" smtClean="0">
-                <a:solidFill>
-                  <a:schemeClr val="tx1">
-                    <a:lumMod val="75000"/>
-                    <a:lumOff val="25000"/>
-                  </a:schemeClr>
-                </a:solidFill>
-              </a:rPr>
-              <a:t>Dependency Injection makes objects within the application </a:t>
-            </a:r>
-            <a:r>
-              <a:rPr lang="en-CA" dirty="0" err="1" smtClean="0">
-                <a:solidFill>
-                  <a:schemeClr val="tx1">
-                    <a:lumMod val="75000"/>
-                    <a:lumOff val="25000"/>
-                  </a:schemeClr>
-                </a:solidFill>
-              </a:rPr>
-              <a:t>mockable</a:t>
-            </a:r>
-            <a:endParaRPr lang="en-CA" dirty="0" smtClean="0">
-              <a:solidFill>
-                <a:schemeClr val="tx1">
-                  <a:lumMod val="75000"/>
-                  <a:lumOff val="25000"/>
-                </a:schemeClr>
-              </a:solidFill>
-            </a:endParaRPr>
-          </a:p>
-          <a:p>
-            <a:r>
-              <a:rPr lang="en-CA" dirty="0" smtClean="0">
-                <a:solidFill>
-                  <a:schemeClr val="tx1">
-                    <a:lumMod val="75000"/>
-                    <a:lumOff val="25000"/>
-                  </a:schemeClr>
-                </a:solidFill>
-              </a:rPr>
-              <a:t>Able to test everything </a:t>
-            </a:r>
-          </a:p>
-          <a:p>
-            <a:r>
-              <a:rPr lang="en-CA" dirty="0" smtClean="0">
-                <a:solidFill>
-                  <a:schemeClr val="tx1">
-                    <a:lumMod val="75000"/>
-                    <a:lumOff val="25000"/>
-                  </a:schemeClr>
-                </a:solidFill>
-              </a:rPr>
-              <a:t>Setup of test framework dependencies can be overwhelming and hard to follow </a:t>
-            </a:r>
-            <a:r>
-              <a:rPr lang="en-CA" dirty="0">
-                <a:solidFill>
-                  <a:schemeClr val="bg1">
-                    <a:lumMod val="65000"/>
-                  </a:schemeClr>
-                </a:solidFill>
-              </a:rPr>
-              <a:t>(mostly because they are still under development)</a:t>
-            </a:r>
-          </a:p>
-        </p:txBody>
-      </p:sp>
+      <p:pic>
+        <p:nvPicPr>
+          <p:cNvPr id="1026" name="Picture 2" descr="https://pbs.twimg.com/media/CQqbS9GVAAATWSj.png:large"/>
+          <p:cNvPicPr>
+            <a:picLocks noChangeAspect="1" noChangeArrowheads="1"/>
+          </p:cNvPicPr>
+          <p:nvPr/>
+        </p:nvPicPr>
+        <p:blipFill>
+          <a:blip r:embed="rId2">
+            <a:extLst>
+              <a:ext uri="{28A0092B-C50C-407E-A947-70E740481C1C}">
+                <a14:useLocalDpi xmlns:a14="http://schemas.microsoft.com/office/drawing/2010/main" val="0"/>
+              </a:ext>
+            </a:extLst>
+          </a:blip>
+          <a:srcRect/>
+          <a:stretch>
+            <a:fillRect/>
+          </a:stretch>
+        </p:blipFill>
+        <p:spPr bwMode="auto">
+          <a:xfrm>
+            <a:off x="1280160" y="2828030"/>
+            <a:ext cx="9601200" cy="2133601"/>
+          </a:xfrm>
+          <a:prstGeom prst="rect">
+            <a:avLst/>
+          </a:prstGeom>
+          <a:noFill/>
+          <a:extLst>
+            <a:ext uri="{909E8E84-426E-40DD-AFC4-6F175D3DCCD1}">
+              <a14:hiddenFill xmlns:a14="http://schemas.microsoft.com/office/drawing/2010/main">
+                <a:solidFill>
+                  <a:srgbClr val="FFFFFF"/>
+                </a:solidFill>
+              </a14:hiddenFill>
+            </a:ext>
+          </a:extLst>
+        </p:spPr>
+      </p:pic>
     </p:spTree>
     <p:extLst>
       <p:ext uri="{BB962C8B-B14F-4D97-AF65-F5344CB8AC3E}">
-        <p14:creationId xmlns:p14="http://schemas.microsoft.com/office/powerpoint/2010/main" val="2764106384"/>
+        <p14:creationId xmlns:p14="http://schemas.microsoft.com/office/powerpoint/2010/main" val="2415730987"/>
       </p:ext>
     </p:extLst>
   </p:cSld>
@@ -3889,7 +3946,7 @@
                   </a:schemeClr>
                 </a:solidFill>
               </a:rPr>
-              <a:t>Performance</a:t>
+              <a:t>Testing Support</a:t>
             </a:r>
             <a:endParaRPr lang="en-US" dirty="0">
               <a:solidFill>
@@ -3918,6 +3975,51 @@
           <a:lstStyle/>
           <a:p>
             <a:r>
+              <a:rPr lang="en-CA" dirty="0">
+                <a:solidFill>
+                  <a:schemeClr val="tx1">
+                    <a:lumMod val="75000"/>
+                    <a:lumOff val="25000"/>
+                  </a:schemeClr>
+                </a:solidFill>
+              </a:rPr>
+              <a:t>Most test libraries should work</a:t>
+            </a:r>
+            <a:r>
+              <a:rPr lang="en-US" dirty="0">
+                <a:solidFill>
+                  <a:schemeClr val="tx1">
+                    <a:lumMod val="75000"/>
+                    <a:lumOff val="25000"/>
+                  </a:schemeClr>
+                </a:solidFill>
+              </a:rPr>
+              <a:t> </a:t>
+            </a:r>
+            <a:r>
+              <a:rPr lang="en-US" dirty="0">
+                <a:solidFill>
+                  <a:schemeClr val="bg1">
+                    <a:lumMod val="65000"/>
+                  </a:schemeClr>
+                </a:solidFill>
+              </a:rPr>
+              <a:t>(Jasmine was used in the Angular.io tutorial)</a:t>
+            </a:r>
+          </a:p>
+          <a:p>
+            <a:r>
+              <a:rPr lang="en-CA" dirty="0">
+                <a:solidFill>
+                  <a:schemeClr val="tx1">
+                    <a:lumMod val="75000"/>
+                    <a:lumOff val="25000"/>
+                  </a:schemeClr>
+                </a:solidFill>
+              </a:rPr>
+              <a:t>Can configure to run on live-server which automatically </a:t>
+            </a:r>
+            <a:r>
               <a:rPr lang="en-CA" dirty="0" smtClean="0">
                 <a:solidFill>
                   <a:schemeClr val="tx1">
@@ -3926,19 +4028,10 @@
                   </a:schemeClr>
                 </a:solidFill>
               </a:rPr>
-              <a:t>Optimized </a:t>
-            </a:r>
-            <a:r>
-              <a:rPr lang="en-CA" dirty="0">
-                <a:solidFill>
-                  <a:schemeClr val="tx1">
-                    <a:lumMod val="75000"/>
-                    <a:lumOff val="25000"/>
-                  </a:schemeClr>
-                </a:solidFill>
-              </a:rPr>
-              <a:t>for today's JavaScript virtual </a:t>
-            </a:r>
+              <a:t>refreshes</a:t>
+            </a:r>
+          </a:p>
+          <a:p>
             <a:r>
               <a:rPr lang="en-CA" dirty="0" smtClean="0">
                 <a:solidFill>
@@ -3948,47 +4041,8 @@
                   </a:schemeClr>
                 </a:solidFill>
               </a:rPr>
-              <a:t>machines using an advanced change detection algorithm</a:t>
-            </a:r>
-          </a:p>
-          <a:p>
-            <a:r>
-              <a:rPr lang="en-CA" dirty="0">
-                <a:solidFill>
-                  <a:schemeClr val="tx1">
-                    <a:lumMod val="75000"/>
-                    <a:lumOff val="25000"/>
-                  </a:schemeClr>
-                </a:solidFill>
-              </a:rPr>
-              <a:t>Serve the first view of your application on node.js, .NET, PHP and other servers for near-instant </a:t>
-            </a:r>
-            <a:r>
-              <a:rPr lang="en-CA" dirty="0" smtClean="0">
-                <a:solidFill>
-                  <a:schemeClr val="tx1">
-                    <a:lumMod val="75000"/>
-                    <a:lumOff val="25000"/>
-                  </a:schemeClr>
-                </a:solidFill>
-              </a:rPr>
-              <a:t>rendering</a:t>
-            </a:r>
-          </a:p>
-          <a:p>
-            <a:r>
-              <a:rPr lang="en-CA" dirty="0" smtClean="0">
-                <a:solidFill>
-                  <a:schemeClr val="tx1">
-                    <a:lumMod val="75000"/>
-                    <a:lumOff val="25000"/>
-                  </a:schemeClr>
-                </a:solidFill>
-              </a:rPr>
-              <a:t>Component router delivers automatic code-splitting</a:t>
-            </a:r>
-          </a:p>
-          <a:p>
+              <a:t>Dependency Injection makes objects within the application </a:t>
+            </a:r>
             <a:r>
               <a:rPr lang="en-CA" dirty="0" err="1" smtClean="0">
                 <a:solidFill>
@@ -3998,33 +4052,9 @@
                   </a:schemeClr>
                 </a:solidFill>
               </a:rPr>
-              <a:t>RxJS</a:t>
-            </a:r>
-            <a:r>
-              <a:rPr lang="en-CA" dirty="0" smtClean="0">
-                <a:solidFill>
-                  <a:schemeClr val="tx1">
-                    <a:lumMod val="75000"/>
-                    <a:lumOff val="25000"/>
-                  </a:schemeClr>
-                </a:solidFill>
-              </a:rPr>
-              <a:t> Observables offer push-model data flows letting you optimize the change detection strategy</a:t>
-            </a:r>
-          </a:p>
-          <a:p>
-            <a:r>
-              <a:rPr lang="en-CA" dirty="0" smtClean="0">
-                <a:solidFill>
-                  <a:schemeClr val="tx1">
-                    <a:lumMod val="75000"/>
-                    <a:lumOff val="25000"/>
-                  </a:schemeClr>
-                </a:solidFill>
-              </a:rPr>
-              <a:t>Out of the box support for web workers</a:t>
-            </a:r>
-            <a:endParaRPr lang="en-US" dirty="0">
+              <a:t>mockable</a:t>
+            </a:r>
+            <a:endParaRPr lang="en-CA" dirty="0" smtClean="0">
               <a:solidFill>
                 <a:schemeClr val="tx1">
                   <a:lumMod val="75000"/>
@@ -4033,12 +4063,48 @@
               </a:solidFill>
             </a:endParaRPr>
           </a:p>
+          <a:p>
+            <a:r>
+              <a:rPr lang="en-CA" dirty="0" smtClean="0">
+                <a:solidFill>
+                  <a:schemeClr val="tx1">
+                    <a:lumMod val="75000"/>
+                    <a:lumOff val="25000"/>
+                  </a:schemeClr>
+                </a:solidFill>
+              </a:rPr>
+              <a:t>Able to test everything </a:t>
+            </a:r>
+          </a:p>
+          <a:p>
+            <a:r>
+              <a:rPr lang="en-CA" dirty="0" smtClean="0">
+                <a:solidFill>
+                  <a:schemeClr val="tx1">
+                    <a:lumMod val="75000"/>
+                    <a:lumOff val="25000"/>
+                  </a:schemeClr>
+                </a:solidFill>
+              </a:rPr>
+              <a:t>Setup of test framework dependencies can be overwhelming and hard to follow </a:t>
+            </a:r>
+            <a:r>
+              <a:rPr lang="en-CA" dirty="0">
+                <a:solidFill>
+                  <a:schemeClr val="bg1">
+                    <a:lumMod val="65000"/>
+                  </a:schemeClr>
+                </a:solidFill>
+              </a:rPr>
+              <a:t>(mostly because they are still under development)</a:t>
+            </a:r>
+          </a:p>
         </p:txBody>
       </p:sp>
     </p:spTree>
     <p:extLst>
       <p:ext uri="{BB962C8B-B14F-4D97-AF65-F5344CB8AC3E}">
-        <p14:creationId xmlns:p14="http://schemas.microsoft.com/office/powerpoint/2010/main" val="3257910670"/>
+        <p14:creationId xmlns:p14="http://schemas.microsoft.com/office/powerpoint/2010/main" val="2764106384"/>
       </p:ext>
     </p:extLst>
   </p:cSld>
@@ -4104,7 +4170,7 @@
                   </a:schemeClr>
                 </a:solidFill>
               </a:rPr>
-              <a:t>Developer Support</a:t>
+              <a:t>Performance</a:t>
             </a:r>
             <a:endParaRPr lang="en-US" dirty="0">
               <a:solidFill>
@@ -4133,133 +4199,168 @@
           <a:lstStyle/>
           <a:p>
             <a:r>
-              <a:rPr lang="en-US" dirty="0" smtClean="0">
-                <a:solidFill>
-                  <a:schemeClr val="tx1">
-                    <a:lumMod val="75000"/>
-                    <a:lumOff val="25000"/>
-                  </a:schemeClr>
-                </a:solidFill>
-              </a:rPr>
-              <a:t>Ridiculously large community of </a:t>
-            </a:r>
-            <a:r>
-              <a:rPr lang="en-US" dirty="0" smtClean="0">
-                <a:solidFill>
-                  <a:schemeClr val="tx1">
-                    <a:lumMod val="75000"/>
-                    <a:lumOff val="25000"/>
-                  </a:schemeClr>
-                </a:solidFill>
-              </a:rPr>
-              <a:t>long-time </a:t>
-            </a:r>
-            <a:r>
-              <a:rPr lang="en-US" dirty="0" smtClean="0">
-                <a:solidFill>
-                  <a:schemeClr val="tx1">
-                    <a:lumMod val="75000"/>
-                    <a:lumOff val="25000"/>
-                  </a:schemeClr>
-                </a:solidFill>
-              </a:rPr>
-              <a:t>angular developers and new adopters</a:t>
-            </a:r>
-          </a:p>
-          <a:p>
-            <a:r>
-              <a:rPr lang="en-US" dirty="0" smtClean="0">
-                <a:solidFill>
-                  <a:schemeClr val="tx1">
-                    <a:lumMod val="75000"/>
-                    <a:lumOff val="25000"/>
-                  </a:schemeClr>
-                </a:solidFill>
-              </a:rPr>
-              <a:t>Built by the same people who built Angular 1</a:t>
-            </a:r>
-          </a:p>
-          <a:p>
-            <a:r>
-              <a:rPr lang="en-US" dirty="0" err="1" smtClean="0">
-                <a:solidFill>
-                  <a:schemeClr val="tx1">
-                    <a:lumMod val="75000"/>
-                    <a:lumOff val="25000"/>
-                  </a:schemeClr>
-                </a:solidFill>
-              </a:rPr>
-              <a:t>ngUpgrade</a:t>
-            </a:r>
-            <a:r>
-              <a:rPr lang="en-US" dirty="0" smtClean="0">
-                <a:solidFill>
-                  <a:schemeClr val="tx1">
-                    <a:lumMod val="75000"/>
-                    <a:lumOff val="25000"/>
-                  </a:schemeClr>
-                </a:solidFill>
-              </a:rPr>
-              <a:t> and </a:t>
-            </a:r>
-            <a:r>
-              <a:rPr lang="en-US" dirty="0" err="1" smtClean="0">
-                <a:solidFill>
-                  <a:schemeClr val="tx1">
-                    <a:lumMod val="75000"/>
-                    <a:lumOff val="25000"/>
-                  </a:schemeClr>
-                </a:solidFill>
-              </a:rPr>
-              <a:t>ngForward</a:t>
-            </a:r>
-            <a:r>
-              <a:rPr lang="en-US" dirty="0" smtClean="0">
-                <a:solidFill>
-                  <a:schemeClr val="tx1">
-                    <a:lumMod val="75000"/>
-                    <a:lumOff val="25000"/>
-                  </a:schemeClr>
-                </a:solidFill>
-              </a:rPr>
-              <a:t> offers detailed and seamless upgrade strategies from Angular 1 to 2</a:t>
-            </a:r>
-          </a:p>
-          <a:p>
-            <a:r>
-              <a:rPr lang="en-US" dirty="0" smtClean="0">
-                <a:solidFill>
-                  <a:schemeClr val="tx1">
-                    <a:lumMod val="75000"/>
-                    <a:lumOff val="25000"/>
-                  </a:schemeClr>
-                </a:solidFill>
-              </a:rPr>
-              <a:t>Open to community, collaborating closely</a:t>
-            </a:r>
-          </a:p>
-          <a:p>
-            <a:pPr marL="45720" indent="0">
-              <a:buNone/>
-            </a:pPr>
-            <a:r>
-              <a:rPr lang="en-US" dirty="0">
-                <a:solidFill>
-                  <a:schemeClr val="tx1">
-                    <a:lumMod val="75000"/>
-                    <a:lumOff val="25000"/>
-                  </a:schemeClr>
-                </a:solidFill>
-              </a:rPr>
-              <a:t> </a:t>
-            </a:r>
+              <a:rPr lang="en-CA" dirty="0" smtClean="0">
+                <a:solidFill>
+                  <a:schemeClr val="tx1">
+                    <a:lumMod val="75000"/>
+                    <a:lumOff val="25000"/>
+                  </a:schemeClr>
+                </a:solidFill>
+              </a:rPr>
+              <a:t>Optimized </a:t>
+            </a:r>
+            <a:r>
+              <a:rPr lang="en-CA" dirty="0">
+                <a:solidFill>
+                  <a:schemeClr val="tx1">
+                    <a:lumMod val="75000"/>
+                    <a:lumOff val="25000"/>
+                  </a:schemeClr>
+                </a:solidFill>
+              </a:rPr>
+              <a:t>for today's JavaScript virtual </a:t>
+            </a:r>
+            <a:r>
+              <a:rPr lang="en-CA" dirty="0" smtClean="0">
+                <a:solidFill>
+                  <a:schemeClr val="tx1">
+                    <a:lumMod val="75000"/>
+                    <a:lumOff val="25000"/>
+                  </a:schemeClr>
+                </a:solidFill>
+              </a:rPr>
+              <a:t>machines using an advanced change detection </a:t>
+            </a:r>
+            <a:r>
+              <a:rPr lang="en-CA" dirty="0" smtClean="0">
+                <a:solidFill>
+                  <a:schemeClr val="tx1">
+                    <a:lumMod val="75000"/>
+                    <a:lumOff val="25000"/>
+                  </a:schemeClr>
+                </a:solidFill>
+              </a:rPr>
+              <a:t>algorithm</a:t>
+            </a:r>
+          </a:p>
+          <a:p>
+            <a:r>
+              <a:rPr lang="en-CA" dirty="0" err="1">
+                <a:solidFill>
+                  <a:schemeClr val="tx1">
+                    <a:lumMod val="75000"/>
+                    <a:lumOff val="25000"/>
+                  </a:schemeClr>
+                </a:solidFill>
+              </a:rPr>
+              <a:t>RxJS</a:t>
+            </a:r>
+            <a:r>
+              <a:rPr lang="en-CA" dirty="0">
+                <a:solidFill>
+                  <a:schemeClr val="tx1">
+                    <a:lumMod val="75000"/>
+                    <a:lumOff val="25000"/>
+                  </a:schemeClr>
+                </a:solidFill>
+              </a:rPr>
+              <a:t> Observables offer push-model data flows letting you optimize the change detection </a:t>
+            </a:r>
+            <a:r>
+              <a:rPr lang="en-CA" dirty="0" smtClean="0">
+                <a:solidFill>
+                  <a:schemeClr val="tx1">
+                    <a:lumMod val="75000"/>
+                    <a:lumOff val="25000"/>
+                  </a:schemeClr>
+                </a:solidFill>
+              </a:rPr>
+              <a:t>strategy</a:t>
+            </a:r>
+            <a:endParaRPr lang="en-CA" dirty="0" smtClean="0">
+              <a:solidFill>
+                <a:schemeClr val="tx1">
+                  <a:lumMod val="75000"/>
+                  <a:lumOff val="25000"/>
+                </a:schemeClr>
+              </a:solidFill>
+            </a:endParaRPr>
+          </a:p>
+          <a:p>
+            <a:r>
+              <a:rPr lang="en-CA" dirty="0">
+                <a:solidFill>
+                  <a:schemeClr val="tx1">
+                    <a:lumMod val="75000"/>
+                    <a:lumOff val="25000"/>
+                  </a:schemeClr>
+                </a:solidFill>
+              </a:rPr>
+              <a:t>Serve the first view of your application on node.js, .NET, PHP and other servers for near-instant </a:t>
+            </a:r>
+            <a:r>
+              <a:rPr lang="en-CA" dirty="0" smtClean="0">
+                <a:solidFill>
+                  <a:schemeClr val="tx1">
+                    <a:lumMod val="75000"/>
+                    <a:lumOff val="25000"/>
+                  </a:schemeClr>
+                </a:solidFill>
+              </a:rPr>
+              <a:t>rendering</a:t>
+            </a:r>
+          </a:p>
+          <a:p>
+            <a:r>
+              <a:rPr lang="en-CA" dirty="0" smtClean="0">
+                <a:solidFill>
+                  <a:schemeClr val="tx1">
+                    <a:lumMod val="75000"/>
+                    <a:lumOff val="25000"/>
+                  </a:schemeClr>
+                </a:solidFill>
+              </a:rPr>
+              <a:t>Component router delivers automatic code-splitting</a:t>
+            </a:r>
+          </a:p>
+          <a:p>
+            <a:r>
+              <a:rPr lang="en-CA" dirty="0" smtClean="0">
+                <a:solidFill>
+                  <a:schemeClr val="tx1">
+                    <a:lumMod val="75000"/>
+                    <a:lumOff val="25000"/>
+                  </a:schemeClr>
+                </a:solidFill>
+              </a:rPr>
+              <a:t>Out </a:t>
+            </a:r>
+            <a:r>
+              <a:rPr lang="en-CA" dirty="0" smtClean="0">
+                <a:solidFill>
+                  <a:schemeClr val="tx1">
+                    <a:lumMod val="75000"/>
+                    <a:lumOff val="25000"/>
+                  </a:schemeClr>
+                </a:solidFill>
+              </a:rPr>
+              <a:t>of the box support for web workers</a:t>
+            </a:r>
+            <a:endParaRPr lang="en-US" dirty="0">
+              <a:solidFill>
+                <a:schemeClr val="tx1">
+                  <a:lumMod val="75000"/>
+                  <a:lumOff val="25000"/>
+                </a:schemeClr>
+              </a:solidFill>
+            </a:endParaRPr>
           </a:p>
         </p:txBody>
       </p:sp>
     </p:spTree>
     <p:extLst>
       <p:ext uri="{BB962C8B-B14F-4D97-AF65-F5344CB8AC3E}">
-        <p14:creationId xmlns:p14="http://schemas.microsoft.com/office/powerpoint/2010/main" val="3611863778"/>
+        <p14:creationId xmlns:p14="http://schemas.microsoft.com/office/powerpoint/2010/main" val="3257910670"/>
       </p:ext>
     </p:extLst>
   </p:cSld>
@@ -4325,7 +4426,7 @@
                   </a:schemeClr>
                 </a:solidFill>
               </a:rPr>
-              <a:t>Stability</a:t>
+              <a:t>Developer Support</a:t>
             </a:r>
             <a:endParaRPr lang="en-US" dirty="0">
               <a:solidFill>
@@ -4362,7 +4463,7 @@
                   </a:schemeClr>
                 </a:solidFill>
               </a:rPr>
-              <a:t>Careful, methodical reinvention of mature, comprehensive framework</a:t>
+              <a:t>Ridiculously large community of long-time angular developers and new adopters</a:t>
             </a:r>
           </a:p>
           <a:p>
@@ -4375,10 +4476,21 @@
                   </a:schemeClr>
                 </a:solidFill>
               </a:rPr>
-              <a:t>Less churn after release than other frameworks</a:t>
-            </a:r>
-          </a:p>
-          <a:p>
+              <a:t>Built by the same people who built Angular 1</a:t>
+            </a:r>
+          </a:p>
+          <a:p>
+            <a:r>
+              <a:rPr lang="en-US" dirty="0" err="1" smtClean="0">
+                <a:solidFill>
+                  <a:schemeClr val="tx1">
+                    <a:lumMod val="75000"/>
+                    <a:lumOff val="25000"/>
+                  </a:schemeClr>
+                </a:solidFill>
+              </a:rPr>
+              <a:t>ngUpgrade</a:t>
+            </a:r>
             <a:r>
               <a:rPr lang="en-US" dirty="0" smtClean="0">
                 <a:solidFill>
@@ -4388,29 +4500,79 @@
                   </a:schemeClr>
                 </a:solidFill>
               </a:rPr>
-              <a:t>Single team making decisions about future </a:t>
-            </a:r>
-            <a:endParaRPr lang="en-US" dirty="0">
-              <a:solidFill>
-                <a:schemeClr val="tx1">
-                  <a:lumMod val="75000"/>
-                  <a:lumOff val="25000"/>
-                </a:schemeClr>
-              </a:solidFill>
-            </a:endParaRPr>
+              <a:t> and </a:t>
+            </a:r>
+            <a:r>
+              <a:rPr lang="en-US" dirty="0" err="1" smtClean="0">
+                <a:solidFill>
+                  <a:schemeClr val="tx1">
+                    <a:lumMod val="75000"/>
+                    <a:lumOff val="25000"/>
+                  </a:schemeClr>
+                </a:solidFill>
+              </a:rPr>
+              <a:t>ngForward</a:t>
+            </a:r>
+            <a:r>
+              <a:rPr lang="en-US" dirty="0" smtClean="0">
+                <a:solidFill>
+                  <a:schemeClr val="tx1">
+                    <a:lumMod val="75000"/>
+                    <a:lumOff val="25000"/>
+                  </a:schemeClr>
+                </a:solidFill>
+              </a:rPr>
+              <a:t> offers detailed and seamless upgrade strategies from Angular 1 to 2</a:t>
+            </a:r>
+          </a:p>
+          <a:p>
+            <a:r>
+              <a:rPr lang="en-US" dirty="0" smtClean="0">
+                <a:solidFill>
+                  <a:schemeClr val="tx1">
+                    <a:lumMod val="75000"/>
+                    <a:lumOff val="25000"/>
+                  </a:schemeClr>
+                </a:solidFill>
+              </a:rPr>
+              <a:t>Open to community, collaborating closely</a:t>
+            </a:r>
+          </a:p>
+          <a:p>
+            <a:pPr marL="45720" indent="0">
+              <a:buNone/>
+            </a:pPr>
+            <a:r>
+              <a:rPr lang="en-US" dirty="0">
+                <a:solidFill>
+                  <a:schemeClr val="tx1">
+                    <a:lumMod val="75000"/>
+                    <a:lumOff val="25000"/>
+                  </a:schemeClr>
+                </a:solidFill>
+              </a:rPr>
+              <a:t> </a:t>
+            </a:r>
           </a:p>
         </p:txBody>
       </p:sp>
     </p:spTree>
     <p:extLst>
       <p:ext uri="{BB962C8B-B14F-4D97-AF65-F5344CB8AC3E}">
-        <p14:creationId xmlns:p14="http://schemas.microsoft.com/office/powerpoint/2010/main" val="3609019475"/>
+        <p14:creationId xmlns:p14="http://schemas.microsoft.com/office/powerpoint/2010/main" val="3611863778"/>
       </p:ext>
     </p:extLst>
   </p:cSld>
   <p:clrMapOvr>
     <a:masterClrMapping/>
   </p:clrMapOvr>
+  <p:timing>
+    <p:tnLst>
+      <p:par>
+        <p:cTn id="1" dur="indefinite" restart="never" nodeType="tmRoot"/>
+      </p:par>
+    </p:tnLst>
+  </p:timing>
 </p:sld>
 </file>
 
@@ -4463,7 +4625,7 @@
                   </a:schemeClr>
                 </a:solidFill>
               </a:rPr>
-              <a:t>Pros</a:t>
+              <a:t>Stability</a:t>
             </a:r>
             <a:endParaRPr lang="en-US" dirty="0">
               <a:solidFill>
@@ -4486,169 +4648,12 @@
             <p:ph idx="1"/>
           </p:nvPr>
         </p:nvSpPr>
-        <p:spPr>
-          <a:xfrm>
-            <a:off x="1143001" y="2057399"/>
-            <a:ext cx="9431448" cy="4596898"/>
-          </a:xfrm>
-        </p:spPr>
-        <p:txBody>
-          <a:bodyPr>
-            <a:normAutofit/>
-          </a:bodyPr>
+        <p:spPr/>
+        <p:txBody>
+          <a:bodyPr/>
           <a:lstStyle/>
           <a:p>
             <a:r>
-              <a:rPr lang="en-CA" dirty="0" smtClean="0">
-                <a:solidFill>
-                  <a:schemeClr val="tx1">
-                    <a:lumMod val="75000"/>
-                    <a:lumOff val="25000"/>
-                  </a:schemeClr>
-                </a:solidFill>
-              </a:rPr>
-              <a:t>Similar concepts and structure to our backend</a:t>
-            </a:r>
-          </a:p>
-          <a:p>
-            <a:r>
-              <a:rPr lang="en-CA" dirty="0" smtClean="0">
-                <a:solidFill>
-                  <a:schemeClr val="tx1">
-                    <a:lumMod val="75000"/>
-                    <a:lumOff val="25000"/>
-                  </a:schemeClr>
-                </a:solidFill>
-              </a:rPr>
-              <a:t>Lots </a:t>
-            </a:r>
-            <a:r>
-              <a:rPr lang="en-CA" dirty="0">
-                <a:solidFill>
-                  <a:schemeClr val="tx1">
-                    <a:lumMod val="75000"/>
-                    <a:lumOff val="25000"/>
-                  </a:schemeClr>
-                </a:solidFill>
-              </a:rPr>
-              <a:t>of contributors </a:t>
-            </a:r>
-            <a:r>
-              <a:rPr lang="en-CA" dirty="0">
-                <a:solidFill>
-                  <a:schemeClr val="bg1">
-                    <a:lumMod val="65000"/>
-                  </a:schemeClr>
-                </a:solidFill>
-              </a:rPr>
-              <a:t>(</a:t>
-            </a:r>
-            <a:r>
-              <a:rPr lang="en-CA" dirty="0">
-                <a:solidFill>
-                  <a:schemeClr val="bg1">
-                    <a:lumMod val="65000"/>
-                  </a:schemeClr>
-                </a:solidFill>
-                <a:hlinkClick r:id="rId2"/>
-              </a:rPr>
-              <a:t>https://angular.io/about</a:t>
-            </a:r>
-            <a:r>
-              <a:rPr lang="en-CA" dirty="0" smtClean="0">
-                <a:solidFill>
-                  <a:schemeClr val="bg1">
-                    <a:lumMod val="65000"/>
-                  </a:schemeClr>
-                </a:solidFill>
-                <a:hlinkClick r:id="rId2"/>
-              </a:rPr>
-              <a:t>/</a:t>
-            </a:r>
-            <a:r>
-              <a:rPr lang="en-CA" dirty="0" smtClean="0">
-                <a:solidFill>
-                  <a:schemeClr val="bg1">
-                    <a:lumMod val="65000"/>
-                  </a:schemeClr>
-                </a:solidFill>
-              </a:rPr>
-              <a:t>)</a:t>
-            </a:r>
-            <a:endParaRPr lang="en-CA" dirty="0">
-              <a:solidFill>
-                <a:schemeClr val="bg1">
-                  <a:lumMod val="65000"/>
-                </a:schemeClr>
-              </a:solidFill>
-            </a:endParaRPr>
-          </a:p>
-          <a:p>
-            <a:r>
-              <a:rPr lang="en-CA" dirty="0">
-                <a:solidFill>
-                  <a:schemeClr val="tx1">
-                    <a:lumMod val="75000"/>
-                    <a:lumOff val="25000"/>
-                  </a:schemeClr>
-                </a:solidFill>
-              </a:rPr>
-              <a:t>Low </a:t>
-            </a:r>
-            <a:r>
-              <a:rPr lang="en-CA" dirty="0" smtClean="0">
-                <a:solidFill>
-                  <a:schemeClr val="tx1">
-                    <a:lumMod val="75000"/>
-                    <a:lumOff val="25000"/>
-                  </a:schemeClr>
-                </a:solidFill>
-              </a:rPr>
-              <a:t>JavaScript fatigue / reduced Churn</a:t>
-            </a:r>
-            <a:endParaRPr lang="en-CA" dirty="0">
-              <a:solidFill>
-                <a:schemeClr val="tx1">
-                  <a:lumMod val="75000"/>
-                  <a:lumOff val="25000"/>
-                </a:schemeClr>
-              </a:solidFill>
-            </a:endParaRPr>
-          </a:p>
-          <a:p>
-            <a:pPr marL="228600" lvl="1">
-              <a:spcBef>
-                <a:spcPts val="1400"/>
-              </a:spcBef>
-              <a:spcAft>
-                <a:spcPts val="0"/>
-              </a:spcAft>
-            </a:pPr>
-            <a:r>
-              <a:rPr lang="en-CA" sz="2200" dirty="0" smtClean="0">
-                <a:solidFill>
-                  <a:schemeClr val="tx1">
-                    <a:lumMod val="75000"/>
-                    <a:lumOff val="25000"/>
-                  </a:schemeClr>
-                </a:solidFill>
-              </a:rPr>
-              <a:t>Advocates </a:t>
-            </a:r>
-            <a:r>
-              <a:rPr lang="en-CA" sz="2200" dirty="0">
-                <a:solidFill>
-                  <a:schemeClr val="tx1">
-                    <a:lumMod val="75000"/>
-                    <a:lumOff val="25000"/>
-                  </a:schemeClr>
-                </a:solidFill>
-              </a:rPr>
-              <a:t>for the use of industry best practices such as: dependency injection, unit testing, service layers, interfaces and separation of concerns.  </a:t>
-            </a:r>
-          </a:p>
-          <a:p>
-            <a:r>
               <a:rPr lang="en-US" dirty="0" smtClean="0">
                 <a:solidFill>
                   <a:schemeClr val="tx1">
@@ -4657,29 +4662,33 @@
                   </a:schemeClr>
                 </a:solidFill>
               </a:rPr>
-              <a:t>S</a:t>
-            </a:r>
-            <a:r>
-              <a:rPr lang="en-US" dirty="0">
-                <a:solidFill>
-                  <a:schemeClr val="tx1">
-                    <a:lumMod val="75000"/>
-                    <a:lumOff val="25000"/>
-                  </a:schemeClr>
-                </a:solidFill>
-              </a:rPr>
-              <a:t>tatic type checking with </a:t>
-            </a:r>
-            <a:r>
-              <a:rPr lang="en-US" dirty="0" err="1">
-                <a:solidFill>
-                  <a:schemeClr val="tx1">
-                    <a:lumMod val="75000"/>
-                    <a:lumOff val="25000"/>
-                  </a:schemeClr>
-                </a:solidFill>
-              </a:rPr>
-              <a:t>TypeScript</a:t>
+              <a:t>Careful, methodical reinvention of mature, comprehensive framework</a:t>
+            </a:r>
+          </a:p>
+          <a:p>
+            <a:r>
+              <a:rPr lang="en-US" dirty="0" smtClean="0">
+                <a:solidFill>
+                  <a:schemeClr val="tx1">
+                    <a:lumMod val="75000"/>
+                    <a:lumOff val="25000"/>
+                  </a:schemeClr>
+                </a:solidFill>
+              </a:rPr>
+              <a:t>Less churn after release than other frameworks</a:t>
+            </a:r>
+          </a:p>
+          <a:p>
+            <a:r>
+              <a:rPr lang="en-US" dirty="0" smtClean="0">
+                <a:solidFill>
+                  <a:schemeClr val="tx1">
+                    <a:lumMod val="75000"/>
+                    <a:lumOff val="25000"/>
+                  </a:schemeClr>
+                </a:solidFill>
+              </a:rPr>
+              <a:t>Single team making decisions about future </a:t>
             </a:r>
             <a:endParaRPr lang="en-US" dirty="0">
               <a:solidFill>
@@ -4690,59 +4699,12 @@
               </a:solidFill>
             </a:endParaRPr>
           </a:p>
-          <a:p>
-            <a:r>
-              <a:rPr lang="en-US" dirty="0" smtClean="0">
-                <a:solidFill>
-                  <a:schemeClr val="tx1">
-                    <a:lumMod val="75000"/>
-                    <a:lumOff val="25000"/>
-                  </a:schemeClr>
-                </a:solidFill>
-              </a:rPr>
-              <a:t>Consistent </a:t>
-            </a:r>
-            <a:r>
-              <a:rPr lang="en-US" dirty="0">
-                <a:solidFill>
-                  <a:schemeClr val="tx1">
-                    <a:lumMod val="75000"/>
-                    <a:lumOff val="25000"/>
-                  </a:schemeClr>
-                </a:solidFill>
-              </a:rPr>
-              <a:t>documentation</a:t>
-            </a:r>
-          </a:p>
-          <a:p>
-            <a:r>
-              <a:rPr lang="en-US" dirty="0" smtClean="0">
-                <a:solidFill>
-                  <a:schemeClr val="tx1">
-                    <a:lumMod val="75000"/>
-                    <a:lumOff val="25000"/>
-                  </a:schemeClr>
-                </a:solidFill>
-              </a:rPr>
-              <a:t>Angular 2’s design embraces web component’s standard </a:t>
-            </a:r>
-            <a:r>
-              <a:rPr lang="en-US" dirty="0">
-                <a:solidFill>
-                  <a:schemeClr val="bg1">
-                    <a:lumMod val="65000"/>
-                  </a:schemeClr>
-                </a:solidFill>
-              </a:rPr>
-              <a:t>(rendering cross-platform native UI for iOS and Android)</a:t>
-            </a:r>
-          </a:p>
         </p:txBody>
       </p:sp>
     </p:spTree>
     <p:extLst>
       <p:ext uri="{BB962C8B-B14F-4D97-AF65-F5344CB8AC3E}">
-        <p14:creationId xmlns:p14="http://schemas.microsoft.com/office/powerpoint/2010/main" val="1083996137"/>
+        <p14:creationId xmlns:p14="http://schemas.microsoft.com/office/powerpoint/2010/main" val="3609019475"/>
       </p:ext>
     </p:extLst>
   </p:cSld>
@@ -4801,7 +4763,7 @@
                   </a:schemeClr>
                 </a:solidFill>
               </a:rPr>
-              <a:t>Cons</a:t>
+              <a:t>Pros</a:t>
             </a:r>
             <a:endParaRPr lang="en-US" dirty="0">
               <a:solidFill>
@@ -4824,22 +4786,67 @@
             <p:ph idx="1"/>
           </p:nvPr>
         </p:nvSpPr>
-        <p:spPr/>
-        <p:txBody>
-          <a:bodyPr/>
+        <p:spPr>
+          <a:xfrm>
+            <a:off x="1143001" y="2057399"/>
+            <a:ext cx="9431448" cy="4596898"/>
+          </a:xfrm>
+        </p:spPr>
+        <p:txBody>
+          <a:bodyPr>
+            <a:normAutofit/>
+          </a:bodyPr>
           <a:lstStyle/>
           <a:p>
-            <a:r>
-              <a:rPr lang="en-CA" dirty="0">
-                <a:solidFill>
-                  <a:schemeClr val="tx1">
-                    <a:lumMod val="75000"/>
-                    <a:lumOff val="25000"/>
-                  </a:schemeClr>
-                </a:solidFill>
-              </a:rPr>
-              <a:t>Template </a:t>
-            </a:r>
+            <a:pPr marL="228600" lvl="1">
+              <a:spcBef>
+                <a:spcPts val="1400"/>
+              </a:spcBef>
+              <a:spcAft>
+                <a:spcPts val="0"/>
+              </a:spcAft>
+            </a:pPr>
+            <a:r>
+              <a:rPr lang="en-CA" sz="2200" dirty="0">
+                <a:solidFill>
+                  <a:schemeClr val="tx1">
+                    <a:lumMod val="75000"/>
+                    <a:lumOff val="25000"/>
+                  </a:schemeClr>
+                </a:solidFill>
+              </a:rPr>
+              <a:t>Advocates for the use of industry best practices such as: dependency injection, unit testing, service layers, interfaces and separation of </a:t>
+            </a:r>
+            <a:r>
+              <a:rPr lang="en-CA" sz="2200" dirty="0" smtClean="0">
+                <a:solidFill>
+                  <a:schemeClr val="tx1">
+                    <a:lumMod val="75000"/>
+                    <a:lumOff val="25000"/>
+                  </a:schemeClr>
+                </a:solidFill>
+              </a:rPr>
+              <a:t>concerns  </a:t>
+            </a:r>
+            <a:r>
+              <a:rPr lang="en-CA" sz="2200" dirty="0">
+                <a:solidFill>
+                  <a:schemeClr val="bg1">
+                    <a:lumMod val="65000"/>
+                  </a:schemeClr>
+                </a:solidFill>
+              </a:rPr>
+              <a:t>(similar to our current backend)</a:t>
+            </a:r>
+            <a:endParaRPr lang="en-CA" sz="2200" dirty="0">
+              <a:solidFill>
+                <a:schemeClr val="bg1">
+                  <a:lumMod val="65000"/>
+                </a:schemeClr>
+              </a:solidFill>
+            </a:endParaRPr>
+          </a:p>
+          <a:p>
             <a:r>
               <a:rPr lang="en-CA" dirty="0" smtClean="0">
                 <a:solidFill>
@@ -4849,45 +4856,81 @@
                   </a:schemeClr>
                 </a:solidFill>
               </a:rPr>
-              <a:t>syntax takes some getting used to</a:t>
-            </a:r>
-          </a:p>
-          <a:p>
+              <a:t>Lots </a:t>
+            </a:r>
+            <a:r>
+              <a:rPr lang="en-CA" dirty="0">
+                <a:solidFill>
+                  <a:schemeClr val="tx1">
+                    <a:lumMod val="75000"/>
+                    <a:lumOff val="25000"/>
+                  </a:schemeClr>
+                </a:solidFill>
+              </a:rPr>
+              <a:t>of contributors </a:t>
+            </a:r>
+            <a:r>
+              <a:rPr lang="en-CA" dirty="0">
+                <a:solidFill>
+                  <a:schemeClr val="bg1">
+                    <a:lumMod val="65000"/>
+                  </a:schemeClr>
+                </a:solidFill>
+              </a:rPr>
+              <a:t>(</a:t>
+            </a:r>
+            <a:r>
+              <a:rPr lang="en-CA" dirty="0">
+                <a:solidFill>
+                  <a:schemeClr val="bg1">
+                    <a:lumMod val="65000"/>
+                  </a:schemeClr>
+                </a:solidFill>
+                <a:hlinkClick r:id="rId2"/>
+              </a:rPr>
+              <a:t>https://angular.io/about</a:t>
+            </a:r>
             <a:r>
               <a:rPr lang="en-CA" dirty="0" smtClean="0">
                 <a:solidFill>
-                  <a:schemeClr val="tx1">
-                    <a:lumMod val="75000"/>
-                    <a:lumOff val="25000"/>
-                  </a:schemeClr>
-                </a:solidFill>
-              </a:rPr>
-              <a:t>No </a:t>
-            </a:r>
-            <a:r>
-              <a:rPr lang="en-CA" dirty="0">
-                <a:solidFill>
-                  <a:schemeClr val="tx1">
-                    <a:lumMod val="75000"/>
-                    <a:lumOff val="25000"/>
-                  </a:schemeClr>
-                </a:solidFill>
-              </a:rPr>
-              <a:t>syntax highlighting within Template </a:t>
+                  <a:schemeClr val="bg1">
+                    <a:lumMod val="65000"/>
+                  </a:schemeClr>
+                </a:solidFill>
+                <a:hlinkClick r:id="rId2"/>
+              </a:rPr>
+              <a:t>/</a:t>
             </a:r>
             <a:r>
               <a:rPr lang="en-CA" dirty="0" smtClean="0">
                 <a:solidFill>
-                  <a:schemeClr val="tx1">
-                    <a:lumMod val="75000"/>
-                    <a:lumOff val="25000"/>
-                  </a:schemeClr>
-                </a:solidFill>
-              </a:rPr>
-              <a:t>or CSS strings</a:t>
-            </a:r>
-          </a:p>
-          <a:p>
+                  <a:schemeClr val="bg1">
+                    <a:lumMod val="65000"/>
+                  </a:schemeClr>
+                </a:solidFill>
+              </a:rPr>
+              <a:t>)</a:t>
+            </a:r>
+            <a:endParaRPr lang="en-CA" dirty="0">
+              <a:solidFill>
+                <a:schemeClr val="bg1">
+                  <a:lumMod val="65000"/>
+                </a:schemeClr>
+              </a:solidFill>
+            </a:endParaRPr>
+          </a:p>
+          <a:p>
+            <a:r>
+              <a:rPr lang="en-CA" dirty="0">
+                <a:solidFill>
+                  <a:schemeClr val="tx1">
+                    <a:lumMod val="75000"/>
+                    <a:lumOff val="25000"/>
+                  </a:schemeClr>
+                </a:solidFill>
+              </a:rPr>
+              <a:t>Low </a:t>
+            </a:r>
             <a:r>
               <a:rPr lang="en-CA" dirty="0" smtClean="0">
                 <a:solidFill>
@@ -4897,7 +4940,42 @@
                   </a:schemeClr>
                 </a:solidFill>
               </a:rPr>
-              <a:t>Many errors are caught at runtime</a:t>
+              <a:t>JavaScript fatigue / reduced </a:t>
+            </a:r>
+            <a:r>
+              <a:rPr lang="en-CA" dirty="0" smtClean="0">
+                <a:solidFill>
+                  <a:schemeClr val="tx1">
+                    <a:lumMod val="75000"/>
+                    <a:lumOff val="25000"/>
+                  </a:schemeClr>
+                </a:solidFill>
+              </a:rPr>
+              <a:t>Churn</a:t>
+            </a:r>
+          </a:p>
+          <a:p>
+            <a:r>
+              <a:rPr lang="en-US" dirty="0">
+                <a:solidFill>
+                  <a:schemeClr val="tx1">
+                    <a:lumMod val="75000"/>
+                    <a:lumOff val="25000"/>
+                  </a:schemeClr>
+                </a:solidFill>
+              </a:rPr>
+              <a:t>Consistent </a:t>
+            </a:r>
+            <a:r>
+              <a:rPr lang="en-US" dirty="0" smtClean="0">
+                <a:solidFill>
+                  <a:schemeClr val="tx1">
+                    <a:lumMod val="75000"/>
+                    <a:lumOff val="25000"/>
+                  </a:schemeClr>
+                </a:solidFill>
+              </a:rPr>
+              <a:t>documentation</a:t>
             </a:r>
             <a:endParaRPr lang="en-CA" dirty="0">
               <a:solidFill>
@@ -4910,74 +4988,37 @@
           </a:p>
           <a:p>
             <a:r>
-              <a:rPr lang="en-CA" dirty="0">
-                <a:solidFill>
-                  <a:schemeClr val="tx1">
-                    <a:lumMod val="75000"/>
-                    <a:lumOff val="25000"/>
-                  </a:schemeClr>
-                </a:solidFill>
-              </a:rPr>
-              <a:t>Just came out with a release candidate</a:t>
-            </a:r>
-          </a:p>
-          <a:p>
-            <a:r>
-              <a:rPr lang="en-CA" dirty="0">
-                <a:solidFill>
-                  <a:schemeClr val="tx1">
-                    <a:lumMod val="75000"/>
-                    <a:lumOff val="25000"/>
-                  </a:schemeClr>
-                </a:solidFill>
-              </a:rPr>
-              <a:t>Modified parts of the API and Template format during our investigation</a:t>
-            </a:r>
-          </a:p>
-          <a:p>
-            <a:r>
-              <a:rPr lang="en-CA" dirty="0">
-                <a:solidFill>
-                  <a:schemeClr val="tx1">
-                    <a:lumMod val="75000"/>
-                    <a:lumOff val="25000"/>
-                  </a:schemeClr>
-                </a:solidFill>
-              </a:rPr>
-              <a:t>Some coding errors will not produce runtime or compiler errors </a:t>
-            </a:r>
-            <a:r>
-              <a:rPr lang="en-CA" dirty="0">
-                <a:solidFill>
-                  <a:schemeClr val="bg1">
-                    <a:lumMod val="65000"/>
-                  </a:schemeClr>
-                </a:solidFill>
-              </a:rPr>
-              <a:t>(very uncommon</a:t>
-            </a:r>
-            <a:r>
-              <a:rPr lang="en-CA" dirty="0" smtClean="0">
-                <a:solidFill>
-                  <a:schemeClr val="bg1">
-                    <a:lumMod val="65000"/>
-                  </a:schemeClr>
-                </a:solidFill>
-              </a:rPr>
-              <a:t>)</a:t>
-            </a:r>
-          </a:p>
-          <a:p>
-            <a:r>
-              <a:rPr lang="en-CA" dirty="0" smtClean="0">
-                <a:solidFill>
-                  <a:schemeClr val="tx1">
-                    <a:lumMod val="75000"/>
-                    <a:lumOff val="25000"/>
-                  </a:schemeClr>
-                </a:solidFill>
-              </a:rPr>
-              <a:t>Does not contain any built-in handlers for state</a:t>
+              <a:rPr lang="en-US" dirty="0" smtClean="0">
+                <a:solidFill>
+                  <a:schemeClr val="tx1">
+                    <a:lumMod val="75000"/>
+                    <a:lumOff val="25000"/>
+                  </a:schemeClr>
+                </a:solidFill>
+              </a:rPr>
+              <a:t>Static </a:t>
+            </a:r>
+            <a:r>
+              <a:rPr lang="en-US" dirty="0">
+                <a:solidFill>
+                  <a:schemeClr val="tx1">
+                    <a:lumMod val="75000"/>
+                    <a:lumOff val="25000"/>
+                  </a:schemeClr>
+                </a:solidFill>
+              </a:rPr>
+              <a:t>type checking with </a:t>
+            </a:r>
+            <a:r>
+              <a:rPr lang="en-US" dirty="0" err="1">
+                <a:solidFill>
+                  <a:schemeClr val="tx1">
+                    <a:lumMod val="75000"/>
+                    <a:lumOff val="25000"/>
+                  </a:schemeClr>
+                </a:solidFill>
+              </a:rPr>
+              <a:t>TypeScript</a:t>
             </a:r>
             <a:endParaRPr lang="en-US" dirty="0">
               <a:solidFill>
@@ -4989,21 +5030,45 @@
             </a:endParaRPr>
           </a:p>
           <a:p>
-            <a:endParaRPr lang="en-US" dirty="0">
-              <a:solidFill>
-                <a:schemeClr val="tx1">
-                  <a:lumMod val="75000"/>
-                  <a:lumOff val="25000"/>
-                </a:schemeClr>
-              </a:solidFill>
-            </a:endParaRPr>
+            <a:r>
+              <a:rPr lang="en-US" dirty="0" smtClean="0">
+                <a:solidFill>
+                  <a:schemeClr val="tx1">
+                    <a:lumMod val="75000"/>
+                    <a:lumOff val="25000"/>
+                  </a:schemeClr>
+                </a:solidFill>
+              </a:rPr>
+              <a:t>Angular </a:t>
+            </a:r>
+            <a:r>
+              <a:rPr lang="en-US" dirty="0" smtClean="0">
+                <a:solidFill>
+                  <a:schemeClr val="tx1">
+                    <a:lumMod val="75000"/>
+                    <a:lumOff val="25000"/>
+                  </a:schemeClr>
+                </a:solidFill>
+              </a:rPr>
+              <a:t>2’s design embraces web component’s standard </a:t>
+            </a:r>
+            <a:r>
+              <a:rPr lang="en-US" dirty="0">
+                <a:solidFill>
+                  <a:schemeClr val="bg1">
+                    <a:lumMod val="65000"/>
+                  </a:schemeClr>
+                </a:solidFill>
+              </a:rPr>
+              <a:t>(rendering cross-platform native UI for iOS and Android)</a:t>
+            </a:r>
           </a:p>
         </p:txBody>
       </p:sp>
     </p:spTree>
     <p:extLst>
       <p:ext uri="{BB962C8B-B14F-4D97-AF65-F5344CB8AC3E}">
-        <p14:creationId xmlns:p14="http://schemas.microsoft.com/office/powerpoint/2010/main" val="1098847303"/>
+        <p14:creationId xmlns:p14="http://schemas.microsoft.com/office/powerpoint/2010/main" val="1083996137"/>
       </p:ext>
     </p:extLst>
   </p:cSld>
@@ -5062,7 +5127,7 @@
                   </a:schemeClr>
                 </a:solidFill>
               </a:rPr>
-              <a:t>Sources</a:t>
+              <a:t>Cons</a:t>
             </a:r>
             <a:endParaRPr lang="en-US" dirty="0">
               <a:solidFill>
@@ -5085,6 +5150,367 @@
             <p:ph idx="1"/>
           </p:nvPr>
         </p:nvSpPr>
+        <p:spPr/>
+        <p:txBody>
+          <a:bodyPr/>
+          <a:lstStyle/>
+          <a:p>
+            <a:r>
+              <a:rPr lang="en-CA" dirty="0">
+                <a:solidFill>
+                  <a:schemeClr val="tx1">
+                    <a:lumMod val="75000"/>
+                    <a:lumOff val="25000"/>
+                  </a:schemeClr>
+                </a:solidFill>
+              </a:rPr>
+              <a:t>Template </a:t>
+            </a:r>
+            <a:r>
+              <a:rPr lang="en-CA" dirty="0" smtClean="0">
+                <a:solidFill>
+                  <a:schemeClr val="tx1">
+                    <a:lumMod val="75000"/>
+                    <a:lumOff val="25000"/>
+                  </a:schemeClr>
+                </a:solidFill>
+              </a:rPr>
+              <a:t>syntax takes some getting used to</a:t>
+            </a:r>
+          </a:p>
+          <a:p>
+            <a:r>
+              <a:rPr lang="en-CA" dirty="0" smtClean="0">
+                <a:solidFill>
+                  <a:schemeClr val="tx1">
+                    <a:lumMod val="75000"/>
+                    <a:lumOff val="25000"/>
+                  </a:schemeClr>
+                </a:solidFill>
+              </a:rPr>
+              <a:t>No </a:t>
+            </a:r>
+            <a:r>
+              <a:rPr lang="en-CA" dirty="0">
+                <a:solidFill>
+                  <a:schemeClr val="tx1">
+                    <a:lumMod val="75000"/>
+                    <a:lumOff val="25000"/>
+                  </a:schemeClr>
+                </a:solidFill>
+              </a:rPr>
+              <a:t>syntax highlighting within Template </a:t>
+            </a:r>
+            <a:r>
+              <a:rPr lang="en-CA" dirty="0" smtClean="0">
+                <a:solidFill>
+                  <a:schemeClr val="tx1">
+                    <a:lumMod val="75000"/>
+                    <a:lumOff val="25000"/>
+                  </a:schemeClr>
+                </a:solidFill>
+              </a:rPr>
+              <a:t>or CSS </a:t>
+            </a:r>
+            <a:r>
+              <a:rPr lang="en-CA" dirty="0" smtClean="0">
+                <a:solidFill>
+                  <a:schemeClr val="tx1">
+                    <a:lumMod val="75000"/>
+                    <a:lumOff val="25000"/>
+                  </a:schemeClr>
+                </a:solidFill>
+              </a:rPr>
+              <a:t>strings </a:t>
+            </a:r>
+            <a:r>
+              <a:rPr lang="en-CA" dirty="0">
+                <a:solidFill>
+                  <a:schemeClr val="bg1">
+                    <a:lumMod val="65000"/>
+                  </a:schemeClr>
+                </a:solidFill>
+              </a:rPr>
+              <a:t>(coming soon to editors)</a:t>
+            </a:r>
+          </a:p>
+          <a:p>
+            <a:r>
+              <a:rPr lang="en-CA" dirty="0" smtClean="0">
+                <a:solidFill>
+                  <a:schemeClr val="tx1">
+                    <a:lumMod val="75000"/>
+                    <a:lumOff val="25000"/>
+                  </a:schemeClr>
+                </a:solidFill>
+              </a:rPr>
+              <a:t>Many errors are caught at runtime</a:t>
+            </a:r>
+            <a:endParaRPr lang="en-CA" dirty="0">
+              <a:solidFill>
+                <a:schemeClr val="tx1">
+                  <a:lumMod val="75000"/>
+                  <a:lumOff val="25000"/>
+                </a:schemeClr>
+              </a:solidFill>
+            </a:endParaRPr>
+          </a:p>
+          <a:p>
+            <a:r>
+              <a:rPr lang="en-CA" dirty="0">
+                <a:solidFill>
+                  <a:schemeClr val="tx1">
+                    <a:lumMod val="75000"/>
+                    <a:lumOff val="25000"/>
+                  </a:schemeClr>
+                </a:solidFill>
+              </a:rPr>
+              <a:t>Just came out with a release candidate</a:t>
+            </a:r>
+          </a:p>
+          <a:p>
+            <a:r>
+              <a:rPr lang="en-CA" dirty="0">
+                <a:solidFill>
+                  <a:schemeClr val="tx1">
+                    <a:lumMod val="75000"/>
+                    <a:lumOff val="25000"/>
+                  </a:schemeClr>
+                </a:solidFill>
+              </a:rPr>
+              <a:t>Modified parts of the API and Template format during our investigation</a:t>
+            </a:r>
+          </a:p>
+          <a:p>
+            <a:r>
+              <a:rPr lang="en-CA" dirty="0">
+                <a:solidFill>
+                  <a:schemeClr val="tx1">
+                    <a:lumMod val="75000"/>
+                    <a:lumOff val="25000"/>
+                  </a:schemeClr>
+                </a:solidFill>
+              </a:rPr>
+              <a:t>Some coding errors will not produce runtime or compiler errors </a:t>
+            </a:r>
+            <a:r>
+              <a:rPr lang="en-CA" dirty="0">
+                <a:solidFill>
+                  <a:schemeClr val="bg1">
+                    <a:lumMod val="65000"/>
+                  </a:schemeClr>
+                </a:solidFill>
+              </a:rPr>
+              <a:t>(very uncommon</a:t>
+            </a:r>
+            <a:r>
+              <a:rPr lang="en-CA" dirty="0" smtClean="0">
+                <a:solidFill>
+                  <a:schemeClr val="bg1">
+                    <a:lumMod val="65000"/>
+                  </a:schemeClr>
+                </a:solidFill>
+              </a:rPr>
+              <a:t>)</a:t>
+            </a:r>
+          </a:p>
+          <a:p>
+            <a:r>
+              <a:rPr lang="en-CA" dirty="0" smtClean="0">
+                <a:solidFill>
+                  <a:schemeClr val="tx1">
+                    <a:lumMod val="75000"/>
+                    <a:lumOff val="25000"/>
+                  </a:schemeClr>
+                </a:solidFill>
+              </a:rPr>
+              <a:t>Does not contain any built-in handlers for state</a:t>
+            </a:r>
+            <a:endParaRPr lang="en-US" dirty="0">
+              <a:solidFill>
+                <a:schemeClr val="tx1">
+                  <a:lumMod val="75000"/>
+                  <a:lumOff val="25000"/>
+                </a:schemeClr>
+              </a:solidFill>
+            </a:endParaRPr>
+          </a:p>
+          <a:p>
+            <a:endParaRPr lang="en-US" dirty="0">
+              <a:solidFill>
+                <a:schemeClr val="tx1">
+                  <a:lumMod val="75000"/>
+                  <a:lumOff val="25000"/>
+                </a:schemeClr>
+              </a:solidFill>
+            </a:endParaRPr>
+          </a:p>
+        </p:txBody>
+      </p:sp>
+    </p:spTree>
+    <p:extLst>
+      <p:ext uri="{BB962C8B-B14F-4D97-AF65-F5344CB8AC3E}">
+        <p14:creationId xmlns:p14="http://schemas.microsoft.com/office/powerpoint/2010/main" val="1098847303"/>
+      </p:ext>
+    </p:extLst>
+  </p:cSld>
+  <p:clrMapOvr>
+    <a:masterClrMapping/>
+  </p:clrMapOvr>
+</p:sld>
+</file>
+
+<file path=ppt/slides/slide18.xml><?xml version="1.0" encoding="utf-8"?>
+<p:sld xmlns:a="http://schemas.openxmlformats.org/drawingml/2006/main" xmlns:r="http://schemas.openxmlformats.org/officeDocument/2006/relationships" xmlns:p="http://schemas.openxmlformats.org/presentationml/2006/main">
+  <p:cSld>
+    <p:spTree>
+      <p:nvGrpSpPr>
+        <p:cNvPr id="1" name=""/>
+        <p:cNvGrpSpPr/>
+        <p:nvPr/>
+      </p:nvGrpSpPr>
+      <p:grpSpPr>
+        <a:xfrm>
+          <a:off x="0" y="0"/>
+          <a:ext cx="0" cy="0"/>
+          <a:chOff x="0" y="0"/>
+          <a:chExt cx="0" cy="0"/>
+        </a:xfrm>
+      </p:grpSpPr>
+      <p:sp>
+        <p:nvSpPr>
+          <p:cNvPr id="2" name="Title 1"/>
+          <p:cNvSpPr>
+            <a:spLocks noGrp="1"/>
+          </p:cNvSpPr>
+          <p:nvPr>
+            <p:ph type="title"/>
+          </p:nvPr>
+        </p:nvSpPr>
+        <p:spPr/>
+        <p:txBody>
+          <a:bodyPr/>
+          <a:lstStyle/>
+          <a:p>
+            <a:r>
+              <a:rPr lang="en-CA" dirty="0"/>
+              <a:t>Angular 2 will be what’s “so hot right now” in 2016</a:t>
+            </a:r>
+            <a:endParaRPr lang="en-CA" dirty="0"/>
+          </a:p>
+        </p:txBody>
+      </p:sp>
+      <p:pic>
+        <p:nvPicPr>
+          <p:cNvPr id="4" name="Content Placeholder 3"/>
+          <p:cNvPicPr>
+            <a:picLocks noGrp="1" noChangeAspect="1"/>
+          </p:cNvPicPr>
+          <p:nvPr>
+            <p:ph idx="1"/>
+          </p:nvPr>
+        </p:nvPicPr>
+        <p:blipFill>
+          <a:blip r:embed="rId2"/>
+          <a:stretch>
+            <a:fillRect/>
+          </a:stretch>
+        </p:blipFill>
+        <p:spPr>
+          <a:xfrm>
+            <a:off x="3083254" y="2057400"/>
+            <a:ext cx="5992155" cy="4038600"/>
+          </a:xfrm>
+          <a:prstGeom prst="rect">
+            <a:avLst/>
+          </a:prstGeom>
+        </p:spPr>
+      </p:pic>
+    </p:spTree>
+    <p:extLst>
+      <p:ext uri="{BB962C8B-B14F-4D97-AF65-F5344CB8AC3E}">
+        <p14:creationId xmlns:p14="http://schemas.microsoft.com/office/powerpoint/2010/main" val="3418695846"/>
+      </p:ext>
+    </p:extLst>
+  </p:cSld>
+  <p:clrMapOvr>
+    <a:masterClrMapping/>
+  </p:clrMapOvr>
+</p:sld>
+</file>
+
+<file path=ppt/slides/slide19.xml><?xml version="1.0" encoding="utf-8"?>
+<p:sld xmlns:a="http://schemas.openxmlformats.org/drawingml/2006/main" xmlns:r="http://schemas.openxmlformats.org/officeDocument/2006/relationships" xmlns:p="http://schemas.openxmlformats.org/presentationml/2006/main">
+  <p:cSld>
+    <p:bg>
+      <p:bgPr>
+        <a:solidFill>
+          <a:srgbClr val="1976D2"/>
+        </a:solidFill>
+        <a:effectLst/>
+      </p:bgPr>
+    </p:bg>
+    <p:spTree>
+      <p:nvGrpSpPr>
+        <p:cNvPr id="1" name=""/>
+        <p:cNvGrpSpPr/>
+        <p:nvPr/>
+      </p:nvGrpSpPr>
+      <p:grpSpPr>
+        <a:xfrm>
+          <a:off x="0" y="0"/>
+          <a:ext cx="0" cy="0"/>
+          <a:chOff x="0" y="0"/>
+          <a:chExt cx="0" cy="0"/>
+        </a:xfrm>
+      </p:grpSpPr>
+      <p:sp>
+        <p:nvSpPr>
+          <p:cNvPr id="2" name="Title 1"/>
+          <p:cNvSpPr>
+            <a:spLocks noGrp="1"/>
+          </p:cNvSpPr>
+          <p:nvPr>
+            <p:ph type="title"/>
+          </p:nvPr>
+        </p:nvSpPr>
+        <p:spPr/>
+        <p:txBody>
+          <a:bodyPr/>
+          <a:lstStyle/>
+          <a:p>
+            <a:r>
+              <a:rPr lang="en-CA" dirty="0">
+                <a:solidFill>
+                  <a:schemeClr val="tx1">
+                    <a:lumMod val="50000"/>
+                    <a:lumOff val="50000"/>
+                  </a:schemeClr>
+                </a:solidFill>
+              </a:rPr>
+              <a:t>Sources</a:t>
+            </a:r>
+            <a:endParaRPr lang="en-US" dirty="0">
+              <a:solidFill>
+                <a:schemeClr val="tx1">
+                  <a:lumMod val="50000"/>
+                  <a:lumOff val="50000"/>
+                </a:schemeClr>
+              </a:solidFill>
+            </a:endParaRPr>
+          </a:p>
+        </p:txBody>
+      </p:sp>
+      <p:sp>
+        <p:nvSpPr>
+          <p:cNvPr id="3" name="Content Placeholder 2"/>
+          <p:cNvSpPr>
+            <a:spLocks noGrp="1"/>
+          </p:cNvSpPr>
+          <p:nvPr>
+            <p:ph idx="1"/>
+          </p:nvPr>
+        </p:nvSpPr>
         <p:spPr>
           <a:xfrm>
             <a:off x="1136195" y="2057400"/>
@@ -5182,6 +5608,9 @@
               </a:rPr>
               <a:t>/</a:t>
             </a:r>
+            <a:endParaRPr lang="en-US" dirty="0" smtClean="0"/>
+          </a:p>
+          <a:p>
             <a:endParaRPr lang="en-US" dirty="0" smtClean="0"/>
           </a:p>
           <a:p>
@@ -5918,7 +6347,7 @@
           <a:lstStyle/>
           <a:p>
             <a:r>
-              <a:rPr lang="en-CA" dirty="0">
+              <a:rPr lang="en-CA" dirty="0" smtClean="0">
                 <a:solidFill>
                   <a:schemeClr val="tx1">
                     <a:lumMod val="50000"/>
@@ -5926,7 +6355,7 @@
                   </a:schemeClr>
                 </a:solidFill>
               </a:rPr>
-              <a:t>Component</a:t>
+              <a:t>Bindings</a:t>
             </a:r>
             <a:endParaRPr lang="en-US" dirty="0">
               <a:solidFill>
@@ -5998,7 +6427,7 @@
         </p:spPr>
         <p:txBody>
           <a:bodyPr>
-            <a:normAutofit lnSpcReduction="10000"/>
+            <a:normAutofit fontScale="85000" lnSpcReduction="20000"/>
           </a:bodyPr>
           <a:lstStyle/>
           <a:p>
@@ -6019,18 +6448,7 @@
                   </a:schemeClr>
                 </a:solidFill>
               </a:rPr>
-              <a:t> </a:t>
-            </a:r>
-            <a:r>
-              <a:rPr lang="en-CA" dirty="0" smtClean="0">
-                <a:solidFill>
-                  <a:schemeClr val="tx1">
-                    <a:lumMod val="75000"/>
-                    <a:lumOff val="25000"/>
-                  </a:schemeClr>
-                </a:solidFill>
-              </a:rPr>
-              <a:t>and </a:t>
+              <a:t> and </a:t>
             </a:r>
             <a:r>
               <a:rPr lang="en-CA" dirty="0">
@@ -6132,13 +6550,47 @@
               <a:t> can expose specific properties or methods to other </a:t>
             </a:r>
             <a:r>
-              <a:rPr lang="en-CA" dirty="0">
+              <a:rPr lang="en-CA" dirty="0" smtClean="0">
                 <a:solidFill>
                   <a:srgbClr val="1CADE4"/>
                 </a:solidFill>
               </a:rPr>
               <a:t>Components</a:t>
             </a:r>
+          </a:p>
+          <a:p>
+            <a:r>
+              <a:rPr lang="en-CA" dirty="0" err="1" smtClean="0">
+                <a:solidFill>
+                  <a:srgbClr val="1CADE4"/>
+                </a:solidFill>
+              </a:rPr>
+              <a:t>ngModel</a:t>
+            </a:r>
+            <a:r>
+              <a:rPr lang="en-CA" dirty="0" smtClean="0">
+                <a:solidFill>
+                  <a:srgbClr val="1CADE4"/>
+                </a:solidFill>
+              </a:rPr>
+              <a:t> </a:t>
+            </a:r>
+            <a:r>
+              <a:rPr lang="en-CA" dirty="0" smtClean="0">
+                <a:solidFill>
+                  <a:schemeClr val="tx1">
+                    <a:lumMod val="75000"/>
+                    <a:lumOff val="25000"/>
+                  </a:schemeClr>
+                </a:solidFill>
+              </a:rPr>
+              <a:t>is used for form inputs and is an example of a two-way binding</a:t>
+            </a:r>
+            <a:endParaRPr lang="en-CA" dirty="0">
+              <a:solidFill>
+                <a:srgbClr val="1CADE4"/>
+              </a:solidFill>
+            </a:endParaRPr>
           </a:p>
         </p:txBody>
       </p:sp>
@@ -6421,13 +6873,32 @@
               <a:t>into </a:t>
             </a:r>
             <a:r>
-              <a:rPr lang="en-CA" dirty="0">
+              <a:rPr lang="en-CA" dirty="0" smtClean="0">
                 <a:solidFill>
                   <a:srgbClr val="1CADE4"/>
                 </a:solidFill>
               </a:rPr>
               <a:t>Components</a:t>
             </a:r>
+            <a:r>
+              <a:rPr lang="en-CA" dirty="0">
+                <a:solidFill>
+                  <a:schemeClr val="tx1">
+                    <a:lumMod val="75000"/>
+                    <a:lumOff val="25000"/>
+                  </a:schemeClr>
+                </a:solidFill>
+              </a:rPr>
+              <a:t>, or any class dependency</a:t>
+            </a:r>
+            <a:endParaRPr lang="en-CA" dirty="0">
+              <a:solidFill>
+                <a:schemeClr val="tx1">
+                  <a:lumMod val="75000"/>
+                  <a:lumOff val="25000"/>
+                </a:schemeClr>
+              </a:solidFill>
+            </a:endParaRPr>
           </a:p>
           <a:p>
             <a:r>
@@ -6632,8 +7103,16 @@
                   </a:schemeClr>
                 </a:solidFill>
               </a:rPr>
-              <a:t>pick</a:t>
-            </a:r>
+              <a:t>pick, intuitive API</a:t>
+            </a:r>
+            <a:endParaRPr lang="en-CA" dirty="0" smtClean="0">
+              <a:solidFill>
+                <a:schemeClr val="tx1">
+                  <a:lumMod val="75000"/>
+                  <a:lumOff val="25000"/>
+                </a:schemeClr>
+              </a:solidFill>
+            </a:endParaRPr>
           </a:p>
           <a:p>
             <a:r>
@@ -6988,6 +7467,463 @@
           </a:p>
         </p:txBody>
       </p:sp>
+      <p:sp>
+        <p:nvSpPr>
+          <p:cNvPr id="6" name="Content Placeholder 2"/>
+          <p:cNvSpPr txBox="1">
+            <a:spLocks/>
+          </p:cNvSpPr>
+          <p:nvPr/>
+        </p:nvSpPr>
+        <p:spPr>
+          <a:xfrm>
+            <a:off x="516346" y="5497156"/>
+            <a:ext cx="6062250" cy="1528434"/>
+          </a:xfrm>
+          <a:prstGeom prst="rect">
+            <a:avLst/>
+          </a:prstGeom>
+        </p:spPr>
+        <p:txBody>
+          <a:bodyPr vert="horz" lIns="91440" tIns="45720" rIns="91440" bIns="45720" rtlCol="0">
+            <a:normAutofit/>
+          </a:bodyPr>
+          <a:lstStyle>
+            <a:lvl1pPr marL="228600" indent="-182880" algn="l" defTabSz="914400" rtl="0" eaLnBrk="1" latinLnBrk="0" hangingPunct="1">
+              <a:lnSpc>
+                <a:spcPct val="90000"/>
+              </a:lnSpc>
+              <a:spcBef>
+                <a:spcPts val="1400"/>
+              </a:spcBef>
+              <a:buClr>
+                <a:schemeClr val="accent1"/>
+              </a:buClr>
+              <a:buSzPct val="80000"/>
+              <a:buFont typeface="Corbel" pitchFamily="34" charset="0"/>
+              <a:buChar char="•"/>
+              <a:defRPr sz="2200" kern="1200">
+                <a:solidFill>
+                  <a:schemeClr val="accent1"/>
+                </a:solidFill>
+                <a:latin typeface="+mn-lt"/>
+                <a:ea typeface="+mn-ea"/>
+                <a:cs typeface="+mn-cs"/>
+              </a:defRPr>
+            </a:lvl1pPr>
+            <a:lvl2pPr marL="457200" indent="-182880" algn="l" defTabSz="914400" rtl="0" eaLnBrk="1" latinLnBrk="0" hangingPunct="1">
+              <a:lnSpc>
+                <a:spcPct val="90000"/>
+              </a:lnSpc>
+              <a:spcBef>
+                <a:spcPts val="200"/>
+              </a:spcBef>
+              <a:spcAft>
+                <a:spcPts val="400"/>
+              </a:spcAft>
+              <a:buClr>
+                <a:schemeClr val="accent1"/>
+              </a:buClr>
+              <a:buSzPct val="80000"/>
+              <a:buFont typeface="Corbel" pitchFamily="34" charset="0"/>
+              <a:buChar char="•"/>
+              <a:defRPr sz="2000" kern="1200">
+                <a:solidFill>
+                  <a:schemeClr val="accent1"/>
+                </a:solidFill>
+                <a:latin typeface="+mn-lt"/>
+                <a:ea typeface="+mn-ea"/>
+                <a:cs typeface="+mn-cs"/>
+              </a:defRPr>
+            </a:lvl2pPr>
+            <a:lvl3pPr marL="731520" indent="-182880" algn="l" defTabSz="914400" rtl="0" eaLnBrk="1" latinLnBrk="0" hangingPunct="1">
+              <a:lnSpc>
+                <a:spcPct val="90000"/>
+              </a:lnSpc>
+              <a:spcBef>
+                <a:spcPts val="200"/>
+              </a:spcBef>
+              <a:spcAft>
+                <a:spcPts val="400"/>
+              </a:spcAft>
+              <a:buClr>
+                <a:schemeClr val="accent1"/>
+              </a:buClr>
+              <a:buSzPct val="80000"/>
+              <a:buFont typeface="Corbel" pitchFamily="34" charset="0"/>
+              <a:buChar char="•"/>
+              <a:defRPr sz="1800" kern="1200">
+                <a:solidFill>
+                  <a:schemeClr val="accent1"/>
+                </a:solidFill>
+                <a:latin typeface="+mn-lt"/>
+                <a:ea typeface="+mn-ea"/>
+                <a:cs typeface="+mn-cs"/>
+              </a:defRPr>
+            </a:lvl3pPr>
+            <a:lvl4pPr marL="1005840" indent="-182880" algn="l" defTabSz="914400" rtl="0" eaLnBrk="1" latinLnBrk="0" hangingPunct="1">
+              <a:lnSpc>
+                <a:spcPct val="90000"/>
+              </a:lnSpc>
+              <a:spcBef>
+                <a:spcPts val="200"/>
+              </a:spcBef>
+              <a:spcAft>
+                <a:spcPts val="400"/>
+              </a:spcAft>
+              <a:buClr>
+                <a:schemeClr val="accent1"/>
+              </a:buClr>
+              <a:buSzPct val="80000"/>
+              <a:buFont typeface="Corbel" pitchFamily="34" charset="0"/>
+              <a:buChar char="•"/>
+              <a:defRPr sz="1600" kern="1200">
+                <a:solidFill>
+                  <a:schemeClr val="accent1"/>
+                </a:solidFill>
+                <a:latin typeface="+mn-lt"/>
+                <a:ea typeface="+mn-ea"/>
+                <a:cs typeface="+mn-cs"/>
+              </a:defRPr>
+            </a:lvl4pPr>
+            <a:lvl5pPr marL="1280160" indent="-182880" algn="l" defTabSz="914400" rtl="0" eaLnBrk="1" latinLnBrk="0" hangingPunct="1">
+              <a:lnSpc>
+                <a:spcPct val="90000"/>
+              </a:lnSpc>
+              <a:spcBef>
+                <a:spcPts val="200"/>
+              </a:spcBef>
+              <a:spcAft>
+                <a:spcPts val="400"/>
+              </a:spcAft>
+              <a:buClr>
+                <a:schemeClr val="accent1"/>
+              </a:buClr>
+              <a:buSzPct val="80000"/>
+              <a:buFont typeface="Corbel" pitchFamily="34" charset="0"/>
+              <a:buChar char="•"/>
+              <a:defRPr sz="1600" kern="1200">
+                <a:solidFill>
+                  <a:schemeClr val="accent1"/>
+                </a:solidFill>
+                <a:latin typeface="+mn-lt"/>
+                <a:ea typeface="+mn-ea"/>
+                <a:cs typeface="+mn-cs"/>
+              </a:defRPr>
+            </a:lvl5pPr>
+            <a:lvl6pPr marL="1600000" indent="-228600" algn="l" defTabSz="914400" rtl="0" eaLnBrk="1" latinLnBrk="0" hangingPunct="1">
+              <a:lnSpc>
+                <a:spcPct val="90000"/>
+              </a:lnSpc>
+              <a:spcBef>
+                <a:spcPts val="200"/>
+              </a:spcBef>
+              <a:spcAft>
+                <a:spcPts val="400"/>
+              </a:spcAft>
+              <a:buClr>
+                <a:schemeClr val="accent1"/>
+              </a:buClr>
+              <a:buSzPct val="80000"/>
+              <a:buFont typeface="Corbel" pitchFamily="34" charset="0"/>
+              <a:buChar char="•"/>
+              <a:defRPr sz="1600" kern="1200">
+                <a:solidFill>
+                  <a:schemeClr val="accent1"/>
+                </a:solidFill>
+                <a:latin typeface="+mn-lt"/>
+                <a:ea typeface="+mn-ea"/>
+                <a:cs typeface="+mn-cs"/>
+              </a:defRPr>
+            </a:lvl6pPr>
+            <a:lvl7pPr marL="1900000" indent="-228600" algn="l" defTabSz="914400" rtl="0" eaLnBrk="1" latinLnBrk="0" hangingPunct="1">
+              <a:lnSpc>
+                <a:spcPct val="90000"/>
+              </a:lnSpc>
+              <a:spcBef>
+                <a:spcPts val="200"/>
+              </a:spcBef>
+              <a:spcAft>
+                <a:spcPts val="400"/>
+              </a:spcAft>
+              <a:buClr>
+                <a:schemeClr val="accent1"/>
+              </a:buClr>
+              <a:buSzPct val="80000"/>
+              <a:buFont typeface="Corbel" pitchFamily="34" charset="0"/>
+              <a:buChar char="•"/>
+              <a:defRPr sz="1600" kern="1200">
+                <a:solidFill>
+                  <a:schemeClr val="accent1"/>
+                </a:solidFill>
+                <a:latin typeface="+mn-lt"/>
+                <a:ea typeface="+mn-ea"/>
+                <a:cs typeface="+mn-cs"/>
+              </a:defRPr>
+            </a:lvl7pPr>
+            <a:lvl8pPr marL="2200000" indent="-228600" algn="l" defTabSz="914400" rtl="0" eaLnBrk="1" latinLnBrk="0" hangingPunct="1">
+              <a:lnSpc>
+                <a:spcPct val="90000"/>
+              </a:lnSpc>
+              <a:spcBef>
+                <a:spcPts val="200"/>
+              </a:spcBef>
+              <a:spcAft>
+                <a:spcPts val="400"/>
+              </a:spcAft>
+              <a:buClr>
+                <a:schemeClr val="accent1"/>
+              </a:buClr>
+              <a:buSzPct val="80000"/>
+              <a:buFont typeface="Corbel" pitchFamily="34" charset="0"/>
+              <a:buChar char="•"/>
+              <a:defRPr sz="1600" kern="1200">
+                <a:solidFill>
+                  <a:schemeClr val="accent1"/>
+                </a:solidFill>
+                <a:latin typeface="+mn-lt"/>
+                <a:ea typeface="+mn-ea"/>
+                <a:cs typeface="+mn-cs"/>
+              </a:defRPr>
+            </a:lvl8pPr>
+            <a:lvl9pPr marL="2500000" indent="-228600" algn="l" defTabSz="914400" rtl="0" eaLnBrk="1" latinLnBrk="0" hangingPunct="1">
+              <a:lnSpc>
+                <a:spcPct val="90000"/>
+              </a:lnSpc>
+              <a:spcBef>
+                <a:spcPts val="200"/>
+              </a:spcBef>
+              <a:spcAft>
+                <a:spcPts val="400"/>
+              </a:spcAft>
+              <a:buClr>
+                <a:schemeClr val="accent1"/>
+              </a:buClr>
+              <a:buSzPct val="80000"/>
+              <a:buFont typeface="Corbel" pitchFamily="34" charset="0"/>
+              <a:buChar char="•"/>
+              <a:defRPr sz="1600" kern="1200">
+                <a:solidFill>
+                  <a:schemeClr val="accent1"/>
+                </a:solidFill>
+                <a:latin typeface="+mn-lt"/>
+                <a:ea typeface="+mn-ea"/>
+                <a:cs typeface="+mn-cs"/>
+              </a:defRPr>
+            </a:lvl9pPr>
+          </a:lstStyle>
+          <a:p>
+            <a:r>
+              <a:rPr lang="en-CA" dirty="0" smtClean="0">
+                <a:solidFill>
+                  <a:schemeClr val="bg1"/>
+                </a:solidFill>
+              </a:rPr>
+              <a:t>Template and CSS can contain syntax highlighting when in separate files</a:t>
+            </a:r>
+            <a:endParaRPr lang="en-CA" u="sng" dirty="0">
+              <a:solidFill>
+                <a:schemeClr val="bg1"/>
+              </a:solidFill>
+            </a:endParaRPr>
+          </a:p>
+        </p:txBody>
+      </p:sp>
+      <p:pic>
+        <p:nvPicPr>
+          <p:cNvPr id="7" name="Picture 6"/>
+          <p:cNvPicPr>
+            <a:picLocks noChangeAspect="1"/>
+          </p:cNvPicPr>
+          <p:nvPr/>
+        </p:nvPicPr>
+        <p:blipFill>
+          <a:blip r:embed="rId2">
+            <a:extLst>
+              <a:ext uri="{28A0092B-C50C-407E-A947-70E740481C1C}">
+                <a14:useLocalDpi xmlns:a14="http://schemas.microsoft.com/office/drawing/2010/main" val="0"/>
+              </a:ext>
+            </a:extLst>
+          </a:blip>
+          <a:stretch>
+            <a:fillRect/>
+          </a:stretch>
+        </p:blipFill>
+        <p:spPr>
+          <a:xfrm>
+            <a:off x="6758509" y="1484738"/>
+            <a:ext cx="4867088" cy="3801872"/>
+          </a:xfrm>
+          <a:prstGeom prst="rect">
+            <a:avLst/>
+          </a:prstGeom>
+        </p:spPr>
+      </p:pic>
+      <p:pic>
+        <p:nvPicPr>
+          <p:cNvPr id="8" name="Picture 7"/>
+          <p:cNvPicPr>
+            <a:picLocks noChangeAspect="1"/>
+          </p:cNvPicPr>
+          <p:nvPr/>
+        </p:nvPicPr>
+        <p:blipFill>
+          <a:blip r:embed="rId3"/>
+          <a:stretch>
+            <a:fillRect/>
+          </a:stretch>
+        </p:blipFill>
+        <p:spPr>
+          <a:xfrm>
+            <a:off x="1366246" y="2454709"/>
+            <a:ext cx="4362450" cy="1171575"/>
+          </a:xfrm>
+          <a:prstGeom prst="rect">
+            <a:avLst/>
+          </a:prstGeom>
+        </p:spPr>
+      </p:pic>
+    </p:spTree>
+    <p:extLst>
+      <p:ext uri="{BB962C8B-B14F-4D97-AF65-F5344CB8AC3E}">
+        <p14:creationId xmlns:p14="http://schemas.microsoft.com/office/powerpoint/2010/main" val="2180109606"/>
+      </p:ext>
+    </p:extLst>
+  </p:cSld>
+  <p:clrMapOvr>
+    <a:masterClrMapping/>
+  </p:clrMapOvr>
+  <p:timing>
+    <p:tnLst>
+      <p:par>
+        <p:cTn id="1" dur="indefinite" restart="never" nodeType="tmRoot"/>
+      </p:par>
+    </p:tnLst>
+  </p:timing>
+</p:sld>
+</file>
+
+<file path=ppt/slides/slide9.xml><?xml version="1.0" encoding="utf-8"?>
+<p:sld xmlns:a="http://schemas.openxmlformats.org/drawingml/2006/main" xmlns:r="http://schemas.openxmlformats.org/officeDocument/2006/relationships" xmlns:p="http://schemas.openxmlformats.org/presentationml/2006/main" showMasterSp="0">
+  <p:cSld>
+    <p:bg>
+      <p:bgPr>
+        <a:solidFill>
+          <a:srgbClr val="282C34"/>
+        </a:solidFill>
+        <a:effectLst/>
+      </p:bgPr>
+    </p:bg>
+    <p:spTree>
+      <p:nvGrpSpPr>
+        <p:cNvPr id="1" name=""/>
+        <p:cNvGrpSpPr/>
+        <p:nvPr/>
+      </p:nvGrpSpPr>
+      <p:grpSpPr>
+        <a:xfrm>
+          <a:off x="0" y="0"/>
+          <a:ext cx="0" cy="0"/>
+          <a:chOff x="0" y="0"/>
+          <a:chExt cx="0" cy="0"/>
+        </a:xfrm>
+      </p:grpSpPr>
+      <p:sp>
+        <p:nvSpPr>
+          <p:cNvPr id="2" name="Title 1"/>
+          <p:cNvSpPr>
+            <a:spLocks noGrp="1"/>
+          </p:cNvSpPr>
+          <p:nvPr>
+            <p:ph type="title"/>
+          </p:nvPr>
+        </p:nvSpPr>
+        <p:spPr/>
+        <p:txBody>
+          <a:bodyPr/>
+          <a:lstStyle/>
+          <a:p>
+            <a:r>
+              <a:rPr lang="en-CA" dirty="0">
+                <a:solidFill>
+                  <a:schemeClr val="bg1">
+                    <a:lumMod val="85000"/>
+                  </a:schemeClr>
+                </a:solidFill>
+              </a:rPr>
+              <a:t>Syntax / Legibility</a:t>
+            </a:r>
+            <a:endParaRPr lang="en-US" dirty="0">
+              <a:solidFill>
+                <a:schemeClr val="bg1">
+                  <a:lumMod val="85000"/>
+                </a:schemeClr>
+              </a:solidFill>
+            </a:endParaRPr>
+          </a:p>
+        </p:txBody>
+      </p:sp>
+      <p:sp>
+        <p:nvSpPr>
+          <p:cNvPr id="5" name="Content Placeholder 2"/>
+          <p:cNvSpPr>
+            <a:spLocks noGrp="1"/>
+          </p:cNvSpPr>
+          <p:nvPr>
+            <p:ph idx="1"/>
+          </p:nvPr>
+        </p:nvSpPr>
+        <p:spPr>
+          <a:xfrm>
+            <a:off x="6689576" y="5497156"/>
+            <a:ext cx="5004955" cy="931807"/>
+          </a:xfrm>
+        </p:spPr>
+        <p:txBody>
+          <a:bodyPr>
+            <a:normAutofit/>
+          </a:bodyPr>
+          <a:lstStyle/>
+          <a:p>
+            <a:r>
+              <a:rPr lang="en-CA" dirty="0" smtClean="0">
+                <a:solidFill>
+                  <a:schemeClr val="bg1"/>
+                </a:solidFill>
+              </a:rPr>
+              <a:t>Code is easy </a:t>
+            </a:r>
+            <a:r>
+              <a:rPr lang="en-CA" dirty="0">
+                <a:solidFill>
+                  <a:schemeClr val="bg1"/>
+                </a:solidFill>
+              </a:rPr>
+              <a:t>to read and comprehend</a:t>
+            </a:r>
+            <a:endParaRPr lang="en-CA" u="sng" dirty="0">
+              <a:solidFill>
+                <a:schemeClr val="bg1"/>
+              </a:solidFill>
+            </a:endParaRPr>
+          </a:p>
+          <a:p>
+            <a:r>
+              <a:rPr lang="en-CA" dirty="0" smtClean="0">
+                <a:solidFill>
+                  <a:schemeClr val="bg1"/>
+                </a:solidFill>
+              </a:rPr>
+              <a:t>Favors composition over inheritance</a:t>
+            </a:r>
+            <a:endParaRPr lang="en-CA" u="sng" dirty="0">
+              <a:solidFill>
+                <a:schemeClr val="bg1"/>
+              </a:solidFill>
+            </a:endParaRPr>
+          </a:p>
+        </p:txBody>
+      </p:sp>
       <p:pic>
         <p:nvPicPr>
           <p:cNvPr id="3" name="Picture 2"/>
@@ -7270,31 +8206,7 @@
                   <a:schemeClr val="bg1"/>
                 </a:solidFill>
               </a:rPr>
-              <a:t>Template and CSS</a:t>
-            </a:r>
-            <a:r>
-              <a:rPr lang="en-CA" dirty="0" smtClean="0">
-                <a:solidFill>
-                  <a:schemeClr val="bg1"/>
-                </a:solidFill>
-              </a:rPr>
-              <a:t> </a:t>
-            </a:r>
-            <a:r>
-              <a:rPr lang="en-CA" dirty="0" smtClean="0">
-                <a:solidFill>
-                  <a:schemeClr val="bg1"/>
-                </a:solidFill>
-              </a:rPr>
-              <a:t>can </a:t>
-            </a:r>
-            <a:r>
-              <a:rPr lang="en-CA" dirty="0" smtClean="0">
-                <a:solidFill>
-                  <a:schemeClr val="bg1"/>
-                </a:solidFill>
-              </a:rPr>
-              <a:t>contain syntax highlighting when in separate files</a:t>
+              <a:t>Template and CSS can contain syntax highlighting when in separate files</a:t>
             </a:r>
             <a:endParaRPr lang="en-CA" u="sng" dirty="0">
               <a:solidFill>
@@ -7304,295 +8216,10 @@
           </a:p>
         </p:txBody>
       </p:sp>
-      <p:pic>
-        <p:nvPicPr>
-          <p:cNvPr id="7" name="Picture 6"/>
-          <p:cNvPicPr>
-            <a:picLocks noChangeAspect="1"/>
-          </p:cNvPicPr>
-          <p:nvPr/>
-        </p:nvPicPr>
-        <p:blipFill>
-          <a:blip r:embed="rId3">
-            <a:extLst>
-              <a:ext uri="{28A0092B-C50C-407E-A947-70E740481C1C}">
-                <a14:useLocalDpi xmlns:a14="http://schemas.microsoft.com/office/drawing/2010/main" val="0"/>
-              </a:ext>
-            </a:extLst>
-          </a:blip>
-          <a:stretch>
-            <a:fillRect/>
-          </a:stretch>
-        </p:blipFill>
-        <p:spPr>
-          <a:xfrm>
-            <a:off x="6758510" y="1313288"/>
-            <a:ext cx="4867088" cy="3801872"/>
-          </a:xfrm>
-          <a:prstGeom prst="rect">
-            <a:avLst/>
-          </a:prstGeom>
-        </p:spPr>
-      </p:pic>
     </p:spTree>
     <p:extLst>
       <p:ext uri="{BB962C8B-B14F-4D97-AF65-F5344CB8AC3E}">
-        <p14:creationId xmlns:p14="http://schemas.microsoft.com/office/powerpoint/2010/main" val="2180109606"/>
-      </p:ext>
-    </p:extLst>
-  </p:cSld>
-  <p:clrMapOvr>
-    <a:masterClrMapping/>
-  </p:clrMapOvr>
-  <p:timing>
-    <p:tnLst>
-      <p:par>
-        <p:cTn id="1" dur="indefinite" restart="never" nodeType="tmRoot"/>
-      </p:par>
-    </p:tnLst>
-  </p:timing>
-</p:sld>
-</file>
-
-<file path=ppt/slides/slide9.xml><?xml version="1.0" encoding="utf-8"?>
-<p:sld xmlns:a="http://schemas.openxmlformats.org/drawingml/2006/main" xmlns:r="http://schemas.openxmlformats.org/officeDocument/2006/relationships" xmlns:p="http://schemas.openxmlformats.org/presentationml/2006/main">
-  <p:cSld>
-    <p:bg>
-      <p:bgPr>
-        <a:solidFill>
-          <a:srgbClr val="1976D2"/>
-        </a:solidFill>
-        <a:effectLst/>
-      </p:bgPr>
-    </p:bg>
-    <p:spTree>
-      <p:nvGrpSpPr>
-        <p:cNvPr id="1" name=""/>
-        <p:cNvGrpSpPr/>
-        <p:nvPr/>
-      </p:nvGrpSpPr>
-      <p:grpSpPr>
-        <a:xfrm>
-          <a:off x="0" y="0"/>
-          <a:ext cx="0" cy="0"/>
-          <a:chOff x="0" y="0"/>
-          <a:chExt cx="0" cy="0"/>
-        </a:xfrm>
-      </p:grpSpPr>
-      <p:sp>
-        <p:nvSpPr>
-          <p:cNvPr id="2" name="Title 1"/>
-          <p:cNvSpPr>
-            <a:spLocks noGrp="1"/>
-          </p:cNvSpPr>
-          <p:nvPr>
-            <p:ph type="title"/>
-          </p:nvPr>
-        </p:nvSpPr>
-        <p:spPr/>
-        <p:txBody>
-          <a:bodyPr/>
-          <a:lstStyle/>
-          <a:p>
-            <a:r>
-              <a:rPr lang="en-CA" dirty="0">
-                <a:solidFill>
-                  <a:schemeClr val="tx1">
-                    <a:lumMod val="50000"/>
-                    <a:lumOff val="50000"/>
-                  </a:schemeClr>
-                </a:solidFill>
-              </a:rPr>
-              <a:t>Debugging</a:t>
-            </a:r>
-            <a:endParaRPr lang="en-US" dirty="0">
-              <a:solidFill>
-                <a:schemeClr val="tx1">
-                  <a:lumMod val="50000"/>
-                  <a:lumOff val="50000"/>
-                </a:schemeClr>
-              </a:solidFill>
-            </a:endParaRPr>
-          </a:p>
-        </p:txBody>
-      </p:sp>
-      <p:sp>
-        <p:nvSpPr>
-          <p:cNvPr id="3" name="Content Placeholder 2"/>
-          <p:cNvSpPr>
-            <a:spLocks noGrp="1"/>
-          </p:cNvSpPr>
-          <p:nvPr>
-            <p:ph idx="1"/>
-          </p:nvPr>
-        </p:nvSpPr>
-        <p:spPr>
-          <a:xfrm>
-            <a:off x="1143001" y="2057400"/>
-            <a:ext cx="4388666" cy="4038600"/>
-          </a:xfrm>
-        </p:spPr>
-        <p:txBody>
-          <a:bodyPr/>
-          <a:lstStyle/>
-          <a:p>
-            <a:r>
-              <a:rPr lang="en-CA" dirty="0">
-                <a:solidFill>
-                  <a:schemeClr val="tx1">
-                    <a:lumMod val="75000"/>
-                    <a:lumOff val="25000"/>
-                  </a:schemeClr>
-                </a:solidFill>
-              </a:rPr>
-              <a:t>Syntax highlighting occurs for compiler </a:t>
-            </a:r>
-            <a:r>
-              <a:rPr lang="en-CA" dirty="0" smtClean="0">
-                <a:solidFill>
-                  <a:schemeClr val="tx1">
-                    <a:lumMod val="75000"/>
-                    <a:lumOff val="25000"/>
-                  </a:schemeClr>
-                </a:solidFill>
-              </a:rPr>
-              <a:t>errors</a:t>
-            </a:r>
-            <a:endParaRPr lang="en-CA" dirty="0">
-              <a:solidFill>
-                <a:schemeClr val="tx1">
-                  <a:lumMod val="75000"/>
-                  <a:lumOff val="25000"/>
-                </a:schemeClr>
-              </a:solidFill>
-            </a:endParaRPr>
-          </a:p>
-          <a:p>
-            <a:r>
-              <a:rPr lang="en-CA" dirty="0">
-                <a:solidFill>
-                  <a:schemeClr val="tx1">
-                    <a:lumMod val="75000"/>
-                    <a:lumOff val="25000"/>
-                  </a:schemeClr>
-                </a:solidFill>
-              </a:rPr>
-              <a:t>Runtime errors in browser console are </a:t>
-            </a:r>
-            <a:r>
-              <a:rPr lang="en-CA" dirty="0" smtClean="0">
-                <a:solidFill>
-                  <a:schemeClr val="tx1">
-                    <a:lumMod val="75000"/>
-                    <a:lumOff val="25000"/>
-                  </a:schemeClr>
-                </a:solidFill>
-              </a:rPr>
-              <a:t>well-documented</a:t>
-            </a:r>
-          </a:p>
-          <a:p>
-            <a:r>
-              <a:rPr lang="en-CA" dirty="0" smtClean="0">
-                <a:solidFill>
-                  <a:schemeClr val="tx1">
-                    <a:lumMod val="75000"/>
-                    <a:lumOff val="25000"/>
-                  </a:schemeClr>
-                </a:solidFill>
-              </a:rPr>
-              <a:t>Runtime errors don’t always come with line numbers</a:t>
-            </a:r>
-            <a:endParaRPr lang="en-CA" dirty="0">
-              <a:solidFill>
-                <a:schemeClr val="tx1">
-                  <a:lumMod val="75000"/>
-                  <a:lumOff val="25000"/>
-                </a:schemeClr>
-              </a:solidFill>
-            </a:endParaRPr>
-          </a:p>
-          <a:p>
-            <a:r>
-              <a:rPr lang="en-CA" dirty="0">
-                <a:solidFill>
-                  <a:schemeClr val="tx1">
-                    <a:lumMod val="75000"/>
-                    <a:lumOff val="25000"/>
-                  </a:schemeClr>
-                </a:solidFill>
-              </a:rPr>
-              <a:t>Compiled .MAP files allow for </a:t>
-            </a:r>
-            <a:r>
-              <a:rPr lang="en-CA" dirty="0" err="1">
-                <a:solidFill>
-                  <a:schemeClr val="tx1">
-                    <a:lumMod val="75000"/>
-                    <a:lumOff val="25000"/>
-                  </a:schemeClr>
-                </a:solidFill>
-              </a:rPr>
-              <a:t>TypeScript</a:t>
-            </a:r>
-            <a:r>
-              <a:rPr lang="en-CA" dirty="0">
-                <a:solidFill>
-                  <a:schemeClr val="tx1">
-                    <a:lumMod val="75000"/>
-                    <a:lumOff val="25000"/>
-                  </a:schemeClr>
-                </a:solidFill>
-              </a:rPr>
-              <a:t> debugging</a:t>
-            </a:r>
-          </a:p>
-          <a:p>
-            <a:endParaRPr lang="en-CA" dirty="0">
-              <a:solidFill>
-                <a:schemeClr val="tx1">
-                  <a:lumMod val="75000"/>
-                  <a:lumOff val="25000"/>
-                </a:schemeClr>
-              </a:solidFill>
-            </a:endParaRPr>
-          </a:p>
-        </p:txBody>
-      </p:sp>
-      <p:pic>
-        <p:nvPicPr>
-          <p:cNvPr id="5" name="Picture 4"/>
-          <p:cNvPicPr>
-            <a:picLocks noChangeAspect="1"/>
-          </p:cNvPicPr>
-          <p:nvPr/>
-        </p:nvPicPr>
-        <p:blipFill>
-          <a:blip r:embed="rId2">
-            <a:extLst>
-              <a:ext uri="{28A0092B-C50C-407E-A947-70E740481C1C}">
-                <a14:useLocalDpi xmlns:a14="http://schemas.microsoft.com/office/drawing/2010/main" val="0"/>
-              </a:ext>
-            </a:extLst>
-          </a:blip>
-          <a:stretch>
-            <a:fillRect/>
-          </a:stretch>
-        </p:blipFill>
-        <p:spPr>
-          <a:xfrm>
-            <a:off x="5845973" y="1965960"/>
-            <a:ext cx="5696745" cy="4010585"/>
-          </a:xfrm>
-          <a:prstGeom prst="rect">
-            <a:avLst/>
-          </a:prstGeom>
-        </p:spPr>
-      </p:pic>
-    </p:spTree>
-    <p:extLst>
-      <p:ext uri="{BB962C8B-B14F-4D97-AF65-F5344CB8AC3E}">
-        <p14:creationId xmlns:p14="http://schemas.microsoft.com/office/powerpoint/2010/main" val="344836450"/>
+        <p14:creationId xmlns:p14="http://schemas.microsoft.com/office/powerpoint/2010/main" val="552111781"/>
       </p:ext>
     </p:extLst>
   </p:cSld>

</xml_diff>